<commit_message>
Made few changes to the QTT presentation
</commit_message>
<xml_diff>
--- a/docs/presentations/OBI tutorial July 2011 ICBO/OBI-QTT&designpatterns.pptx
+++ b/docs/presentations/OBI tutorial July 2011 ICBO/OBI-QTT&designpatterns.pptx
@@ -1,9 +1,12 @@
 
 <file path=ppt/presentation.xml><?xml version="1.0" encoding="utf-8"?>
-<p:presentation xmlns:a="http://schemas.openxmlformats.org/drawingml/2006/main" xmlns:r="http://schemas.openxmlformats.org/officeDocument/2006/relationships" xmlns:p="http://schemas.openxmlformats.org/presentationml/2006/main" saveSubsetFonts="1">
+<p:presentation xmlns:a="http://schemas.openxmlformats.org/drawingml/2006/main" xmlns:r="http://schemas.openxmlformats.org/officeDocument/2006/relationships" xmlns:mc="http://schemas.openxmlformats.org/markup-compatibility/2006" xmlns:mv="urn:schemas-microsoft-com:mac:vml" xmlns:p="http://schemas.openxmlformats.org/presentationml/2006/main" mc:Ignorable="mv" mc:PreserveAttributes="mv:*" saveSubsetFonts="1">
   <p:sldMasterIdLst>
     <p:sldMasterId id="2147483648" r:id="rId1"/>
   </p:sldMasterIdLst>
+  <p:notesMasterIdLst>
+    <p:notesMasterId r:id="rId13"/>
+  </p:notesMasterIdLst>
   <p:sldIdLst>
     <p:sldId id="256" r:id="rId2"/>
     <p:sldId id="267" r:id="rId3"/>
@@ -117,8 +120,454 @@
 </p:presentation>
 </file>
 
+<file path=ppt/notesMasters/notesMaster1.xml><?xml version="1.0" encoding="utf-8"?>
+<p:notesMaster xmlns:a="http://schemas.openxmlformats.org/drawingml/2006/main" xmlns:r="http://schemas.openxmlformats.org/officeDocument/2006/relationships" xmlns:mc="http://schemas.openxmlformats.org/markup-compatibility/2006" xmlns:mv="urn:schemas-microsoft-com:mac:vml" xmlns:p="http://schemas.openxmlformats.org/presentationml/2006/main" mc:Ignorable="mv" mc:PreserveAttributes="mv:*">
+  <p:cSld>
+    <p:bg>
+      <p:bgRef idx="1001">
+        <a:schemeClr val="bg1"/>
+      </p:bgRef>
+    </p:bg>
+    <p:spTree>
+      <p:nvGrpSpPr>
+        <p:cNvPr id="1" name=""/>
+        <p:cNvGrpSpPr/>
+        <p:nvPr/>
+      </p:nvGrpSpPr>
+      <p:grpSpPr>
+        <a:xfrm>
+          <a:off x="0" y="0"/>
+          <a:ext cx="0" cy="0"/>
+          <a:chOff x="0" y="0"/>
+          <a:chExt cx="0" cy="0"/>
+        </a:xfrm>
+      </p:grpSpPr>
+      <p:sp>
+        <p:nvSpPr>
+          <p:cNvPr id="2" name="Header Placeholder 1"/>
+          <p:cNvSpPr>
+            <a:spLocks noGrp="1"/>
+          </p:cNvSpPr>
+          <p:nvPr>
+            <p:ph type="hdr" sz="quarter"/>
+          </p:nvPr>
+        </p:nvSpPr>
+        <p:spPr>
+          <a:xfrm>
+            <a:off x="0" y="0"/>
+            <a:ext cx="2971800" cy="457200"/>
+          </a:xfrm>
+          <a:prstGeom prst="rect">
+            <a:avLst/>
+          </a:prstGeom>
+        </p:spPr>
+        <p:txBody>
+          <a:bodyPr vert="horz" lIns="91440" tIns="45720" rIns="91440" bIns="45720" rtlCol="0"/>
+          <a:lstStyle>
+            <a:lvl1pPr algn="l">
+              <a:defRPr sz="1200"/>
+            </a:lvl1pPr>
+          </a:lstStyle>
+          <a:p>
+            <a:endParaRPr lang="en-US"/>
+          </a:p>
+        </p:txBody>
+      </p:sp>
+      <p:sp>
+        <p:nvSpPr>
+          <p:cNvPr id="3" name="Date Placeholder 2"/>
+          <p:cNvSpPr>
+            <a:spLocks noGrp="1"/>
+          </p:cNvSpPr>
+          <p:nvPr>
+            <p:ph type="dt" idx="1"/>
+          </p:nvPr>
+        </p:nvSpPr>
+        <p:spPr>
+          <a:xfrm>
+            <a:off x="3884613" y="0"/>
+            <a:ext cx="2971800" cy="457200"/>
+          </a:xfrm>
+          <a:prstGeom prst="rect">
+            <a:avLst/>
+          </a:prstGeom>
+        </p:spPr>
+        <p:txBody>
+          <a:bodyPr vert="horz" lIns="91440" tIns="45720" rIns="91440" bIns="45720" rtlCol="0"/>
+          <a:lstStyle>
+            <a:lvl1pPr algn="r">
+              <a:defRPr sz="1200"/>
+            </a:lvl1pPr>
+          </a:lstStyle>
+          <a:p>
+            <a:fld id="{73EEEB17-80BA-6F46-B2E7-E6A22976B355}" type="datetimeFigureOut">
+              <a:rPr lang="en-US" smtClean="0"/>
+              <a:t>7/25/11</a:t>
+            </a:fld>
+            <a:endParaRPr lang="en-US"/>
+          </a:p>
+        </p:txBody>
+      </p:sp>
+      <p:sp>
+        <p:nvSpPr>
+          <p:cNvPr id="4" name="Slide Image Placeholder 3"/>
+          <p:cNvSpPr>
+            <a:spLocks noGrp="1" noRot="1" noChangeAspect="1"/>
+          </p:cNvSpPr>
+          <p:nvPr>
+            <p:ph type="sldImg" idx="2"/>
+          </p:nvPr>
+        </p:nvSpPr>
+        <p:spPr>
+          <a:xfrm>
+            <a:off x="1143000" y="685800"/>
+            <a:ext cx="4572000" cy="3429000"/>
+          </a:xfrm>
+          <a:prstGeom prst="rect">
+            <a:avLst/>
+          </a:prstGeom>
+          <a:noFill/>
+          <a:ln w="12700">
+            <a:solidFill>
+              <a:prstClr val="black"/>
+            </a:solidFill>
+          </a:ln>
+        </p:spPr>
+        <p:txBody>
+          <a:bodyPr vert="horz" lIns="91440" tIns="45720" rIns="91440" bIns="45720" rtlCol="0" anchor="ctr"/>
+          <a:lstStyle/>
+          <a:p>
+            <a:endParaRPr lang="en-US"/>
+          </a:p>
+        </p:txBody>
+      </p:sp>
+      <p:sp>
+        <p:nvSpPr>
+          <p:cNvPr id="5" name="Notes Placeholder 4"/>
+          <p:cNvSpPr>
+            <a:spLocks noGrp="1"/>
+          </p:cNvSpPr>
+          <p:nvPr>
+            <p:ph type="body" sz="quarter" idx="3"/>
+          </p:nvPr>
+        </p:nvSpPr>
+        <p:spPr>
+          <a:xfrm>
+            <a:off x="685800" y="4343400"/>
+            <a:ext cx="5486400" cy="4114800"/>
+          </a:xfrm>
+          <a:prstGeom prst="rect">
+            <a:avLst/>
+          </a:prstGeom>
+        </p:spPr>
+        <p:txBody>
+          <a:bodyPr vert="horz" lIns="91440" tIns="45720" rIns="91440" bIns="45720" rtlCol="0">
+            <a:normAutofit/>
+          </a:bodyPr>
+          <a:lstStyle/>
+          <a:p>
+            <a:pPr lvl="0"/>
+            <a:r>
+              <a:rPr lang="en-US" smtClean="0"/>
+              <a:t>Click to edit Master text styles</a:t>
+            </a:r>
+          </a:p>
+          <a:p>
+            <a:pPr lvl="1"/>
+            <a:r>
+              <a:rPr lang="en-US" smtClean="0"/>
+              <a:t>Second level</a:t>
+            </a:r>
+          </a:p>
+          <a:p>
+            <a:pPr lvl="2"/>
+            <a:r>
+              <a:rPr lang="en-US" smtClean="0"/>
+              <a:t>Third level</a:t>
+            </a:r>
+          </a:p>
+          <a:p>
+            <a:pPr lvl="3"/>
+            <a:r>
+              <a:rPr lang="en-US" smtClean="0"/>
+              <a:t>Fourth level</a:t>
+            </a:r>
+          </a:p>
+          <a:p>
+            <a:pPr lvl="4"/>
+            <a:r>
+              <a:rPr lang="en-US" smtClean="0"/>
+              <a:t>Fifth level</a:t>
+            </a:r>
+            <a:endParaRPr lang="en-US"/>
+          </a:p>
+        </p:txBody>
+      </p:sp>
+      <p:sp>
+        <p:nvSpPr>
+          <p:cNvPr id="6" name="Footer Placeholder 5"/>
+          <p:cNvSpPr>
+            <a:spLocks noGrp="1"/>
+          </p:cNvSpPr>
+          <p:nvPr>
+            <p:ph type="ftr" sz="quarter" idx="4"/>
+          </p:nvPr>
+        </p:nvSpPr>
+        <p:spPr>
+          <a:xfrm>
+            <a:off x="0" y="8685213"/>
+            <a:ext cx="2971800" cy="457200"/>
+          </a:xfrm>
+          <a:prstGeom prst="rect">
+            <a:avLst/>
+          </a:prstGeom>
+        </p:spPr>
+        <p:txBody>
+          <a:bodyPr vert="horz" lIns="91440" tIns="45720" rIns="91440" bIns="45720" rtlCol="0" anchor="b"/>
+          <a:lstStyle>
+            <a:lvl1pPr algn="l">
+              <a:defRPr sz="1200"/>
+            </a:lvl1pPr>
+          </a:lstStyle>
+          <a:p>
+            <a:endParaRPr lang="en-US"/>
+          </a:p>
+        </p:txBody>
+      </p:sp>
+      <p:sp>
+        <p:nvSpPr>
+          <p:cNvPr id="7" name="Slide Number Placeholder 6"/>
+          <p:cNvSpPr>
+            <a:spLocks noGrp="1"/>
+          </p:cNvSpPr>
+          <p:nvPr>
+            <p:ph type="sldNum" sz="quarter" idx="5"/>
+          </p:nvPr>
+        </p:nvSpPr>
+        <p:spPr>
+          <a:xfrm>
+            <a:off x="3884613" y="8685213"/>
+            <a:ext cx="2971800" cy="457200"/>
+          </a:xfrm>
+          <a:prstGeom prst="rect">
+            <a:avLst/>
+          </a:prstGeom>
+        </p:spPr>
+        <p:txBody>
+          <a:bodyPr vert="horz" lIns="91440" tIns="45720" rIns="91440" bIns="45720" rtlCol="0" anchor="b"/>
+          <a:lstStyle>
+            <a:lvl1pPr algn="r">
+              <a:defRPr sz="1200"/>
+            </a:lvl1pPr>
+          </a:lstStyle>
+          <a:p>
+            <a:fld id="{FDFB235A-217F-2747-A483-9C09F588E6D4}" type="slidenum">
+              <a:rPr lang="en-US" smtClean="0"/>
+              <a:t>‹#›</a:t>
+            </a:fld>
+            <a:endParaRPr lang="en-US"/>
+          </a:p>
+        </p:txBody>
+      </p:sp>
+    </p:spTree>
+  </p:cSld>
+  <p:clrMap bg1="lt1" tx1="dk1" bg2="lt2" tx2="dk2" accent1="accent1" accent2="accent2" accent3="accent3" accent4="accent4" accent5="accent5" accent6="accent6" hlink="hlink" folHlink="folHlink"/>
+  <p:notesStyle>
+    <a:lvl1pPr marL="0" algn="l" defTabSz="457200" rtl="0" eaLnBrk="1" latinLnBrk="0" hangingPunct="1">
+      <a:defRPr sz="1200" kern="1200">
+        <a:solidFill>
+          <a:schemeClr val="tx1"/>
+        </a:solidFill>
+        <a:latin typeface="+mn-lt"/>
+        <a:ea typeface="+mn-ea"/>
+        <a:cs typeface="+mn-cs"/>
+      </a:defRPr>
+    </a:lvl1pPr>
+    <a:lvl2pPr marL="457200" algn="l" defTabSz="457200" rtl="0" eaLnBrk="1" latinLnBrk="0" hangingPunct="1">
+      <a:defRPr sz="1200" kern="1200">
+        <a:solidFill>
+          <a:schemeClr val="tx1"/>
+        </a:solidFill>
+        <a:latin typeface="+mn-lt"/>
+        <a:ea typeface="+mn-ea"/>
+        <a:cs typeface="+mn-cs"/>
+      </a:defRPr>
+    </a:lvl2pPr>
+    <a:lvl3pPr marL="914400" algn="l" defTabSz="457200" rtl="0" eaLnBrk="1" latinLnBrk="0" hangingPunct="1">
+      <a:defRPr sz="1200" kern="1200">
+        <a:solidFill>
+          <a:schemeClr val="tx1"/>
+        </a:solidFill>
+        <a:latin typeface="+mn-lt"/>
+        <a:ea typeface="+mn-ea"/>
+        <a:cs typeface="+mn-cs"/>
+      </a:defRPr>
+    </a:lvl3pPr>
+    <a:lvl4pPr marL="1371600" algn="l" defTabSz="457200" rtl="0" eaLnBrk="1" latinLnBrk="0" hangingPunct="1">
+      <a:defRPr sz="1200" kern="1200">
+        <a:solidFill>
+          <a:schemeClr val="tx1"/>
+        </a:solidFill>
+        <a:latin typeface="+mn-lt"/>
+        <a:ea typeface="+mn-ea"/>
+        <a:cs typeface="+mn-cs"/>
+      </a:defRPr>
+    </a:lvl4pPr>
+    <a:lvl5pPr marL="1828800" algn="l" defTabSz="457200" rtl="0" eaLnBrk="1" latinLnBrk="0" hangingPunct="1">
+      <a:defRPr sz="1200" kern="1200">
+        <a:solidFill>
+          <a:schemeClr val="tx1"/>
+        </a:solidFill>
+        <a:latin typeface="+mn-lt"/>
+        <a:ea typeface="+mn-ea"/>
+        <a:cs typeface="+mn-cs"/>
+      </a:defRPr>
+    </a:lvl5pPr>
+    <a:lvl6pPr marL="2286000" algn="l" defTabSz="457200" rtl="0" eaLnBrk="1" latinLnBrk="0" hangingPunct="1">
+      <a:defRPr sz="1200" kern="1200">
+        <a:solidFill>
+          <a:schemeClr val="tx1"/>
+        </a:solidFill>
+        <a:latin typeface="+mn-lt"/>
+        <a:ea typeface="+mn-ea"/>
+        <a:cs typeface="+mn-cs"/>
+      </a:defRPr>
+    </a:lvl6pPr>
+    <a:lvl7pPr marL="2743200" algn="l" defTabSz="457200" rtl="0" eaLnBrk="1" latinLnBrk="0" hangingPunct="1">
+      <a:defRPr sz="1200" kern="1200">
+        <a:solidFill>
+          <a:schemeClr val="tx1"/>
+        </a:solidFill>
+        <a:latin typeface="+mn-lt"/>
+        <a:ea typeface="+mn-ea"/>
+        <a:cs typeface="+mn-cs"/>
+      </a:defRPr>
+    </a:lvl7pPr>
+    <a:lvl8pPr marL="3200400" algn="l" defTabSz="457200" rtl="0" eaLnBrk="1" latinLnBrk="0" hangingPunct="1">
+      <a:defRPr sz="1200" kern="1200">
+        <a:solidFill>
+          <a:schemeClr val="tx1"/>
+        </a:solidFill>
+        <a:latin typeface="+mn-lt"/>
+        <a:ea typeface="+mn-ea"/>
+        <a:cs typeface="+mn-cs"/>
+      </a:defRPr>
+    </a:lvl8pPr>
+    <a:lvl9pPr marL="3657600" algn="l" defTabSz="457200" rtl="0" eaLnBrk="1" latinLnBrk="0" hangingPunct="1">
+      <a:defRPr sz="1200" kern="1200">
+        <a:solidFill>
+          <a:schemeClr val="tx1"/>
+        </a:solidFill>
+        <a:latin typeface="+mn-lt"/>
+        <a:ea typeface="+mn-ea"/>
+        <a:cs typeface="+mn-cs"/>
+      </a:defRPr>
+    </a:lvl9pPr>
+  </p:notesStyle>
+</p:notesMaster>
+</file>
+
+<file path=ppt/notesSlides/notesSlide1.xml><?xml version="1.0" encoding="utf-8"?>
+<p:notes xmlns:a="http://schemas.openxmlformats.org/drawingml/2006/main" xmlns:r="http://schemas.openxmlformats.org/officeDocument/2006/relationships" xmlns:mc="http://schemas.openxmlformats.org/markup-compatibility/2006" xmlns:mv="urn:schemas-microsoft-com:mac:vml" xmlns:p="http://schemas.openxmlformats.org/presentationml/2006/main" mc:Ignorable="mv" mc:PreserveAttributes="mv:*">
+  <p:cSld>
+    <p:spTree>
+      <p:nvGrpSpPr>
+        <p:cNvPr id="1" name=""/>
+        <p:cNvGrpSpPr/>
+        <p:nvPr/>
+      </p:nvGrpSpPr>
+      <p:grpSpPr>
+        <a:xfrm>
+          <a:off x="0" y="0"/>
+          <a:ext cx="0" cy="0"/>
+          <a:chOff x="0" y="0"/>
+          <a:chExt cx="0" cy="0"/>
+        </a:xfrm>
+      </p:grpSpPr>
+      <p:sp>
+        <p:nvSpPr>
+          <p:cNvPr id="2" name="Slide Image Placeholder 1"/>
+          <p:cNvSpPr>
+            <a:spLocks noGrp="1" noRot="1" noChangeAspect="1"/>
+          </p:cNvSpPr>
+          <p:nvPr>
+            <p:ph type="sldImg"/>
+          </p:nvPr>
+        </p:nvSpPr>
+        <p:spPr/>
+      </p:sp>
+      <p:sp>
+        <p:nvSpPr>
+          <p:cNvPr id="3" name="Notes Placeholder 2"/>
+          <p:cNvSpPr>
+            <a:spLocks noGrp="1"/>
+          </p:cNvSpPr>
+          <p:nvPr>
+            <p:ph type="body" idx="1"/>
+          </p:nvPr>
+        </p:nvSpPr>
+        <p:spPr/>
+        <p:txBody>
+          <a:bodyPr>
+            <a:normAutofit/>
+          </a:bodyPr>
+          <a:lstStyle/>
+          <a:p>
+            <a:r>
+              <a:rPr lang="en-US" dirty="0" smtClean="0"/>
+              <a:t>Part</a:t>
+            </a:r>
+            <a:r>
+              <a:rPr lang="en-US" baseline="0" dirty="0" smtClean="0"/>
+              <a:t> per million</a:t>
+            </a:r>
+          </a:p>
+          <a:p>
+            <a:r>
+              <a:rPr lang="en-US" baseline="0" dirty="0" err="1" smtClean="0"/>
+              <a:t>Mmol</a:t>
+            </a:r>
+            <a:r>
+              <a:rPr lang="en-US" baseline="0" dirty="0" smtClean="0"/>
+              <a:t> per liter : mole per liter</a:t>
+            </a:r>
+            <a:endParaRPr lang="en-US" dirty="0"/>
+          </a:p>
+        </p:txBody>
+      </p:sp>
+      <p:sp>
+        <p:nvSpPr>
+          <p:cNvPr id="4" name="Slide Number Placeholder 3"/>
+          <p:cNvSpPr>
+            <a:spLocks noGrp="1"/>
+          </p:cNvSpPr>
+          <p:nvPr>
+            <p:ph type="sldNum" sz="quarter" idx="10"/>
+          </p:nvPr>
+        </p:nvSpPr>
+        <p:spPr/>
+        <p:txBody>
+          <a:bodyPr/>
+          <a:lstStyle/>
+          <a:p>
+            <a:fld id="{FDFB235A-217F-2747-A483-9C09F588E6D4}" type="slidenum">
+              <a:rPr lang="en-US" smtClean="0"/>
+              <a:t>9</a:t>
+            </a:fld>
+            <a:endParaRPr lang="en-US"/>
+          </a:p>
+        </p:txBody>
+      </p:sp>
+    </p:spTree>
+  </p:cSld>
+  <p:clrMapOvr>
+    <a:masterClrMapping/>
+  </p:clrMapOvr>
+</p:notes>
+</file>
+
 <file path=ppt/slideLayouts/slideLayout1.xml><?xml version="1.0" encoding="utf-8"?>
-<p:sldLayout xmlns:a="http://schemas.openxmlformats.org/drawingml/2006/main" xmlns:r="http://schemas.openxmlformats.org/officeDocument/2006/relationships" xmlns:p="http://schemas.openxmlformats.org/presentationml/2006/main" type="title" preserve="1">
+<p:sldLayout xmlns:a="http://schemas.openxmlformats.org/drawingml/2006/main" xmlns:r="http://schemas.openxmlformats.org/officeDocument/2006/relationships" xmlns:mc="http://schemas.openxmlformats.org/markup-compatibility/2006" xmlns:mv="urn:schemas-microsoft-com:mac:vml" xmlns:p="http://schemas.openxmlformats.org/presentationml/2006/main" mc:Ignorable="mv" mc:PreserveAttributes="mv:*" type="title" preserve="1">
   <p:cSld name="Title Slide">
     <p:spTree>
       <p:nvGrpSpPr>
@@ -298,7 +747,8 @@
           <a:p>
             <a:fld id="{6BFECD78-3C8E-49F2-8FAB-59489D168ABB}" type="datetimeFigureOut">
               <a:rPr lang="en-US" smtClean="0"/>
-              <a:t>25/07/2011</a:t>
+              <a:pPr/>
+              <a:t>7/25/11</a:t>
             </a:fld>
             <a:endParaRPr lang="en-US"/>
           </a:p>
@@ -340,6 +790,7 @@
           <a:p>
             <a:fld id="{0FB56013-B943-42BA-886F-6F9D4EB85E9D}" type="slidenum">
               <a:rPr lang="en-US" smtClean="0"/>
+              <a:pPr/>
               <a:t>‹#›</a:t>
             </a:fld>
             <a:endParaRPr lang="en-US"/>
@@ -349,7 +800,7 @@
     </p:spTree>
     <p:extLst>
       <p:ext uri="{BB962C8B-B14F-4D97-AF65-F5344CB8AC3E}">
-        <p14:creationId xmlns:p14="http://schemas.microsoft.com/office/powerpoint/2010/main" val="2702019936"/>
+        <p14:creationId xmlns:p14="http://schemas.microsoft.com/office/powerpoint/2010/main" xmlns:p="http://schemas.openxmlformats.org/presentationml/2006/main" xmlns:r="http://schemas.openxmlformats.org/officeDocument/2006/relationships" xmlns:a="http://schemas.openxmlformats.org/drawingml/2006/main" xmlns="" val="2702019936"/>
       </p:ext>
     </p:extLst>
   </p:cSld>
@@ -360,7 +811,7 @@
 </file>
 
 <file path=ppt/slideLayouts/slideLayout10.xml><?xml version="1.0" encoding="utf-8"?>
-<p:sldLayout xmlns:a="http://schemas.openxmlformats.org/drawingml/2006/main" xmlns:r="http://schemas.openxmlformats.org/officeDocument/2006/relationships" xmlns:p="http://schemas.openxmlformats.org/presentationml/2006/main" type="vertTx" preserve="1">
+<p:sldLayout xmlns:a="http://schemas.openxmlformats.org/drawingml/2006/main" xmlns:r="http://schemas.openxmlformats.org/officeDocument/2006/relationships" xmlns:mc="http://schemas.openxmlformats.org/markup-compatibility/2006" xmlns:mv="urn:schemas-microsoft-com:mac:vml" xmlns:p="http://schemas.openxmlformats.org/presentationml/2006/main" mc:Ignorable="mv" mc:PreserveAttributes="mv:*" type="vertTx" preserve="1">
   <p:cSld name="Title and Vertical Text">
     <p:spTree>
       <p:nvGrpSpPr>
@@ -468,7 +919,8 @@
           <a:p>
             <a:fld id="{6BFECD78-3C8E-49F2-8FAB-59489D168ABB}" type="datetimeFigureOut">
               <a:rPr lang="en-US" smtClean="0"/>
-              <a:t>25/07/2011</a:t>
+              <a:pPr/>
+              <a:t>7/25/11</a:t>
             </a:fld>
             <a:endParaRPr lang="en-US"/>
           </a:p>
@@ -510,6 +962,7 @@
           <a:p>
             <a:fld id="{0FB56013-B943-42BA-886F-6F9D4EB85E9D}" type="slidenum">
               <a:rPr lang="en-US" smtClean="0"/>
+              <a:pPr/>
               <a:t>‹#›</a:t>
             </a:fld>
             <a:endParaRPr lang="en-US"/>
@@ -519,7 +972,7 @@
     </p:spTree>
     <p:extLst>
       <p:ext uri="{BB962C8B-B14F-4D97-AF65-F5344CB8AC3E}">
-        <p14:creationId xmlns:p14="http://schemas.microsoft.com/office/powerpoint/2010/main" val="2949498235"/>
+        <p14:creationId xmlns:p14="http://schemas.microsoft.com/office/powerpoint/2010/main" xmlns:p="http://schemas.openxmlformats.org/presentationml/2006/main" xmlns:r="http://schemas.openxmlformats.org/officeDocument/2006/relationships" xmlns:a="http://schemas.openxmlformats.org/drawingml/2006/main" xmlns="" val="2949498235"/>
       </p:ext>
     </p:extLst>
   </p:cSld>
@@ -530,7 +983,7 @@
 </file>
 
 <file path=ppt/slideLayouts/slideLayout11.xml><?xml version="1.0" encoding="utf-8"?>
-<p:sldLayout xmlns:a="http://schemas.openxmlformats.org/drawingml/2006/main" xmlns:r="http://schemas.openxmlformats.org/officeDocument/2006/relationships" xmlns:p="http://schemas.openxmlformats.org/presentationml/2006/main" type="vertTitleAndTx" preserve="1">
+<p:sldLayout xmlns:a="http://schemas.openxmlformats.org/drawingml/2006/main" xmlns:r="http://schemas.openxmlformats.org/officeDocument/2006/relationships" xmlns:mc="http://schemas.openxmlformats.org/markup-compatibility/2006" xmlns:mv="urn:schemas-microsoft-com:mac:vml" xmlns:p="http://schemas.openxmlformats.org/presentationml/2006/main" mc:Ignorable="mv" mc:PreserveAttributes="mv:*" type="vertTitleAndTx" preserve="1">
   <p:cSld name="Vertical Title and Text">
     <p:spTree>
       <p:nvGrpSpPr>
@@ -648,7 +1101,8 @@
           <a:p>
             <a:fld id="{6BFECD78-3C8E-49F2-8FAB-59489D168ABB}" type="datetimeFigureOut">
               <a:rPr lang="en-US" smtClean="0"/>
-              <a:t>25/07/2011</a:t>
+              <a:pPr/>
+              <a:t>7/25/11</a:t>
             </a:fld>
             <a:endParaRPr lang="en-US"/>
           </a:p>
@@ -690,6 +1144,7 @@
           <a:p>
             <a:fld id="{0FB56013-B943-42BA-886F-6F9D4EB85E9D}" type="slidenum">
               <a:rPr lang="en-US" smtClean="0"/>
+              <a:pPr/>
               <a:t>‹#›</a:t>
             </a:fld>
             <a:endParaRPr lang="en-US"/>
@@ -699,7 +1154,7 @@
     </p:spTree>
     <p:extLst>
       <p:ext uri="{BB962C8B-B14F-4D97-AF65-F5344CB8AC3E}">
-        <p14:creationId xmlns:p14="http://schemas.microsoft.com/office/powerpoint/2010/main" val="1427941222"/>
+        <p14:creationId xmlns:p14="http://schemas.microsoft.com/office/powerpoint/2010/main" xmlns:p="http://schemas.openxmlformats.org/presentationml/2006/main" xmlns:r="http://schemas.openxmlformats.org/officeDocument/2006/relationships" xmlns:a="http://schemas.openxmlformats.org/drawingml/2006/main" xmlns="" val="1427941222"/>
       </p:ext>
     </p:extLst>
   </p:cSld>
@@ -710,7 +1165,7 @@
 </file>
 
 <file path=ppt/slideLayouts/slideLayout2.xml><?xml version="1.0" encoding="utf-8"?>
-<p:sldLayout xmlns:a="http://schemas.openxmlformats.org/drawingml/2006/main" xmlns:r="http://schemas.openxmlformats.org/officeDocument/2006/relationships" xmlns:p="http://schemas.openxmlformats.org/presentationml/2006/main" type="obj" preserve="1">
+<p:sldLayout xmlns:a="http://schemas.openxmlformats.org/drawingml/2006/main" xmlns:r="http://schemas.openxmlformats.org/officeDocument/2006/relationships" xmlns:mc="http://schemas.openxmlformats.org/markup-compatibility/2006" xmlns:mv="urn:schemas-microsoft-com:mac:vml" xmlns:p="http://schemas.openxmlformats.org/presentationml/2006/main" mc:Ignorable="mv" mc:PreserveAttributes="mv:*" type="obj" preserve="1">
   <p:cSld name="Title and Content">
     <p:spTree>
       <p:nvGrpSpPr>
@@ -818,7 +1273,8 @@
           <a:p>
             <a:fld id="{6BFECD78-3C8E-49F2-8FAB-59489D168ABB}" type="datetimeFigureOut">
               <a:rPr lang="en-US" smtClean="0"/>
-              <a:t>25/07/2011</a:t>
+              <a:pPr/>
+              <a:t>7/25/11</a:t>
             </a:fld>
             <a:endParaRPr lang="en-US"/>
           </a:p>
@@ -860,6 +1316,7 @@
           <a:p>
             <a:fld id="{0FB56013-B943-42BA-886F-6F9D4EB85E9D}" type="slidenum">
               <a:rPr lang="en-US" smtClean="0"/>
+              <a:pPr/>
               <a:t>‹#›</a:t>
             </a:fld>
             <a:endParaRPr lang="en-US"/>
@@ -869,7 +1326,7 @@
     </p:spTree>
     <p:extLst>
       <p:ext uri="{BB962C8B-B14F-4D97-AF65-F5344CB8AC3E}">
-        <p14:creationId xmlns:p14="http://schemas.microsoft.com/office/powerpoint/2010/main" val="2275933374"/>
+        <p14:creationId xmlns:p14="http://schemas.microsoft.com/office/powerpoint/2010/main" xmlns:p="http://schemas.openxmlformats.org/presentationml/2006/main" xmlns:r="http://schemas.openxmlformats.org/officeDocument/2006/relationships" xmlns:a="http://schemas.openxmlformats.org/drawingml/2006/main" xmlns="" val="2275933374"/>
       </p:ext>
     </p:extLst>
   </p:cSld>
@@ -880,7 +1337,7 @@
 </file>
 
 <file path=ppt/slideLayouts/slideLayout3.xml><?xml version="1.0" encoding="utf-8"?>
-<p:sldLayout xmlns:a="http://schemas.openxmlformats.org/drawingml/2006/main" xmlns:r="http://schemas.openxmlformats.org/officeDocument/2006/relationships" xmlns:p="http://schemas.openxmlformats.org/presentationml/2006/main" type="secHead" preserve="1">
+<p:sldLayout xmlns:a="http://schemas.openxmlformats.org/drawingml/2006/main" xmlns:r="http://schemas.openxmlformats.org/officeDocument/2006/relationships" xmlns:mc="http://schemas.openxmlformats.org/markup-compatibility/2006" xmlns:mv="urn:schemas-microsoft-com:mac:vml" xmlns:p="http://schemas.openxmlformats.org/presentationml/2006/main" mc:Ignorable="mv" mc:PreserveAttributes="mv:*" type="secHead" preserve="1">
   <p:cSld name="Section Header">
     <p:spTree>
       <p:nvGrpSpPr>
@@ -1064,7 +1521,8 @@
           <a:p>
             <a:fld id="{6BFECD78-3C8E-49F2-8FAB-59489D168ABB}" type="datetimeFigureOut">
               <a:rPr lang="en-US" smtClean="0"/>
-              <a:t>25/07/2011</a:t>
+              <a:pPr/>
+              <a:t>7/25/11</a:t>
             </a:fld>
             <a:endParaRPr lang="en-US"/>
           </a:p>
@@ -1106,6 +1564,7 @@
           <a:p>
             <a:fld id="{0FB56013-B943-42BA-886F-6F9D4EB85E9D}" type="slidenum">
               <a:rPr lang="en-US" smtClean="0"/>
+              <a:pPr/>
               <a:t>‹#›</a:t>
             </a:fld>
             <a:endParaRPr lang="en-US"/>
@@ -1115,7 +1574,7 @@
     </p:spTree>
     <p:extLst>
       <p:ext uri="{BB962C8B-B14F-4D97-AF65-F5344CB8AC3E}">
-        <p14:creationId xmlns:p14="http://schemas.microsoft.com/office/powerpoint/2010/main" val="1798952600"/>
+        <p14:creationId xmlns:p14="http://schemas.microsoft.com/office/powerpoint/2010/main" xmlns:p="http://schemas.openxmlformats.org/presentationml/2006/main" xmlns:r="http://schemas.openxmlformats.org/officeDocument/2006/relationships" xmlns:a="http://schemas.openxmlformats.org/drawingml/2006/main" xmlns="" val="1798952600"/>
       </p:ext>
     </p:extLst>
   </p:cSld>
@@ -1126,7 +1585,7 @@
 </file>
 
 <file path=ppt/slideLayouts/slideLayout4.xml><?xml version="1.0" encoding="utf-8"?>
-<p:sldLayout xmlns:a="http://schemas.openxmlformats.org/drawingml/2006/main" xmlns:r="http://schemas.openxmlformats.org/officeDocument/2006/relationships" xmlns:p="http://schemas.openxmlformats.org/presentationml/2006/main" type="twoObj" preserve="1">
+<p:sldLayout xmlns:a="http://schemas.openxmlformats.org/drawingml/2006/main" xmlns:r="http://schemas.openxmlformats.org/officeDocument/2006/relationships" xmlns:mc="http://schemas.openxmlformats.org/markup-compatibility/2006" xmlns:mv="urn:schemas-microsoft-com:mac:vml" xmlns:p="http://schemas.openxmlformats.org/presentationml/2006/main" mc:Ignorable="mv" mc:PreserveAttributes="mv:*" type="twoObj" preserve="1">
   <p:cSld name="Two Content">
     <p:spTree>
       <p:nvGrpSpPr>
@@ -1352,7 +1811,8 @@
           <a:p>
             <a:fld id="{6BFECD78-3C8E-49F2-8FAB-59489D168ABB}" type="datetimeFigureOut">
               <a:rPr lang="en-US" smtClean="0"/>
-              <a:t>25/07/2011</a:t>
+              <a:pPr/>
+              <a:t>7/25/11</a:t>
             </a:fld>
             <a:endParaRPr lang="en-US"/>
           </a:p>
@@ -1394,6 +1854,7 @@
           <a:p>
             <a:fld id="{0FB56013-B943-42BA-886F-6F9D4EB85E9D}" type="slidenum">
               <a:rPr lang="en-US" smtClean="0"/>
+              <a:pPr/>
               <a:t>‹#›</a:t>
             </a:fld>
             <a:endParaRPr lang="en-US"/>
@@ -1403,7 +1864,7 @@
     </p:spTree>
     <p:extLst>
       <p:ext uri="{BB962C8B-B14F-4D97-AF65-F5344CB8AC3E}">
-        <p14:creationId xmlns:p14="http://schemas.microsoft.com/office/powerpoint/2010/main" val="1034301619"/>
+        <p14:creationId xmlns:p14="http://schemas.microsoft.com/office/powerpoint/2010/main" xmlns:p="http://schemas.openxmlformats.org/presentationml/2006/main" xmlns:r="http://schemas.openxmlformats.org/officeDocument/2006/relationships" xmlns:a="http://schemas.openxmlformats.org/drawingml/2006/main" xmlns="" val="1034301619"/>
       </p:ext>
     </p:extLst>
   </p:cSld>
@@ -1414,7 +1875,7 @@
 </file>
 
 <file path=ppt/slideLayouts/slideLayout5.xml><?xml version="1.0" encoding="utf-8"?>
-<p:sldLayout xmlns:a="http://schemas.openxmlformats.org/drawingml/2006/main" xmlns:r="http://schemas.openxmlformats.org/officeDocument/2006/relationships" xmlns:p="http://schemas.openxmlformats.org/presentationml/2006/main" type="twoTxTwoObj" preserve="1">
+<p:sldLayout xmlns:a="http://schemas.openxmlformats.org/drawingml/2006/main" xmlns:r="http://schemas.openxmlformats.org/officeDocument/2006/relationships" xmlns:mc="http://schemas.openxmlformats.org/markup-compatibility/2006" xmlns:mv="urn:schemas-microsoft-com:mac:vml" xmlns:p="http://schemas.openxmlformats.org/presentationml/2006/main" mc:Ignorable="mv" mc:PreserveAttributes="mv:*" type="twoTxTwoObj" preserve="1">
   <p:cSld name="Comparison">
     <p:spTree>
       <p:nvGrpSpPr>
@@ -1774,7 +2235,8 @@
           <a:p>
             <a:fld id="{6BFECD78-3C8E-49F2-8FAB-59489D168ABB}" type="datetimeFigureOut">
               <a:rPr lang="en-US" smtClean="0"/>
-              <a:t>25/07/2011</a:t>
+              <a:pPr/>
+              <a:t>7/25/11</a:t>
             </a:fld>
             <a:endParaRPr lang="en-US"/>
           </a:p>
@@ -1816,6 +2278,7 @@
           <a:p>
             <a:fld id="{0FB56013-B943-42BA-886F-6F9D4EB85E9D}" type="slidenum">
               <a:rPr lang="en-US" smtClean="0"/>
+              <a:pPr/>
               <a:t>‹#›</a:t>
             </a:fld>
             <a:endParaRPr lang="en-US"/>
@@ -1825,7 +2288,7 @@
     </p:spTree>
     <p:extLst>
       <p:ext uri="{BB962C8B-B14F-4D97-AF65-F5344CB8AC3E}">
-        <p14:creationId xmlns:p14="http://schemas.microsoft.com/office/powerpoint/2010/main" val="1417940929"/>
+        <p14:creationId xmlns:p14="http://schemas.microsoft.com/office/powerpoint/2010/main" xmlns:p="http://schemas.openxmlformats.org/presentationml/2006/main" xmlns:r="http://schemas.openxmlformats.org/officeDocument/2006/relationships" xmlns:a="http://schemas.openxmlformats.org/drawingml/2006/main" xmlns="" val="1417940929"/>
       </p:ext>
     </p:extLst>
   </p:cSld>
@@ -1836,7 +2299,7 @@
 </file>
 
 <file path=ppt/slideLayouts/slideLayout6.xml><?xml version="1.0" encoding="utf-8"?>
-<p:sldLayout xmlns:a="http://schemas.openxmlformats.org/drawingml/2006/main" xmlns:r="http://schemas.openxmlformats.org/officeDocument/2006/relationships" xmlns:p="http://schemas.openxmlformats.org/presentationml/2006/main" type="titleOnly" preserve="1">
+<p:sldLayout xmlns:a="http://schemas.openxmlformats.org/drawingml/2006/main" xmlns:r="http://schemas.openxmlformats.org/officeDocument/2006/relationships" xmlns:mc="http://schemas.openxmlformats.org/markup-compatibility/2006" xmlns:mv="urn:schemas-microsoft-com:mac:vml" xmlns:p="http://schemas.openxmlformats.org/presentationml/2006/main" mc:Ignorable="mv" mc:PreserveAttributes="mv:*" type="titleOnly" preserve="1">
   <p:cSld name="Title Only">
     <p:spTree>
       <p:nvGrpSpPr>
@@ -1892,7 +2355,8 @@
           <a:p>
             <a:fld id="{6BFECD78-3C8E-49F2-8FAB-59489D168ABB}" type="datetimeFigureOut">
               <a:rPr lang="en-US" smtClean="0"/>
-              <a:t>25/07/2011</a:t>
+              <a:pPr/>
+              <a:t>7/25/11</a:t>
             </a:fld>
             <a:endParaRPr lang="en-US"/>
           </a:p>
@@ -1934,6 +2398,7 @@
           <a:p>
             <a:fld id="{0FB56013-B943-42BA-886F-6F9D4EB85E9D}" type="slidenum">
               <a:rPr lang="en-US" smtClean="0"/>
+              <a:pPr/>
               <a:t>‹#›</a:t>
             </a:fld>
             <a:endParaRPr lang="en-US"/>
@@ -1943,7 +2408,7 @@
     </p:spTree>
     <p:extLst>
       <p:ext uri="{BB962C8B-B14F-4D97-AF65-F5344CB8AC3E}">
-        <p14:creationId xmlns:p14="http://schemas.microsoft.com/office/powerpoint/2010/main" val="656067729"/>
+        <p14:creationId xmlns:p14="http://schemas.microsoft.com/office/powerpoint/2010/main" xmlns:p="http://schemas.openxmlformats.org/presentationml/2006/main" xmlns:r="http://schemas.openxmlformats.org/officeDocument/2006/relationships" xmlns:a="http://schemas.openxmlformats.org/drawingml/2006/main" xmlns="" val="656067729"/>
       </p:ext>
     </p:extLst>
   </p:cSld>
@@ -1954,7 +2419,7 @@
 </file>
 
 <file path=ppt/slideLayouts/slideLayout7.xml><?xml version="1.0" encoding="utf-8"?>
-<p:sldLayout xmlns:a="http://schemas.openxmlformats.org/drawingml/2006/main" xmlns:r="http://schemas.openxmlformats.org/officeDocument/2006/relationships" xmlns:p="http://schemas.openxmlformats.org/presentationml/2006/main" type="blank" preserve="1">
+<p:sldLayout xmlns:a="http://schemas.openxmlformats.org/drawingml/2006/main" xmlns:r="http://schemas.openxmlformats.org/officeDocument/2006/relationships" xmlns:mc="http://schemas.openxmlformats.org/markup-compatibility/2006" xmlns:mv="urn:schemas-microsoft-com:mac:vml" xmlns:p="http://schemas.openxmlformats.org/presentationml/2006/main" mc:Ignorable="mv" mc:PreserveAttributes="mv:*" type="blank" preserve="1">
   <p:cSld name="Blank">
     <p:spTree>
       <p:nvGrpSpPr>
@@ -1987,7 +2452,8 @@
           <a:p>
             <a:fld id="{6BFECD78-3C8E-49F2-8FAB-59489D168ABB}" type="datetimeFigureOut">
               <a:rPr lang="en-US" smtClean="0"/>
-              <a:t>25/07/2011</a:t>
+              <a:pPr/>
+              <a:t>7/25/11</a:t>
             </a:fld>
             <a:endParaRPr lang="en-US"/>
           </a:p>
@@ -2029,6 +2495,7 @@
           <a:p>
             <a:fld id="{0FB56013-B943-42BA-886F-6F9D4EB85E9D}" type="slidenum">
               <a:rPr lang="en-US" smtClean="0"/>
+              <a:pPr/>
               <a:t>‹#›</a:t>
             </a:fld>
             <a:endParaRPr lang="en-US"/>
@@ -2038,7 +2505,7 @@
     </p:spTree>
     <p:extLst>
       <p:ext uri="{BB962C8B-B14F-4D97-AF65-F5344CB8AC3E}">
-        <p14:creationId xmlns:p14="http://schemas.microsoft.com/office/powerpoint/2010/main" val="1249128790"/>
+        <p14:creationId xmlns:p14="http://schemas.microsoft.com/office/powerpoint/2010/main" xmlns:p="http://schemas.openxmlformats.org/presentationml/2006/main" xmlns:r="http://schemas.openxmlformats.org/officeDocument/2006/relationships" xmlns:a="http://schemas.openxmlformats.org/drawingml/2006/main" xmlns="" val="1249128790"/>
       </p:ext>
     </p:extLst>
   </p:cSld>
@@ -2049,7 +2516,7 @@
 </file>
 
 <file path=ppt/slideLayouts/slideLayout8.xml><?xml version="1.0" encoding="utf-8"?>
-<p:sldLayout xmlns:a="http://schemas.openxmlformats.org/drawingml/2006/main" xmlns:r="http://schemas.openxmlformats.org/officeDocument/2006/relationships" xmlns:p="http://schemas.openxmlformats.org/presentationml/2006/main" type="objTx" preserve="1">
+<p:sldLayout xmlns:a="http://schemas.openxmlformats.org/drawingml/2006/main" xmlns:r="http://schemas.openxmlformats.org/officeDocument/2006/relationships" xmlns:mc="http://schemas.openxmlformats.org/markup-compatibility/2006" xmlns:mv="urn:schemas-microsoft-com:mac:vml" xmlns:p="http://schemas.openxmlformats.org/presentationml/2006/main" mc:Ignorable="mv" mc:PreserveAttributes="mv:*" type="objTx" preserve="1">
   <p:cSld name="Content with Caption">
     <p:spTree>
       <p:nvGrpSpPr>
@@ -2264,7 +2731,8 @@
           <a:p>
             <a:fld id="{6BFECD78-3C8E-49F2-8FAB-59489D168ABB}" type="datetimeFigureOut">
               <a:rPr lang="en-US" smtClean="0"/>
-              <a:t>25/07/2011</a:t>
+              <a:pPr/>
+              <a:t>7/25/11</a:t>
             </a:fld>
             <a:endParaRPr lang="en-US"/>
           </a:p>
@@ -2306,6 +2774,7 @@
           <a:p>
             <a:fld id="{0FB56013-B943-42BA-886F-6F9D4EB85E9D}" type="slidenum">
               <a:rPr lang="en-US" smtClean="0"/>
+              <a:pPr/>
               <a:t>‹#›</a:t>
             </a:fld>
             <a:endParaRPr lang="en-US"/>
@@ -2315,7 +2784,7 @@
     </p:spTree>
     <p:extLst>
       <p:ext uri="{BB962C8B-B14F-4D97-AF65-F5344CB8AC3E}">
-        <p14:creationId xmlns:p14="http://schemas.microsoft.com/office/powerpoint/2010/main" val="2730116199"/>
+        <p14:creationId xmlns:p14="http://schemas.microsoft.com/office/powerpoint/2010/main" xmlns:p="http://schemas.openxmlformats.org/presentationml/2006/main" xmlns:r="http://schemas.openxmlformats.org/officeDocument/2006/relationships" xmlns:a="http://schemas.openxmlformats.org/drawingml/2006/main" xmlns="" val="2730116199"/>
       </p:ext>
     </p:extLst>
   </p:cSld>
@@ -2326,7 +2795,7 @@
 </file>
 
 <file path=ppt/slideLayouts/slideLayout9.xml><?xml version="1.0" encoding="utf-8"?>
-<p:sldLayout xmlns:a="http://schemas.openxmlformats.org/drawingml/2006/main" xmlns:r="http://schemas.openxmlformats.org/officeDocument/2006/relationships" xmlns:p="http://schemas.openxmlformats.org/presentationml/2006/main" type="picTx" preserve="1">
+<p:sldLayout xmlns:a="http://schemas.openxmlformats.org/drawingml/2006/main" xmlns:r="http://schemas.openxmlformats.org/officeDocument/2006/relationships" xmlns:mc="http://schemas.openxmlformats.org/markup-compatibility/2006" xmlns:mv="urn:schemas-microsoft-com:mac:vml" xmlns:p="http://schemas.openxmlformats.org/presentationml/2006/main" mc:Ignorable="mv" mc:PreserveAttributes="mv:*" type="picTx" preserve="1">
   <p:cSld name="Picture with Caption">
     <p:spTree>
       <p:nvGrpSpPr>
@@ -2521,7 +2990,8 @@
           <a:p>
             <a:fld id="{6BFECD78-3C8E-49F2-8FAB-59489D168ABB}" type="datetimeFigureOut">
               <a:rPr lang="en-US" smtClean="0"/>
-              <a:t>25/07/2011</a:t>
+              <a:pPr/>
+              <a:t>7/25/11</a:t>
             </a:fld>
             <a:endParaRPr lang="en-US"/>
           </a:p>
@@ -2563,6 +3033,7 @@
           <a:p>
             <a:fld id="{0FB56013-B943-42BA-886F-6F9D4EB85E9D}" type="slidenum">
               <a:rPr lang="en-US" smtClean="0"/>
+              <a:pPr/>
               <a:t>‹#›</a:t>
             </a:fld>
             <a:endParaRPr lang="en-US"/>
@@ -2572,7 +3043,7 @@
     </p:spTree>
     <p:extLst>
       <p:ext uri="{BB962C8B-B14F-4D97-AF65-F5344CB8AC3E}">
-        <p14:creationId xmlns:p14="http://schemas.microsoft.com/office/powerpoint/2010/main" val="506574558"/>
+        <p14:creationId xmlns:p14="http://schemas.microsoft.com/office/powerpoint/2010/main" xmlns:p="http://schemas.openxmlformats.org/presentationml/2006/main" xmlns:r="http://schemas.openxmlformats.org/officeDocument/2006/relationships" xmlns:a="http://schemas.openxmlformats.org/drawingml/2006/main" xmlns="" val="506574558"/>
       </p:ext>
     </p:extLst>
   </p:cSld>
@@ -2583,7 +3054,7 @@
 </file>
 
 <file path=ppt/slideMasters/slideMaster1.xml><?xml version="1.0" encoding="utf-8"?>
-<p:sldMaster xmlns:a="http://schemas.openxmlformats.org/drawingml/2006/main" xmlns:r="http://schemas.openxmlformats.org/officeDocument/2006/relationships" xmlns:p="http://schemas.openxmlformats.org/presentationml/2006/main">
+<p:sldMaster xmlns:a="http://schemas.openxmlformats.org/drawingml/2006/main" xmlns:r="http://schemas.openxmlformats.org/officeDocument/2006/relationships" xmlns:mc="http://schemas.openxmlformats.org/markup-compatibility/2006" xmlns:mv="urn:schemas-microsoft-com:mac:vml" xmlns:p="http://schemas.openxmlformats.org/presentationml/2006/main" mc:Ignorable="mv" mc:PreserveAttributes="mv:*">
   <p:cSld>
     <p:bg>
       <p:bgRef idx="1001">
@@ -2734,7 +3205,8 @@
           <a:p>
             <a:fld id="{6BFECD78-3C8E-49F2-8FAB-59489D168ABB}" type="datetimeFigureOut">
               <a:rPr lang="en-US" smtClean="0"/>
-              <a:t>25/07/2011</a:t>
+              <a:pPr/>
+              <a:t>7/25/11</a:t>
             </a:fld>
             <a:endParaRPr lang="en-US"/>
           </a:p>
@@ -2812,53 +3284,17 @@
           <a:p>
             <a:fld id="{0FB56013-B943-42BA-886F-6F9D4EB85E9D}" type="slidenum">
               <a:rPr lang="en-US" smtClean="0"/>
+              <a:pPr/>
               <a:t>‹#›</a:t>
             </a:fld>
             <a:endParaRPr lang="en-US"/>
           </a:p>
         </p:txBody>
       </p:sp>
-      <p:pic>
-        <p:nvPicPr>
-          <p:cNvPr id="7" name="Picture 8"/>
-          <p:cNvPicPr>
-            <a:picLocks noChangeAspect="1"/>
-          </p:cNvPicPr>
-          <p:nvPr userDrawn="1"/>
-        </p:nvPicPr>
-        <p:blipFill>
-          <a:blip r:embed="rId13">
-            <a:extLst>
-              <a:ext uri="{28A0092B-C50C-407E-A947-70E740481C1C}">
-                <a14:useLocalDpi xmlns:a14="http://schemas.microsoft.com/office/drawing/2010/main" val="0"/>
-              </a:ext>
-            </a:extLst>
-          </a:blip>
-          <a:stretch>
-            <a:fillRect/>
-          </a:stretch>
-        </p:blipFill>
-        <p:spPr bwMode="auto">
-          <a:xfrm>
-            <a:off x="0" y="6324600"/>
-            <a:ext cx="9143391" cy="536412"/>
-          </a:xfrm>
-          <a:prstGeom prst="rect">
-            <a:avLst/>
-          </a:prstGeom>
-          <a:noFill/>
-          <a:ln w="9525">
-            <a:noFill/>
-            <a:miter lim="800000"/>
-            <a:headEnd/>
-            <a:tailEnd/>
-          </a:ln>
-        </p:spPr>
-      </p:pic>
     </p:spTree>
     <p:extLst>
       <p:ext uri="{BB962C8B-B14F-4D97-AF65-F5344CB8AC3E}">
-        <p14:creationId xmlns:p14="http://schemas.microsoft.com/office/powerpoint/2010/main" val="2557711237"/>
+        <p14:creationId xmlns:p14="http://schemas.microsoft.com/office/powerpoint/2010/main" xmlns:p="http://schemas.openxmlformats.org/presentationml/2006/main" xmlns:r="http://schemas.openxmlformats.org/officeDocument/2006/relationships" xmlns:a="http://schemas.openxmlformats.org/drawingml/2006/main" xmlns="" val="2557711237"/>
       </p:ext>
     </p:extLst>
   </p:cSld>
@@ -3130,7 +3566,7 @@
 </file>
 
 <file path=ppt/slides/slide1.xml><?xml version="1.0" encoding="utf-8"?>
-<p:sld xmlns:a="http://schemas.openxmlformats.org/drawingml/2006/main" xmlns:r="http://schemas.openxmlformats.org/officeDocument/2006/relationships" xmlns:p="http://schemas.openxmlformats.org/presentationml/2006/main">
+<p:sld xmlns:a="http://schemas.openxmlformats.org/drawingml/2006/main" xmlns:r="http://schemas.openxmlformats.org/officeDocument/2006/relationships" xmlns:mc="http://schemas.openxmlformats.org/markup-compatibility/2006" xmlns:mv="urn:schemas-microsoft-com:mac:vml" xmlns:p="http://schemas.openxmlformats.org/presentationml/2006/main" mc:Ignorable="mv" mc:PreserveAttributes="mv:*">
   <p:cSld>
     <p:spTree>
       <p:nvGrpSpPr>
@@ -3249,7 +3685,7 @@
         </p:nvSpPr>
         <p:spPr>
           <a:xfrm>
-            <a:off x="1371600" y="5553079"/>
+            <a:off x="1371600" y="5849040"/>
             <a:ext cx="6400800" cy="981745"/>
           </a:xfrm>
         </p:spPr>
@@ -3281,7 +3717,7 @@
         </p:blipFill>
         <p:spPr>
           <a:xfrm>
-            <a:off x="8026400" y="6437085"/>
+            <a:off x="0" y="6463122"/>
             <a:ext cx="1117600" cy="393700"/>
           </a:xfrm>
           <a:prstGeom prst="rect">
@@ -3301,7 +3737,7 @@
           <a:blip r:embed="rId3">
             <a:extLst>
               <a:ext uri="{28A0092B-C50C-407E-A947-70E740481C1C}">
-                <a14:useLocalDpi xmlns:a14="http://schemas.microsoft.com/office/drawing/2010/main" val="0"/>
+                <a14:useLocalDpi xmlns:a14="http://schemas.microsoft.com/office/drawing/2010/main" xmlns:p="http://schemas.openxmlformats.org/presentationml/2006/main" xmlns:r="http://schemas.openxmlformats.org/officeDocument/2006/relationships" xmlns:a="http://schemas.openxmlformats.org/drawingml/2006/main" xmlns="" val="0"/>
               </a:ext>
             </a:extLst>
           </a:blip>
@@ -3312,7 +3748,7 @@
         </p:blipFill>
         <p:spPr bwMode="auto">
           <a:xfrm>
-            <a:off x="8362603" y="0"/>
+            <a:off x="9922" y="0"/>
             <a:ext cx="781397" cy="765166"/>
           </a:xfrm>
           <a:prstGeom prst="rect">
@@ -3324,14 +3760,14 @@
           </a:ln>
           <a:extLst>
             <a:ext uri="{909E8E84-426E-40dd-AFC4-6F175D3DCCD1}">
-              <a14:hiddenFill xmlns:a14="http://schemas.microsoft.com/office/drawing/2010/main">
+              <a14:hiddenFill xmlns:a14="http://schemas.microsoft.com/office/drawing/2010/main" xmlns:p="http://schemas.openxmlformats.org/presentationml/2006/main" xmlns:r="http://schemas.openxmlformats.org/officeDocument/2006/relationships" xmlns:a="http://schemas.openxmlformats.org/drawingml/2006/main" xmlns="">
                 <a:solidFill>
                   <a:srgbClr val="FFFFFF"/>
                 </a:solidFill>
               </a14:hiddenFill>
             </a:ext>
             <a:ext uri="{91240B29-F687-4f45-9708-019B960494DF}">
-              <a14:hiddenLine xmlns:a14="http://schemas.microsoft.com/office/drawing/2010/main" w="9525">
+              <a14:hiddenLine xmlns:a14="http://schemas.microsoft.com/office/drawing/2010/main" xmlns:p="http://schemas.openxmlformats.org/presentationml/2006/main" xmlns:r="http://schemas.openxmlformats.org/officeDocument/2006/relationships" xmlns:a="http://schemas.openxmlformats.org/drawingml/2006/main" xmlns="" w="9525">
                 <a:solidFill>
                   <a:srgbClr val="000000"/>
                 </a:solidFill>
@@ -3353,7 +3789,7 @@
         </p:nvSpPr>
         <p:spPr bwMode="auto">
           <a:xfrm>
-            <a:off x="3274964" y="4537416"/>
+            <a:off x="939004" y="4537416"/>
             <a:ext cx="2890657" cy="1015663"/>
           </a:xfrm>
           <a:prstGeom prst="rect">
@@ -3365,14 +3801,14 @@
           </a:ln>
           <a:extLst>
             <a:ext uri="{909E8E84-426E-40dd-AFC4-6F175D3DCCD1}">
-              <a14:hiddenFill xmlns:a14="http://schemas.microsoft.com/office/drawing/2010/main">
+              <a14:hiddenFill xmlns:a14="http://schemas.microsoft.com/office/drawing/2010/main" xmlns:p="http://schemas.openxmlformats.org/presentationml/2006/main" xmlns:r="http://schemas.openxmlformats.org/officeDocument/2006/relationships" xmlns:a="http://schemas.openxmlformats.org/drawingml/2006/main" xmlns="">
                 <a:solidFill>
                   <a:srgbClr val="FFFFFF"/>
                 </a:solidFill>
               </a14:hiddenFill>
             </a:ext>
             <a:ext uri="{91240B29-F687-4f45-9708-019B960494DF}">
-              <a14:hiddenLine xmlns:a14="http://schemas.microsoft.com/office/drawing/2010/main" w="9525">
+              <a14:hiddenLine xmlns:a14="http://schemas.microsoft.com/office/drawing/2010/main" xmlns:p="http://schemas.openxmlformats.org/presentationml/2006/main" xmlns:r="http://schemas.openxmlformats.org/officeDocument/2006/relationships" xmlns:a="http://schemas.openxmlformats.org/drawingml/2006/main" xmlns="" w="9525">
                 <a:solidFill>
                   <a:srgbClr val="000000"/>
                 </a:solidFill>
@@ -3439,10 +3875,113 @@
           </a:p>
         </p:txBody>
       </p:sp>
+      <p:sp>
+        <p:nvSpPr>
+          <p:cNvPr id="7" name="Rectangle 6"/>
+          <p:cNvSpPr>
+            <a:spLocks noChangeArrowheads="1"/>
+          </p:cNvSpPr>
+          <p:nvPr/>
+        </p:nvSpPr>
+        <p:spPr bwMode="auto">
+          <a:xfrm>
+            <a:off x="5804455" y="4537416"/>
+            <a:ext cx="2890657" cy="707886"/>
+          </a:xfrm>
+          <a:prstGeom prst="rect">
+            <a:avLst/>
+          </a:prstGeom>
+          <a:noFill/>
+          <a:ln>
+            <a:noFill/>
+          </a:ln>
+          <a:extLst>
+            <a:ext uri="{909E8E84-426E-40dd-AFC4-6F175D3DCCD1}">
+              <a14:hiddenFill xmlns:a14="http://schemas.microsoft.com/office/drawing/2010/main" xmlns:p="http://schemas.openxmlformats.org/presentationml/2006/main" xmlns:r="http://schemas.openxmlformats.org/officeDocument/2006/relationships" xmlns:a="http://schemas.openxmlformats.org/drawingml/2006/main" xmlns="">
+                <a:solidFill>
+                  <a:srgbClr val="FFFFFF"/>
+                </a:solidFill>
+              </a14:hiddenFill>
+            </a:ext>
+            <a:ext uri="{91240B29-F687-4f45-9708-019B960494DF}">
+              <a14:hiddenLine xmlns:a14="http://schemas.microsoft.com/office/drawing/2010/main" xmlns:p="http://schemas.openxmlformats.org/presentationml/2006/main" xmlns:r="http://schemas.openxmlformats.org/officeDocument/2006/relationships" xmlns:a="http://schemas.openxmlformats.org/drawingml/2006/main" xmlns="" w="9525">
+                <a:solidFill>
+                  <a:srgbClr val="000000"/>
+                </a:solidFill>
+                <a:miter lim="800000"/>
+                <a:headEnd/>
+                <a:tailEnd/>
+              </a14:hiddenLine>
+            </a:ext>
+          </a:extLst>
+        </p:spPr>
+        <p:txBody>
+          <a:bodyPr wrap="square">
+            <a:spAutoFit/>
+          </a:bodyPr>
+          <a:lstStyle/>
+          <a:p>
+            <a:r>
+              <a:rPr lang="en-US" sz="2000" dirty="0" smtClean="0">
+                <a:latin typeface="Gill Sans" charset="0"/>
+                <a:cs typeface="Gill Sans" charset="0"/>
+              </a:rPr>
+              <a:t>Carlo  Torniai</a:t>
+            </a:r>
+          </a:p>
+          <a:p>
+            <a:r>
+              <a:rPr lang="en-US" sz="2000" dirty="0" err="1" smtClean="0">
+                <a:latin typeface="Gill Sans" charset="0"/>
+                <a:cs typeface="Gill Sans" charset="0"/>
+              </a:rPr>
+              <a:t>torniai@ohsu.edu</a:t>
+            </a:r>
+            <a:endParaRPr lang="en-US" sz="2000" dirty="0" smtClean="0">
+              <a:latin typeface="Gill Sans" charset="0"/>
+              <a:cs typeface="Gill Sans" charset="0"/>
+            </a:endParaRPr>
+          </a:p>
+        </p:txBody>
+      </p:sp>
+      <p:pic>
+        <p:nvPicPr>
+          <p:cNvPr id="8" name="Picture 2" descr="H:\Eagle-i\Office\OHSU Library Logo.transparent.tif"/>
+          <p:cNvPicPr>
+            <a:picLocks noChangeAspect="1" noChangeArrowheads="1"/>
+          </p:cNvPicPr>
+          <p:nvPr/>
+        </p:nvPicPr>
+        <p:blipFill>
+          <a:blip r:embed="rId4"/>
+          <a:srcRect/>
+          <a:stretch>
+            <a:fillRect/>
+          </a:stretch>
+        </p:blipFill>
+        <p:spPr bwMode="auto">
+          <a:xfrm>
+            <a:off x="8261350" y="-3234"/>
+            <a:ext cx="882650" cy="735012"/>
+          </a:xfrm>
+          <a:prstGeom prst="rect">
+            <a:avLst/>
+          </a:prstGeom>
+          <a:solidFill>
+            <a:schemeClr val="tx1"/>
+          </a:solidFill>
+          <a:ln w="9525">
+            <a:noFill/>
+            <a:miter lim="800000"/>
+            <a:headEnd/>
+            <a:tailEnd/>
+          </a:ln>
+        </p:spPr>
+      </p:pic>
     </p:spTree>
     <p:extLst>
       <p:ext uri="{BB962C8B-B14F-4D97-AF65-F5344CB8AC3E}">
-        <p14:creationId xmlns:p14="http://schemas.microsoft.com/office/powerpoint/2010/main" val="1786189684"/>
+        <p14:creationId xmlns:p14="http://schemas.microsoft.com/office/powerpoint/2010/main" xmlns:p="http://schemas.openxmlformats.org/presentationml/2006/main" xmlns:r="http://schemas.openxmlformats.org/officeDocument/2006/relationships" xmlns:a="http://schemas.openxmlformats.org/drawingml/2006/main" xmlns="" val="1786189684"/>
       </p:ext>
     </p:extLst>
   </p:cSld>
@@ -3452,7 +3991,7 @@
   <p:timing>
     <p:tnLst>
       <p:par>
-        <p:cTn xmlns:p14="http://schemas.microsoft.com/office/powerpoint/2010/main" id="1" dur="indefinite" restart="never" nodeType="tmRoot"/>
+        <p:cTn id="1" dur="indefinite" restart="never" nodeType="tmRoot"/>
       </p:par>
     </p:tnLst>
   </p:timing>
@@ -3460,7 +3999,7 @@
 </file>
 
 <file path=ppt/slides/slide10.xml><?xml version="1.0" encoding="utf-8"?>
-<p:sld xmlns:a="http://schemas.openxmlformats.org/drawingml/2006/main" xmlns:r="http://schemas.openxmlformats.org/officeDocument/2006/relationships" xmlns:p="http://schemas.openxmlformats.org/presentationml/2006/main">
+<p:sld xmlns:a="http://schemas.openxmlformats.org/drawingml/2006/main" xmlns:r="http://schemas.openxmlformats.org/officeDocument/2006/relationships" xmlns:mc="http://schemas.openxmlformats.org/markup-compatibility/2006" xmlns:mv="urn:schemas-microsoft-com:mac:vml" xmlns:p="http://schemas.openxmlformats.org/presentationml/2006/main" mc:Ignorable="mv" mc:PreserveAttributes="mv:*">
   <p:cSld>
     <p:spTree>
       <p:nvGrpSpPr>
@@ -3518,15 +4057,15 @@
           <a:p>
             <a:r>
               <a:rPr lang="en-GB" dirty="0" smtClean="0"/>
-              <a:t>Automatic Import via </a:t>
-            </a:r>
-            <a:r>
-              <a:rPr lang="en-GB" dirty="0" err="1" smtClean="0"/>
-              <a:t>mireot</a:t>
+              <a:t>Automatic Import via</a:t>
             </a:r>
             <a:r>
               <a:rPr lang="en-GB" dirty="0" smtClean="0"/>
-              <a:t> mechanism of external and </a:t>
+              <a:t> MIREOT mechanism </a:t>
+            </a:r>
+            <a:r>
+              <a:rPr lang="en-GB" dirty="0" smtClean="0"/>
+              <a:t>of external and </a:t>
             </a:r>
             <a:r>
               <a:rPr lang="en-GB" dirty="0" err="1" smtClean="0"/>
@@ -3590,7 +4129,7 @@
     </p:spTree>
     <p:extLst>
       <p:ext uri="{BB962C8B-B14F-4D97-AF65-F5344CB8AC3E}">
-        <p14:creationId xmlns:p14="http://schemas.microsoft.com/office/powerpoint/2010/main" val="4235520220"/>
+        <p14:creationId xmlns:p14="http://schemas.microsoft.com/office/powerpoint/2010/main" xmlns:p="http://schemas.openxmlformats.org/presentationml/2006/main" xmlns:r="http://schemas.openxmlformats.org/officeDocument/2006/relationships" xmlns:a="http://schemas.openxmlformats.org/drawingml/2006/main" xmlns="" val="4235520220"/>
       </p:ext>
     </p:extLst>
   </p:cSld>
@@ -3600,7 +4139,7 @@
   <p:timing>
     <p:tnLst>
       <p:par>
-        <p:cTn xmlns:p14="http://schemas.microsoft.com/office/powerpoint/2010/main" id="1" dur="indefinite" restart="never" nodeType="tmRoot"/>
+        <p:cTn id="1" dur="indefinite" restart="never" nodeType="tmRoot"/>
       </p:par>
     </p:tnLst>
   </p:timing>
@@ -3608,7 +4147,7 @@
 </file>
 
 <file path=ppt/slides/slide11.xml><?xml version="1.0" encoding="utf-8"?>
-<p:sld xmlns:a="http://schemas.openxmlformats.org/drawingml/2006/main" xmlns:r="http://schemas.openxmlformats.org/officeDocument/2006/relationships" xmlns:p="http://schemas.openxmlformats.org/presentationml/2006/main">
+<p:sld xmlns:a="http://schemas.openxmlformats.org/drawingml/2006/main" xmlns:r="http://schemas.openxmlformats.org/officeDocument/2006/relationships" xmlns:mc="http://schemas.openxmlformats.org/markup-compatibility/2006" xmlns:mv="urn:schemas-microsoft-com:mac:vml" xmlns:p="http://schemas.openxmlformats.org/presentationml/2006/main" mc:Ignorable="mv" mc:PreserveAttributes="mv:*">
   <p:cSld>
     <p:spTree>
       <p:nvGrpSpPr>
@@ -3911,7 +4450,7 @@
     </p:spTree>
     <p:extLst>
       <p:ext uri="{BB962C8B-B14F-4D97-AF65-F5344CB8AC3E}">
-        <p14:creationId xmlns:p14="http://schemas.microsoft.com/office/powerpoint/2010/main" val="438439939"/>
+        <p14:creationId xmlns:p14="http://schemas.microsoft.com/office/powerpoint/2010/main" xmlns:p="http://schemas.openxmlformats.org/presentationml/2006/main" xmlns:r="http://schemas.openxmlformats.org/officeDocument/2006/relationships" xmlns:a="http://schemas.openxmlformats.org/drawingml/2006/main" xmlns="" val="438439939"/>
       </p:ext>
     </p:extLst>
   </p:cSld>
@@ -3921,7 +4460,7 @@
   <p:timing>
     <p:tnLst>
       <p:par>
-        <p:cTn xmlns:p14="http://schemas.microsoft.com/office/powerpoint/2010/main" id="1" dur="indefinite" restart="never" nodeType="tmRoot"/>
+        <p:cTn id="1" dur="indefinite" restart="never" nodeType="tmRoot"/>
       </p:par>
     </p:tnLst>
   </p:timing>
@@ -3929,7 +4468,7 @@
 </file>
 
 <file path=ppt/slides/slide2.xml><?xml version="1.0" encoding="utf-8"?>
-<p:sld xmlns:a="http://schemas.openxmlformats.org/drawingml/2006/main" xmlns:r="http://schemas.openxmlformats.org/officeDocument/2006/relationships" xmlns:p="http://schemas.openxmlformats.org/presentationml/2006/main">
+<p:sld xmlns:a="http://schemas.openxmlformats.org/drawingml/2006/main" xmlns:r="http://schemas.openxmlformats.org/officeDocument/2006/relationships" xmlns:mc="http://schemas.openxmlformats.org/markup-compatibility/2006" xmlns:mv="urn:schemas-microsoft-com:mac:vml" xmlns:p="http://schemas.openxmlformats.org/presentationml/2006/main" mc:Ignorable="mv" mc:PreserveAttributes="mv:*">
   <p:cSld>
     <p:spTree>
       <p:nvGrpSpPr>
@@ -4029,7 +4568,7 @@
     </p:spTree>
     <p:extLst>
       <p:ext uri="{BB962C8B-B14F-4D97-AF65-F5344CB8AC3E}">
-        <p14:creationId xmlns:p14="http://schemas.microsoft.com/office/powerpoint/2010/main" val="762393035"/>
+        <p14:creationId xmlns:p14="http://schemas.microsoft.com/office/powerpoint/2010/main" xmlns:p="http://schemas.openxmlformats.org/presentationml/2006/main" xmlns:r="http://schemas.openxmlformats.org/officeDocument/2006/relationships" xmlns:a="http://schemas.openxmlformats.org/drawingml/2006/main" xmlns="" val="762393035"/>
       </p:ext>
     </p:extLst>
   </p:cSld>
@@ -4039,7 +4578,7 @@
   <p:timing>
     <p:tnLst>
       <p:par>
-        <p:cTn xmlns:p14="http://schemas.microsoft.com/office/powerpoint/2010/main" id="1" dur="indefinite" restart="never" nodeType="tmRoot"/>
+        <p:cTn id="1" dur="indefinite" restart="never" nodeType="tmRoot"/>
       </p:par>
     </p:tnLst>
   </p:timing>
@@ -4047,7 +4586,7 @@
 </file>
 
 <file path=ppt/slides/slide3.xml><?xml version="1.0" encoding="utf-8"?>
-<p:sld xmlns:a="http://schemas.openxmlformats.org/drawingml/2006/main" xmlns:r="http://schemas.openxmlformats.org/officeDocument/2006/relationships" xmlns:p="http://schemas.openxmlformats.org/presentationml/2006/main">
+<p:sld xmlns:a="http://schemas.openxmlformats.org/drawingml/2006/main" xmlns:r="http://schemas.openxmlformats.org/officeDocument/2006/relationships" xmlns:mc="http://schemas.openxmlformats.org/markup-compatibility/2006" xmlns:mv="urn:schemas-microsoft-com:mac:vml" xmlns:p="http://schemas.openxmlformats.org/presentationml/2006/main" mc:Ignorable="mv" mc:PreserveAttributes="mv:*">
   <p:cSld>
     <p:spTree>
       <p:nvGrpSpPr>
@@ -4208,7 +4747,7 @@
     </p:spTree>
     <p:extLst>
       <p:ext uri="{BB962C8B-B14F-4D97-AF65-F5344CB8AC3E}">
-        <p14:creationId xmlns:p14="http://schemas.microsoft.com/office/powerpoint/2010/main" val="1823721742"/>
+        <p14:creationId xmlns:p14="http://schemas.microsoft.com/office/powerpoint/2010/main" xmlns:p="http://schemas.openxmlformats.org/presentationml/2006/main" xmlns:r="http://schemas.openxmlformats.org/officeDocument/2006/relationships" xmlns:a="http://schemas.openxmlformats.org/drawingml/2006/main" xmlns="" val="1823721742"/>
       </p:ext>
     </p:extLst>
   </p:cSld>
@@ -4218,7 +4757,7 @@
   <p:timing>
     <p:tnLst>
       <p:par>
-        <p:cTn xmlns:p14="http://schemas.microsoft.com/office/powerpoint/2010/main" id="1" dur="indefinite" restart="never" nodeType="tmRoot"/>
+        <p:cTn id="1" dur="indefinite" restart="never" nodeType="tmRoot"/>
       </p:par>
     </p:tnLst>
   </p:timing>
@@ -4226,7 +4765,7 @@
 </file>
 
 <file path=ppt/slides/slide4.xml><?xml version="1.0" encoding="utf-8"?>
-<p:sld xmlns:a="http://schemas.openxmlformats.org/drawingml/2006/main" xmlns:r="http://schemas.openxmlformats.org/officeDocument/2006/relationships" xmlns:p="http://schemas.openxmlformats.org/presentationml/2006/main">
+<p:sld xmlns:a="http://schemas.openxmlformats.org/drawingml/2006/main" xmlns:r="http://schemas.openxmlformats.org/officeDocument/2006/relationships" xmlns:mc="http://schemas.openxmlformats.org/markup-compatibility/2006" xmlns:mv="urn:schemas-microsoft-com:mac:vml" xmlns:p="http://schemas.openxmlformats.org/presentationml/2006/main" mc:Ignorable="mv" mc:PreserveAttributes="mv:*">
   <p:cSld>
     <p:spTree>
       <p:nvGrpSpPr>
@@ -4284,7 +4823,7 @@
           <a:blip r:embed="rId2">
             <a:extLst>
               <a:ext uri="{28A0092B-C50C-407E-A947-70E740481C1C}">
-                <a14:useLocalDpi xmlns:a14="http://schemas.microsoft.com/office/drawing/2010/main" val="0"/>
+                <a14:useLocalDpi xmlns:a14="http://schemas.microsoft.com/office/drawing/2010/main" xmlns:p="http://schemas.openxmlformats.org/presentationml/2006/main" xmlns:r="http://schemas.openxmlformats.org/officeDocument/2006/relationships" xmlns:a="http://schemas.openxmlformats.org/drawingml/2006/main" xmlns="" val="0"/>
               </a:ext>
             </a:extLst>
           </a:blip>
@@ -4304,7 +4843,7 @@
     </p:spTree>
     <p:extLst>
       <p:ext uri="{BB962C8B-B14F-4D97-AF65-F5344CB8AC3E}">
-        <p14:creationId xmlns:p14="http://schemas.microsoft.com/office/powerpoint/2010/main" val="290209560"/>
+        <p14:creationId xmlns:p14="http://schemas.microsoft.com/office/powerpoint/2010/main" xmlns:p="http://schemas.openxmlformats.org/presentationml/2006/main" xmlns:r="http://schemas.openxmlformats.org/officeDocument/2006/relationships" xmlns:a="http://schemas.openxmlformats.org/drawingml/2006/main" xmlns="" val="290209560"/>
       </p:ext>
     </p:extLst>
   </p:cSld>
@@ -4314,7 +4853,7 @@
   <p:timing>
     <p:tnLst>
       <p:par>
-        <p:cTn xmlns:p14="http://schemas.microsoft.com/office/powerpoint/2010/main" id="1" dur="indefinite" restart="never" nodeType="tmRoot"/>
+        <p:cTn id="1" dur="indefinite" restart="never" nodeType="tmRoot"/>
       </p:par>
     </p:tnLst>
   </p:timing>
@@ -4322,7 +4861,7 @@
 </file>
 
 <file path=ppt/slides/slide5.xml><?xml version="1.0" encoding="utf-8"?>
-<p:sld xmlns:a="http://schemas.openxmlformats.org/drawingml/2006/main" xmlns:r="http://schemas.openxmlformats.org/officeDocument/2006/relationships" xmlns:p="http://schemas.openxmlformats.org/presentationml/2006/main">
+<p:sld xmlns:a="http://schemas.openxmlformats.org/drawingml/2006/main" xmlns:r="http://schemas.openxmlformats.org/officeDocument/2006/relationships" xmlns:mc="http://schemas.openxmlformats.org/markup-compatibility/2006" xmlns:mv="urn:schemas-microsoft-com:mac:vml" xmlns:p="http://schemas.openxmlformats.org/presentationml/2006/main" mc:Ignorable="mv" mc:PreserveAttributes="mv:*">
   <p:cSld>
     <p:spTree>
       <p:nvGrpSpPr>
@@ -4440,7 +4979,7 @@
     </p:spTree>
     <p:extLst>
       <p:ext uri="{BB962C8B-B14F-4D97-AF65-F5344CB8AC3E}">
-        <p14:creationId xmlns:p14="http://schemas.microsoft.com/office/powerpoint/2010/main" val="1164309193"/>
+        <p14:creationId xmlns:p14="http://schemas.microsoft.com/office/powerpoint/2010/main" xmlns:p="http://schemas.openxmlformats.org/presentationml/2006/main" xmlns:r="http://schemas.openxmlformats.org/officeDocument/2006/relationships" xmlns:a="http://schemas.openxmlformats.org/drawingml/2006/main" xmlns="" val="1164309193"/>
       </p:ext>
     </p:extLst>
   </p:cSld>
@@ -4450,7 +4989,7 @@
   <p:timing>
     <p:tnLst>
       <p:par>
-        <p:cTn xmlns:p14="http://schemas.microsoft.com/office/powerpoint/2010/main" id="1" dur="indefinite" restart="never" nodeType="tmRoot"/>
+        <p:cTn id="1" dur="indefinite" restart="never" nodeType="tmRoot"/>
       </p:par>
     </p:tnLst>
   </p:timing>
@@ -4458,7 +4997,7 @@
 </file>
 
 <file path=ppt/slides/slide6.xml><?xml version="1.0" encoding="utf-8"?>
-<p:sld xmlns:a="http://schemas.openxmlformats.org/drawingml/2006/main" xmlns:r="http://schemas.openxmlformats.org/officeDocument/2006/relationships" xmlns:p="http://schemas.openxmlformats.org/presentationml/2006/main">
+<p:sld xmlns:a="http://schemas.openxmlformats.org/drawingml/2006/main" xmlns:r="http://schemas.openxmlformats.org/officeDocument/2006/relationships" xmlns:mc="http://schemas.openxmlformats.org/markup-compatibility/2006" xmlns:mv="urn:schemas-microsoft-com:mac:vml" xmlns:p="http://schemas.openxmlformats.org/presentationml/2006/main" mc:Ignorable="mv" mc:PreserveAttributes="mv:*">
   <p:cSld>
     <p:spTree>
       <p:nvGrpSpPr>
@@ -4683,10 +5222,60 @@
             <a:r>
               <a:rPr lang="en-GB" dirty="0" smtClean="0">
                 <a:solidFill>
+                  <a:schemeClr val="tx1">
+                    <a:lumMod val="95000"/>
+                  </a:schemeClr>
+                </a:solidFill>
+              </a:rPr>
+              <a:t>&lt;data&gt; </a:t>
+            </a:r>
+            <a:r>
+              <a:rPr lang="en-GB" dirty="0" smtClean="0">
+                <a:solidFill>
+                  <a:srgbClr val="48FFFC"/>
+                </a:solidFill>
+              </a:rPr>
+              <a:t>&lt;quality&gt;</a:t>
+            </a:r>
+            <a:r>
+              <a:rPr lang="en-GB" dirty="0" smtClean="0">
+                <a:solidFill>
+                  <a:srgbClr val="48FFFC"/>
+                </a:solidFill>
+              </a:rPr>
+              <a:t> </a:t>
+            </a:r>
+            <a:r>
+              <a:rPr lang="en-GB" dirty="0" smtClean="0">
+                <a:solidFill>
+                  <a:schemeClr val="accent6"/>
+                </a:solidFill>
+              </a:rPr>
+              <a:t>&lt;</a:t>
+            </a:r>
+            <a:r>
+              <a:rPr lang="en-GB" dirty="0" err="1" smtClean="0">
+                <a:solidFill>
+                  <a:schemeClr val="accent6"/>
+                </a:solidFill>
+              </a:rPr>
+              <a:t>evaluant</a:t>
+            </a:r>
+            <a:r>
+              <a:rPr lang="en-GB" dirty="0" smtClean="0">
+                <a:solidFill>
+                  <a:schemeClr val="accent6"/>
+                </a:solidFill>
+              </a:rPr>
+              <a:t>&gt; </a:t>
+            </a:r>
+            <a:r>
+              <a:rPr lang="en-GB" dirty="0" smtClean="0">
+                <a:solidFill>
                   <a:srgbClr val="FF0000"/>
                 </a:solidFill>
               </a:rPr>
-              <a:t>&lt;data&gt; &lt;quality&gt; &lt;</a:t>
+              <a:t>&lt;</a:t>
             </a:r>
             <a:r>
               <a:rPr lang="en-GB" dirty="0" err="1" smtClean="0">
@@ -4695,22 +5284,6 @@
                 </a:solidFill>
               </a:rPr>
               <a:t>analyte</a:t>
-            </a:r>
-            <a:r>
-              <a:rPr lang="en-GB" dirty="0" smtClean="0">
-                <a:solidFill>
-                  <a:srgbClr val="FF0000"/>
-                </a:solidFill>
-              </a:rPr>
-              <a:t>&gt; &lt;</a:t>
-            </a:r>
-            <a:r>
-              <a:rPr lang="en-GB" dirty="0" err="1" smtClean="0">
-                <a:solidFill>
-                  <a:srgbClr val="FF0000"/>
-                </a:solidFill>
-              </a:rPr>
-              <a:t>evaluant</a:t>
             </a:r>
             <a:r>
               <a:rPr lang="en-GB" dirty="0" smtClean="0">
@@ -4727,7 +5300,7 @@
     </p:spTree>
     <p:extLst>
       <p:ext uri="{BB962C8B-B14F-4D97-AF65-F5344CB8AC3E}">
-        <p14:creationId xmlns:p14="http://schemas.microsoft.com/office/powerpoint/2010/main" val="3692877943"/>
+        <p14:creationId xmlns:p14="http://schemas.microsoft.com/office/powerpoint/2010/main" xmlns:p="http://schemas.openxmlformats.org/presentationml/2006/main" xmlns:r="http://schemas.openxmlformats.org/officeDocument/2006/relationships" xmlns:a="http://schemas.openxmlformats.org/drawingml/2006/main" xmlns="" val="3692877943"/>
       </p:ext>
     </p:extLst>
   </p:cSld>
@@ -4737,7 +5310,7 @@
   <p:timing>
     <p:tnLst>
       <p:par>
-        <p:cTn xmlns:p14="http://schemas.microsoft.com/office/powerpoint/2010/main" id="1" dur="indefinite" restart="never" nodeType="tmRoot"/>
+        <p:cTn id="1" dur="indefinite" restart="never" nodeType="tmRoot"/>
       </p:par>
     </p:tnLst>
   </p:timing>
@@ -4745,7 +5318,7 @@
 </file>
 
 <file path=ppt/slides/slide7.xml><?xml version="1.0" encoding="utf-8"?>
-<p:sld xmlns:a="http://schemas.openxmlformats.org/drawingml/2006/main" xmlns:r="http://schemas.openxmlformats.org/officeDocument/2006/relationships" xmlns:p="http://schemas.openxmlformats.org/presentationml/2006/main">
+<p:sld xmlns:a="http://schemas.openxmlformats.org/drawingml/2006/main" xmlns:r="http://schemas.openxmlformats.org/officeDocument/2006/relationships" xmlns:mc="http://schemas.openxmlformats.org/markup-compatibility/2006" xmlns:mv="urn:schemas-microsoft-com:mac:vml" xmlns:p="http://schemas.openxmlformats.org/presentationml/2006/main" mc:Ignorable="mv" mc:PreserveAttributes="mv:*">
   <p:cSld>
     <p:spTree>
       <p:nvGrpSpPr>
@@ -4798,7 +5371,7 @@
           <a:blip r:embed="rId2">
             <a:extLst>
               <a:ext uri="{28A0092B-C50C-407E-A947-70E740481C1C}">
-                <a14:useLocalDpi xmlns:a14="http://schemas.microsoft.com/office/drawing/2010/main" val="0"/>
+                <a14:useLocalDpi xmlns:a14="http://schemas.microsoft.com/office/drawing/2010/main" xmlns:p="http://schemas.openxmlformats.org/presentationml/2006/main" xmlns:r="http://schemas.openxmlformats.org/officeDocument/2006/relationships" xmlns:a="http://schemas.openxmlformats.org/drawingml/2006/main" xmlns="" val="0"/>
               </a:ext>
             </a:extLst>
           </a:blip>
@@ -4819,7 +5392,7 @@
     </p:spTree>
     <p:extLst>
       <p:ext uri="{BB962C8B-B14F-4D97-AF65-F5344CB8AC3E}">
-        <p14:creationId xmlns:p14="http://schemas.microsoft.com/office/powerpoint/2010/main" val="3378772889"/>
+        <p14:creationId xmlns:p14="http://schemas.microsoft.com/office/powerpoint/2010/main" xmlns:p="http://schemas.openxmlformats.org/presentationml/2006/main" xmlns:r="http://schemas.openxmlformats.org/officeDocument/2006/relationships" xmlns:a="http://schemas.openxmlformats.org/drawingml/2006/main" xmlns="" val="3378772889"/>
       </p:ext>
     </p:extLst>
   </p:cSld>
@@ -4829,7 +5402,7 @@
   <p:timing>
     <p:tnLst>
       <p:par>
-        <p:cTn xmlns:p14="http://schemas.microsoft.com/office/powerpoint/2010/main" id="1" dur="indefinite" restart="never" nodeType="tmRoot"/>
+        <p:cTn id="1" dur="indefinite" restart="never" nodeType="tmRoot"/>
       </p:par>
     </p:tnLst>
   </p:timing>
@@ -4837,7 +5410,7 @@
 </file>
 
 <file path=ppt/slides/slide8.xml><?xml version="1.0" encoding="utf-8"?>
-<p:sld xmlns:a="http://schemas.openxmlformats.org/drawingml/2006/main" xmlns:r="http://schemas.openxmlformats.org/officeDocument/2006/relationships" xmlns:p="http://schemas.openxmlformats.org/presentationml/2006/main">
+<p:sld xmlns:a="http://schemas.openxmlformats.org/drawingml/2006/main" xmlns:r="http://schemas.openxmlformats.org/officeDocument/2006/relationships" xmlns:mc="http://schemas.openxmlformats.org/markup-compatibility/2006" xmlns:mv="urn:schemas-microsoft-com:mac:vml" xmlns:p="http://schemas.openxmlformats.org/presentationml/2006/main" mc:Ignorable="mv" mc:PreserveAttributes="mv:*">
   <p:cSld>
     <p:spTree>
       <p:nvGrpSpPr>
@@ -4914,7 +5487,7 @@
           <a:blip r:embed="rId3">
             <a:extLst>
               <a:ext uri="{28A0092B-C50C-407E-A947-70E740481C1C}">
-                <a14:useLocalDpi xmlns:a14="http://schemas.microsoft.com/office/drawing/2010/main" val="0"/>
+                <a14:useLocalDpi xmlns:a14="http://schemas.microsoft.com/office/drawing/2010/main" xmlns:p="http://schemas.openxmlformats.org/presentationml/2006/main" xmlns:r="http://schemas.openxmlformats.org/officeDocument/2006/relationships" xmlns:a="http://schemas.openxmlformats.org/drawingml/2006/main" xmlns="" val="0"/>
               </a:ext>
             </a:extLst>
           </a:blip>
@@ -4937,14 +5510,14 @@
           </a:ln>
           <a:extLst>
             <a:ext uri="{909E8E84-426E-40dd-AFC4-6F175D3DCCD1}">
-              <a14:hiddenFill xmlns:a14="http://schemas.microsoft.com/office/drawing/2010/main">
+              <a14:hiddenFill xmlns:a14="http://schemas.microsoft.com/office/drawing/2010/main" xmlns:p="http://schemas.openxmlformats.org/presentationml/2006/main" xmlns:r="http://schemas.openxmlformats.org/officeDocument/2006/relationships" xmlns:a="http://schemas.openxmlformats.org/drawingml/2006/main" xmlns="">
                 <a:solidFill>
                   <a:srgbClr val="FFFFFF"/>
                 </a:solidFill>
               </a14:hiddenFill>
             </a:ext>
             <a:ext uri="{91240B29-F687-4f45-9708-019B960494DF}">
-              <a14:hiddenLine xmlns:a14="http://schemas.microsoft.com/office/drawing/2010/main" w="9525">
+              <a14:hiddenLine xmlns:a14="http://schemas.microsoft.com/office/drawing/2010/main" xmlns:p="http://schemas.openxmlformats.org/presentationml/2006/main" xmlns:r="http://schemas.openxmlformats.org/officeDocument/2006/relationships" xmlns:a="http://schemas.openxmlformats.org/drawingml/2006/main" xmlns="" w="9525">
                 <a:solidFill>
                   <a:srgbClr val="000000"/>
                 </a:solidFill>
@@ -4959,7 +5532,7 @@
     </p:spTree>
     <p:extLst>
       <p:ext uri="{BB962C8B-B14F-4D97-AF65-F5344CB8AC3E}">
-        <p14:creationId xmlns:p14="http://schemas.microsoft.com/office/powerpoint/2010/main" val="2126066395"/>
+        <p14:creationId xmlns:p14="http://schemas.microsoft.com/office/powerpoint/2010/main" xmlns:p="http://schemas.openxmlformats.org/presentationml/2006/main" xmlns:r="http://schemas.openxmlformats.org/officeDocument/2006/relationships" xmlns:a="http://schemas.openxmlformats.org/drawingml/2006/main" xmlns="" val="2126066395"/>
       </p:ext>
     </p:extLst>
   </p:cSld>
@@ -4969,7 +5542,7 @@
   <p:timing>
     <p:tnLst>
       <p:par>
-        <p:cTn xmlns:p14="http://schemas.microsoft.com/office/powerpoint/2010/main" id="1" dur="indefinite" restart="never" nodeType="tmRoot">
+        <p:cTn id="1" dur="indefinite" restart="never" nodeType="tmRoot">
           <p:childTnLst>
             <p:seq concurrent="1" nextAc="seek">
               <p:cTn id="2" dur="indefinite" nodeType="mainSeq">
@@ -5045,7 +5618,7 @@
 </file>
 
 <file path=ppt/slides/slide9.xml><?xml version="1.0" encoding="utf-8"?>
-<p:sld xmlns:a="http://schemas.openxmlformats.org/drawingml/2006/main" xmlns:r="http://schemas.openxmlformats.org/officeDocument/2006/relationships" xmlns:p="http://schemas.openxmlformats.org/presentationml/2006/main">
+<p:sld xmlns:a="http://schemas.openxmlformats.org/drawingml/2006/main" xmlns:r="http://schemas.openxmlformats.org/officeDocument/2006/relationships" xmlns:mc="http://schemas.openxmlformats.org/markup-compatibility/2006" xmlns:mv="urn:schemas-microsoft-com:mac:vml" xmlns:p="http://schemas.openxmlformats.org/presentationml/2006/main" mc:Ignorable="mv" mc:PreserveAttributes="mv:*">
   <p:cSld>
     <p:spTree>
       <p:nvGrpSpPr>
@@ -5078,131 +5651,209 @@
           <a:p>
             <a:r>
               <a:rPr lang="en-GB" dirty="0" smtClean="0"/>
-              <a:t>QTT example</a:t>
+              <a:t>Device example</a:t>
             </a:r>
             <a:endParaRPr lang="en-GB" dirty="0"/>
+          </a:p>
+        </p:txBody>
+      </p:sp>
+      <p:sp>
+        <p:nvSpPr>
+          <p:cNvPr id="3" name="TextBox 2"/>
+          <p:cNvSpPr txBox="1"/>
+          <p:nvPr/>
+        </p:nvSpPr>
+        <p:spPr>
+          <a:xfrm>
+            <a:off x="167090" y="4576836"/>
+            <a:ext cx="8822352" cy="3785652"/>
+          </a:xfrm>
+          <a:prstGeom prst="rect">
+            <a:avLst/>
+          </a:prstGeom>
+          <a:noFill/>
+        </p:spPr>
+        <p:txBody>
+          <a:bodyPr wrap="square" rtlCol="0">
+            <a:spAutoFit/>
+          </a:bodyPr>
+          <a:lstStyle/>
+          <a:p>
+            <a:endParaRPr lang="en-US" sz="2400" dirty="0" smtClean="0"/>
+          </a:p>
+          <a:p>
+            <a:endParaRPr lang="en-US" sz="2400" dirty="0" smtClean="0"/>
+          </a:p>
+          <a:p>
+            <a:r>
+              <a:rPr lang="en-US" sz="2400" dirty="0" smtClean="0"/>
+              <a:t>Class</a:t>
+            </a:r>
+            <a:r>
+              <a:rPr lang="en-US" sz="2400" dirty="0" smtClean="0"/>
+              <a:t>: @A*(</a:t>
+            </a:r>
+            <a:r>
+              <a:rPr lang="en-US" sz="2400" dirty="0" err="1" smtClean="0"/>
+              <a:t>rdfs:label</a:t>
+            </a:r>
+            <a:r>
+              <a:rPr lang="en-US" sz="2400" dirty="0" smtClean="0"/>
+              <a:t>)</a:t>
+            </a:r>
+          </a:p>
+          <a:p>
+            <a:r>
+              <a:rPr lang="en-US" sz="2400" dirty="0" err="1" smtClean="0"/>
+              <a:t>SubClassOf</a:t>
+            </a:r>
+            <a:r>
+              <a:rPr lang="en-US" sz="2400" dirty="0" smtClean="0"/>
+              <a:t>: @B*(</a:t>
+            </a:r>
+            <a:r>
+              <a:rPr lang="en-US" sz="2400" dirty="0" err="1" smtClean="0"/>
+              <a:t>rdfs:label</a:t>
+            </a:r>
+            <a:r>
+              <a:rPr lang="en-US" sz="2400" dirty="0" smtClean="0"/>
+              <a:t>),</a:t>
+            </a:r>
+          </a:p>
+          <a:p>
+            <a:r>
+              <a:rPr lang="en-US" sz="2400" dirty="0" err="1" smtClean="0"/>
+              <a:t>has_function</a:t>
+            </a:r>
+            <a:r>
+              <a:rPr lang="en-US" sz="2400" dirty="0" smtClean="0"/>
+              <a:t> some @C*(</a:t>
+            </a:r>
+            <a:r>
+              <a:rPr lang="en-US" sz="2400" dirty="0" err="1" smtClean="0"/>
+              <a:t>rdfs:label</a:t>
+            </a:r>
+            <a:r>
+              <a:rPr lang="en-US" sz="2400" dirty="0" smtClean="0"/>
+              <a:t>),</a:t>
+            </a:r>
+          </a:p>
+          <a:p>
+            <a:r>
+              <a:rPr lang="en-US" sz="2400" dirty="0" err="1" smtClean="0"/>
+              <a:t>has_function</a:t>
+            </a:r>
+            <a:r>
+              <a:rPr lang="en-US" sz="2400" dirty="0" smtClean="0"/>
+              <a:t> some </a:t>
+            </a:r>
+            <a:r>
+              <a:rPr lang="en-US" sz="2400" dirty="0" smtClean="0"/>
+              <a:t>@D*</a:t>
+            </a:r>
+            <a:r>
+              <a:rPr lang="en-US" sz="2400" dirty="0" smtClean="0"/>
+              <a:t>(</a:t>
+            </a:r>
+            <a:r>
+              <a:rPr lang="en-US" sz="2400" dirty="0" err="1" smtClean="0"/>
+              <a:t>rdfs:label</a:t>
+            </a:r>
+            <a:r>
+              <a:rPr lang="en-US" sz="2400" dirty="0" smtClean="0"/>
+              <a:t>),</a:t>
+            </a:r>
+          </a:p>
+          <a:p>
+            <a:endParaRPr lang="en-US" sz="2400" dirty="0" smtClean="0"/>
+          </a:p>
+          <a:p>
+            <a:endParaRPr lang="en-US" sz="2400" dirty="0" smtClean="0"/>
+          </a:p>
+          <a:p>
+            <a:endParaRPr lang="en-GB" sz="2400" dirty="0" smtClean="0"/>
+          </a:p>
+          <a:p>
+            <a:endParaRPr lang="en-GB" sz="2400" dirty="0"/>
           </a:p>
         </p:txBody>
       </p:sp>
       <p:pic>
         <p:nvPicPr>
-          <p:cNvPr id="4" name="Picture 3" descr="Screen shot 2011-07-20 at 16.05.51.png"/>
+          <p:cNvPr id="7" name="Picture 6"/>
           <p:cNvPicPr>
             <a:picLocks noChangeAspect="1"/>
           </p:cNvPicPr>
           <p:nvPr/>
         </p:nvPicPr>
-        <p:blipFill rotWithShape="1">
-          <a:blip r:embed="rId2">
-            <a:extLst>
-              <a:ext uri="{28A0092B-C50C-407E-A947-70E740481C1C}">
-                <a14:useLocalDpi xmlns:a14="http://schemas.microsoft.com/office/drawing/2010/main" val="0"/>
-              </a:ext>
-            </a:extLst>
-          </a:blip>
-          <a:srcRect t="2534" b="-2534"/>
-          <a:stretch/>
+        <p:blipFill>
+          <a:blip r:embed="rId3"/>
+          <a:stretch>
+            <a:fillRect/>
+          </a:stretch>
         </p:blipFill>
         <p:spPr>
           <a:xfrm>
-            <a:off x="0" y="1715448"/>
-            <a:ext cx="9144000" cy="2861388"/>
+            <a:off x="80962" y="3393799"/>
+            <a:ext cx="9023350" cy="1680935"/>
           </a:xfrm>
           <a:prstGeom prst="rect">
             <a:avLst/>
           </a:prstGeom>
         </p:spPr>
       </p:pic>
-      <p:sp>
-        <p:nvSpPr>
-          <p:cNvPr id="3" name="TextBox 2"/>
-          <p:cNvSpPr txBox="1"/>
+      <p:pic>
+        <p:nvPicPr>
+          <p:cNvPr id="8" name="Picture 7"/>
+          <p:cNvPicPr>
+            <a:picLocks noChangeAspect="1"/>
+          </p:cNvPicPr>
           <p:nvPr/>
-        </p:nvSpPr>
+        </p:nvPicPr>
+        <p:blipFill>
+          <a:blip r:embed="rId4"/>
+          <a:stretch>
+            <a:fillRect/>
+          </a:stretch>
+        </p:blipFill>
         <p:spPr>
           <a:xfrm>
-            <a:off x="167090" y="4459852"/>
-            <a:ext cx="8822352" cy="2677656"/>
+            <a:off x="80962" y="1417638"/>
+            <a:ext cx="4325720" cy="1280917"/>
           </a:xfrm>
           <a:prstGeom prst="rect">
             <a:avLst/>
           </a:prstGeom>
-          <a:noFill/>
         </p:spPr>
-        <p:txBody>
-          <a:bodyPr wrap="square" rtlCol="0">
-            <a:spAutoFit/>
-          </a:bodyPr>
-          <a:lstStyle/>
-          <a:p>
-            <a:r>
-              <a:rPr lang="en-GB" sz="2400" u="sng" dirty="0" smtClean="0"/>
-              <a:t>Target Ontology: </a:t>
-            </a:r>
-            <a:r>
-              <a:rPr lang="en-GB" sz="2400" dirty="0" err="1" smtClean="0"/>
-              <a:t>OBI.owl</a:t>
-            </a:r>
-            <a:endParaRPr lang="en-GB" sz="2400" dirty="0" smtClean="0"/>
-          </a:p>
-          <a:p>
-            <a:r>
-              <a:rPr lang="en-GB" sz="2400" u="sng" dirty="0" smtClean="0"/>
-              <a:t>Constraints</a:t>
-            </a:r>
-            <a:r>
-              <a:rPr lang="en-GB" sz="2400" dirty="0" smtClean="0"/>
-              <a:t>: </a:t>
-            </a:r>
-          </a:p>
-          <a:p>
-            <a:pPr marL="342900" indent="-342900">
-              <a:buFont typeface="Arial"/>
-              <a:buChar char="•"/>
-            </a:pPr>
-            <a:r>
-              <a:rPr lang="en-GB" sz="2400" dirty="0" smtClean="0"/>
-              <a:t>Map terms (or submit if not available) to compatible ontologies (i.e. sharing the same top level ontology, here BFO 1.1)</a:t>
-            </a:r>
-          </a:p>
-          <a:p>
-            <a:pPr marL="342900" indent="-342900">
-              <a:buFont typeface="Arial"/>
-              <a:buChar char="•"/>
-            </a:pPr>
-            <a:r>
-              <a:rPr lang="en-GB" sz="2400" dirty="0" smtClean="0"/>
-              <a:t>Import those terms </a:t>
-            </a:r>
-            <a:r>
-              <a:rPr lang="en-GB" sz="2400" dirty="0" err="1" smtClean="0"/>
-              <a:t>External.owl</a:t>
-            </a:r>
-            <a:r>
-              <a:rPr lang="en-GB" sz="2400" dirty="0" smtClean="0"/>
-              <a:t> + </a:t>
-            </a:r>
-            <a:r>
-              <a:rPr lang="en-GB" sz="2400" dirty="0" err="1" smtClean="0"/>
-              <a:t>ExternalDerived.owl</a:t>
-            </a:r>
-            <a:r>
-              <a:rPr lang="en-GB" sz="2400" dirty="0" smtClean="0"/>
-              <a:t> files</a:t>
-            </a:r>
-          </a:p>
-          <a:p>
-            <a:endParaRPr lang="en-GB" sz="2400" dirty="0" smtClean="0"/>
-          </a:p>
-          <a:p>
-            <a:endParaRPr lang="en-GB" sz="2400" dirty="0"/>
-          </a:p>
-        </p:txBody>
-      </p:sp>
+      </p:pic>
+      <p:pic>
+        <p:nvPicPr>
+          <p:cNvPr id="9" name="Picture 8"/>
+          <p:cNvPicPr>
+            <a:picLocks noChangeAspect="1"/>
+          </p:cNvPicPr>
+          <p:nvPr/>
+        </p:nvPicPr>
+        <p:blipFill>
+          <a:blip r:embed="rId5"/>
+          <a:stretch>
+            <a:fillRect/>
+          </a:stretch>
+        </p:blipFill>
+        <p:spPr>
+          <a:xfrm>
+            <a:off x="4397511" y="1599368"/>
+            <a:ext cx="4746489" cy="1099187"/>
+          </a:xfrm>
+          <a:prstGeom prst="rect">
+            <a:avLst/>
+          </a:prstGeom>
+        </p:spPr>
+      </p:pic>
     </p:spTree>
     <p:extLst>
       <p:ext uri="{BB962C8B-B14F-4D97-AF65-F5344CB8AC3E}">
-        <p14:creationId xmlns:p14="http://schemas.microsoft.com/office/powerpoint/2010/main" val="3020082651"/>
+        <p14:creationId xmlns:p14="http://schemas.microsoft.com/office/powerpoint/2010/main" xmlns:p="http://schemas.openxmlformats.org/presentationml/2006/main" xmlns:r="http://schemas.openxmlformats.org/officeDocument/2006/relationships" xmlns:a="http://schemas.openxmlformats.org/drawingml/2006/main" xmlns="" val="3020082651"/>
       </p:ext>
     </p:extLst>
   </p:cSld>
@@ -5212,7 +5863,7 @@
   <p:timing>
     <p:tnLst>
       <p:par>
-        <p:cTn xmlns:p14="http://schemas.microsoft.com/office/powerpoint/2010/main" id="1" dur="indefinite" restart="never" nodeType="tmRoot"/>
+        <p:cTn id="1" dur="indefinite" restart="never" nodeType="tmRoot"/>
       </p:par>
     </p:tnLst>
   </p:timing>
@@ -5502,4 +6153,322 @@
   <a:objectDefaults/>
   <a:extraClrSchemeLst/>
 </a:theme>
+</file>
+
+<file path=ppt/theme/theme2.xml><?xml version="1.0" encoding="utf-8"?>
+<a:theme xmlns:a="http://schemas.openxmlformats.org/drawingml/2006/main" name="Office Theme">
+  <a:themeElements>
+    <a:clrScheme name="Office">
+      <a:dk1>
+        <a:sysClr val="windowText" lastClr="000000"/>
+      </a:dk1>
+      <a:lt1>
+        <a:sysClr val="window" lastClr="FFFFFF"/>
+      </a:lt1>
+      <a:dk2>
+        <a:srgbClr val="1F497D"/>
+      </a:dk2>
+      <a:lt2>
+        <a:srgbClr val="EEECE1"/>
+      </a:lt2>
+      <a:accent1>
+        <a:srgbClr val="4F81BD"/>
+      </a:accent1>
+      <a:accent2>
+        <a:srgbClr val="C0504D"/>
+      </a:accent2>
+      <a:accent3>
+        <a:srgbClr val="9BBB59"/>
+      </a:accent3>
+      <a:accent4>
+        <a:srgbClr val="8064A2"/>
+      </a:accent4>
+      <a:accent5>
+        <a:srgbClr val="4BACC6"/>
+      </a:accent5>
+      <a:accent6>
+        <a:srgbClr val="F79646"/>
+      </a:accent6>
+      <a:hlink>
+        <a:srgbClr val="0000FF"/>
+      </a:hlink>
+      <a:folHlink>
+        <a:srgbClr val="800080"/>
+      </a:folHlink>
+    </a:clrScheme>
+    <a:fontScheme name="Office">
+      <a:majorFont>
+        <a:latin typeface="Calibri"/>
+        <a:ea typeface=""/>
+        <a:cs typeface=""/>
+        <a:font script="Jpan" typeface="ＭＳ Ｐゴシック"/>
+        <a:font script="Hang" typeface="맑은 고딕"/>
+        <a:font script="Hans" typeface="宋体"/>
+        <a:font script="Hant" typeface="新細明體"/>
+        <a:font script="Arab" typeface="Times New Roman"/>
+        <a:font script="Hebr" typeface="Times New Roman"/>
+        <a:font script="Thai" typeface="Angsana New"/>
+        <a:font script="Ethi" typeface="Nyala"/>
+        <a:font script="Beng" typeface="Vrinda"/>
+        <a:font script="Gujr" typeface="Shruti"/>
+        <a:font script="Khmr" typeface="MoolBoran"/>
+        <a:font script="Knda" typeface="Tunga"/>
+        <a:font script="Guru" typeface="Raavi"/>
+        <a:font script="Cans" typeface="Euphemia"/>
+        <a:font script="Cher" typeface="Plantagenet Cherokee"/>
+        <a:font script="Yiii" typeface="Microsoft Yi Baiti"/>
+        <a:font script="Tibt" typeface="Microsoft Himalaya"/>
+        <a:font script="Thaa" typeface="MV Boli"/>
+        <a:font script="Deva" typeface="Mangal"/>
+        <a:font script="Telu" typeface="Gautami"/>
+        <a:font script="Taml" typeface="Latha"/>
+        <a:font script="Syrc" typeface="Estrangelo Edessa"/>
+        <a:font script="Orya" typeface="Kalinga"/>
+        <a:font script="Mlym" typeface="Kartika"/>
+        <a:font script="Laoo" typeface="DokChampa"/>
+        <a:font script="Sinh" typeface="Iskoola Pota"/>
+        <a:font script="Mong" typeface="Mongolian Baiti"/>
+        <a:font script="Viet" typeface="Times New Roman"/>
+        <a:font script="Uigh" typeface="Microsoft Uighur"/>
+      </a:majorFont>
+      <a:minorFont>
+        <a:latin typeface="Calibri"/>
+        <a:ea typeface=""/>
+        <a:cs typeface=""/>
+        <a:font script="Jpan" typeface="ＭＳ Ｐゴシック"/>
+        <a:font script="Hang" typeface="맑은 고딕"/>
+        <a:font script="Hans" typeface="宋体"/>
+        <a:font script="Hant" typeface="新細明體"/>
+        <a:font script="Arab" typeface="Arial"/>
+        <a:font script="Hebr" typeface="Arial"/>
+        <a:font script="Thai" typeface="Cordia New"/>
+        <a:font script="Ethi" typeface="Nyala"/>
+        <a:font script="Beng" typeface="Vrinda"/>
+        <a:font script="Gujr" typeface="Shruti"/>
+        <a:font script="Khmr" typeface="DaunPenh"/>
+        <a:font script="Knda" typeface="Tunga"/>
+        <a:font script="Guru" typeface="Raavi"/>
+        <a:font script="Cans" typeface="Euphemia"/>
+        <a:font script="Cher" typeface="Plantagenet Cherokee"/>
+        <a:font script="Yiii" typeface="Microsoft Yi Baiti"/>
+        <a:font script="Tibt" typeface="Microsoft Himalaya"/>
+        <a:font script="Thaa" typeface="MV Boli"/>
+        <a:font script="Deva" typeface="Mangal"/>
+        <a:font script="Telu" typeface="Gautami"/>
+        <a:font script="Taml" typeface="Latha"/>
+        <a:font script="Syrc" typeface="Estrangelo Edessa"/>
+        <a:font script="Orya" typeface="Kalinga"/>
+        <a:font script="Mlym" typeface="Kartika"/>
+        <a:font script="Laoo" typeface="DokChampa"/>
+        <a:font script="Sinh" typeface="Iskoola Pota"/>
+        <a:font script="Mong" typeface="Mongolian Baiti"/>
+        <a:font script="Viet" typeface="Arial"/>
+        <a:font script="Uigh" typeface="Microsoft Uighur"/>
+      </a:minorFont>
+    </a:fontScheme>
+    <a:fmtScheme name="Office">
+      <a:fillStyleLst>
+        <a:solidFill>
+          <a:schemeClr val="phClr"/>
+        </a:solidFill>
+        <a:gradFill rotWithShape="1">
+          <a:gsLst>
+            <a:gs pos="0">
+              <a:schemeClr val="phClr">
+                <a:tint val="50000"/>
+                <a:satMod val="300000"/>
+              </a:schemeClr>
+            </a:gs>
+            <a:gs pos="35000">
+              <a:schemeClr val="phClr">
+                <a:tint val="37000"/>
+                <a:satMod val="300000"/>
+              </a:schemeClr>
+            </a:gs>
+            <a:gs pos="100000">
+              <a:schemeClr val="phClr">
+                <a:tint val="15000"/>
+                <a:satMod val="350000"/>
+              </a:schemeClr>
+            </a:gs>
+          </a:gsLst>
+          <a:lin ang="16200000" scaled="1"/>
+        </a:gradFill>
+        <a:gradFill rotWithShape="1">
+          <a:gsLst>
+            <a:gs pos="0">
+              <a:schemeClr val="phClr">
+                <a:tint val="100000"/>
+                <a:shade val="100000"/>
+                <a:satMod val="130000"/>
+              </a:schemeClr>
+            </a:gs>
+            <a:gs pos="100000">
+              <a:schemeClr val="phClr">
+                <a:tint val="50000"/>
+                <a:shade val="100000"/>
+                <a:satMod val="350000"/>
+              </a:schemeClr>
+            </a:gs>
+          </a:gsLst>
+          <a:lin ang="16200000" scaled="0"/>
+        </a:gradFill>
+      </a:fillStyleLst>
+      <a:lnStyleLst>
+        <a:ln w="9525" cap="flat" cmpd="sng" algn="ctr">
+          <a:solidFill>
+            <a:schemeClr val="phClr">
+              <a:shade val="95000"/>
+              <a:satMod val="105000"/>
+            </a:schemeClr>
+          </a:solidFill>
+          <a:prstDash val="solid"/>
+        </a:ln>
+        <a:ln w="25400" cap="flat" cmpd="sng" algn="ctr">
+          <a:solidFill>
+            <a:schemeClr val="phClr"/>
+          </a:solidFill>
+          <a:prstDash val="solid"/>
+        </a:ln>
+        <a:ln w="38100" cap="flat" cmpd="sng" algn="ctr">
+          <a:solidFill>
+            <a:schemeClr val="phClr"/>
+          </a:solidFill>
+          <a:prstDash val="solid"/>
+        </a:ln>
+      </a:lnStyleLst>
+      <a:effectStyleLst>
+        <a:effectStyle>
+          <a:effectLst>
+            <a:outerShdw blurRad="40000" dist="20000" dir="5400000" rotWithShape="0">
+              <a:srgbClr val="000000">
+                <a:alpha val="38000"/>
+              </a:srgbClr>
+            </a:outerShdw>
+          </a:effectLst>
+        </a:effectStyle>
+        <a:effectStyle>
+          <a:effectLst>
+            <a:outerShdw blurRad="40000" dist="23000" dir="5400000" rotWithShape="0">
+              <a:srgbClr val="000000">
+                <a:alpha val="35000"/>
+              </a:srgbClr>
+            </a:outerShdw>
+          </a:effectLst>
+        </a:effectStyle>
+        <a:effectStyle>
+          <a:effectLst>
+            <a:outerShdw blurRad="40000" dist="23000" dir="5400000" rotWithShape="0">
+              <a:srgbClr val="000000">
+                <a:alpha val="35000"/>
+              </a:srgbClr>
+            </a:outerShdw>
+          </a:effectLst>
+          <a:scene3d>
+            <a:camera prst="orthographicFront">
+              <a:rot lat="0" lon="0" rev="0"/>
+            </a:camera>
+            <a:lightRig rig="threePt" dir="t">
+              <a:rot lat="0" lon="0" rev="1200000"/>
+            </a:lightRig>
+          </a:scene3d>
+          <a:sp3d>
+            <a:bevelT w="63500" h="25400"/>
+          </a:sp3d>
+        </a:effectStyle>
+      </a:effectStyleLst>
+      <a:bgFillStyleLst>
+        <a:solidFill>
+          <a:schemeClr val="phClr"/>
+        </a:solidFill>
+        <a:gradFill rotWithShape="1">
+          <a:gsLst>
+            <a:gs pos="0">
+              <a:schemeClr val="phClr">
+                <a:tint val="40000"/>
+                <a:satMod val="350000"/>
+              </a:schemeClr>
+            </a:gs>
+            <a:gs pos="40000">
+              <a:schemeClr val="phClr">
+                <a:tint val="45000"/>
+                <a:shade val="99000"/>
+                <a:satMod val="350000"/>
+              </a:schemeClr>
+            </a:gs>
+            <a:gs pos="100000">
+              <a:schemeClr val="phClr">
+                <a:shade val="20000"/>
+                <a:satMod val="255000"/>
+              </a:schemeClr>
+            </a:gs>
+          </a:gsLst>
+          <a:path path="circle">
+            <a:fillToRect l="50000" t="-80000" r="50000" b="180000"/>
+          </a:path>
+        </a:gradFill>
+        <a:gradFill rotWithShape="1">
+          <a:gsLst>
+            <a:gs pos="0">
+              <a:schemeClr val="phClr">
+                <a:tint val="80000"/>
+                <a:satMod val="300000"/>
+              </a:schemeClr>
+            </a:gs>
+            <a:gs pos="100000">
+              <a:schemeClr val="phClr">
+                <a:shade val="30000"/>
+                <a:satMod val="200000"/>
+              </a:schemeClr>
+            </a:gs>
+          </a:gsLst>
+          <a:path path="circle">
+            <a:fillToRect l="50000" t="50000" r="50000" b="50000"/>
+          </a:path>
+        </a:gradFill>
+      </a:bgFillStyleLst>
+    </a:fmtScheme>
+  </a:themeElements>
+  <a:objectDefaults>
+    <a:spDef>
+      <a:spPr/>
+      <a:bodyPr/>
+      <a:lstStyle/>
+      <a:style>
+        <a:lnRef idx="1">
+          <a:schemeClr val="accent1"/>
+        </a:lnRef>
+        <a:fillRef idx="3">
+          <a:schemeClr val="accent1"/>
+        </a:fillRef>
+        <a:effectRef idx="2">
+          <a:schemeClr val="accent1"/>
+        </a:effectRef>
+        <a:fontRef idx="minor">
+          <a:schemeClr val="lt1"/>
+        </a:fontRef>
+      </a:style>
+    </a:spDef>
+    <a:lnDef>
+      <a:spPr/>
+      <a:bodyPr/>
+      <a:lstStyle/>
+      <a:style>
+        <a:lnRef idx="2">
+          <a:schemeClr val="accent1"/>
+        </a:lnRef>
+        <a:fillRef idx="0">
+          <a:schemeClr val="accent1"/>
+        </a:fillRef>
+        <a:effectRef idx="1">
+          <a:schemeClr val="accent1"/>
+        </a:effectRef>
+        <a:fontRef idx="minor">
+          <a:schemeClr val="tx1"/>
+        </a:fontRef>
+      </a:style>
+    </a:lnDef>
+  </a:objectDefaults>
+  <a:extraClrSchemeLst/>
+</a:theme>
 </file>
</xml_diff>

<commit_message>
Updated QTT and eagle-i presentations
</commit_message>
<xml_diff>
--- a/docs/presentations/OBI tutorial July 2011 ICBO/OBI-QTT&designpatterns.pptx
+++ b/docs/presentations/OBI tutorial July 2011 ICBO/OBI-QTT&designpatterns.pptx
@@ -5,7 +5,7 @@
     <p:sldMasterId id="2147483648" r:id="rId1"/>
   </p:sldMasterIdLst>
   <p:notesMasterIdLst>
-    <p:notesMasterId r:id="rId13"/>
+    <p:notesMasterId r:id="rId14"/>
   </p:notesMasterIdLst>
   <p:sldIdLst>
     <p:sldId id="256" r:id="rId2"/>
@@ -14,11 +14,12 @@
     <p:sldId id="262" r:id="rId5"/>
     <p:sldId id="259" r:id="rId6"/>
     <p:sldId id="260" r:id="rId7"/>
-    <p:sldId id="263" r:id="rId8"/>
-    <p:sldId id="268" r:id="rId9"/>
-    <p:sldId id="265" r:id="rId10"/>
-    <p:sldId id="264" r:id="rId11"/>
-    <p:sldId id="257" r:id="rId12"/>
+    <p:sldId id="269" r:id="rId8"/>
+    <p:sldId id="263" r:id="rId9"/>
+    <p:sldId id="268" r:id="rId10"/>
+    <p:sldId id="265" r:id="rId11"/>
+    <p:sldId id="264" r:id="rId12"/>
+    <p:sldId id="257" r:id="rId13"/>
   </p:sldIdLst>
   <p:sldSz cx="9144000" cy="6858000" type="screen4x3"/>
   <p:notesSz cx="6858000" cy="9144000"/>
@@ -552,7 +553,7 @@
           <a:p>
             <a:fld id="{FDFB235A-217F-2747-A483-9C09F588E6D4}" type="slidenum">
               <a:rPr lang="en-US" smtClean="0"/>
-              <a:t>9</a:t>
+              <a:t>10</a:t>
             </a:fld>
             <a:endParaRPr lang="en-US"/>
           </a:p>
@@ -4032,6 +4033,259 @@
           <a:p>
             <a:r>
               <a:rPr lang="en-GB" dirty="0" smtClean="0"/>
+              <a:t>Device example</a:t>
+            </a:r>
+            <a:endParaRPr lang="en-GB" dirty="0"/>
+          </a:p>
+        </p:txBody>
+      </p:sp>
+      <p:sp>
+        <p:nvSpPr>
+          <p:cNvPr id="3" name="TextBox 2"/>
+          <p:cNvSpPr txBox="1"/>
+          <p:nvPr/>
+        </p:nvSpPr>
+        <p:spPr>
+          <a:xfrm>
+            <a:off x="167090" y="4576836"/>
+            <a:ext cx="8822352" cy="3785652"/>
+          </a:xfrm>
+          <a:prstGeom prst="rect">
+            <a:avLst/>
+          </a:prstGeom>
+          <a:noFill/>
+        </p:spPr>
+        <p:txBody>
+          <a:bodyPr wrap="square" rtlCol="0">
+            <a:spAutoFit/>
+          </a:bodyPr>
+          <a:lstStyle/>
+          <a:p>
+            <a:endParaRPr lang="en-US" sz="2400" dirty="0" smtClean="0"/>
+          </a:p>
+          <a:p>
+            <a:endParaRPr lang="en-US" sz="2400" dirty="0" smtClean="0"/>
+          </a:p>
+          <a:p>
+            <a:r>
+              <a:rPr lang="en-US" sz="2400" dirty="0" smtClean="0"/>
+              <a:t>Class</a:t>
+            </a:r>
+            <a:r>
+              <a:rPr lang="en-US" sz="2400" dirty="0" smtClean="0"/>
+              <a:t>: @A*(</a:t>
+            </a:r>
+            <a:r>
+              <a:rPr lang="en-US" sz="2400" dirty="0" err="1" smtClean="0"/>
+              <a:t>rdfs:label</a:t>
+            </a:r>
+            <a:r>
+              <a:rPr lang="en-US" sz="2400" dirty="0" smtClean="0"/>
+              <a:t>)</a:t>
+            </a:r>
+          </a:p>
+          <a:p>
+            <a:r>
+              <a:rPr lang="en-US" sz="2400" dirty="0" err="1" smtClean="0"/>
+              <a:t>SubClassOf</a:t>
+            </a:r>
+            <a:r>
+              <a:rPr lang="en-US" sz="2400" dirty="0" smtClean="0"/>
+              <a:t>: @B*(</a:t>
+            </a:r>
+            <a:r>
+              <a:rPr lang="en-US" sz="2400" dirty="0" err="1" smtClean="0"/>
+              <a:t>rdfs:label</a:t>
+            </a:r>
+            <a:r>
+              <a:rPr lang="en-US" sz="2400" dirty="0" smtClean="0"/>
+              <a:t>),</a:t>
+            </a:r>
+          </a:p>
+          <a:p>
+            <a:r>
+              <a:rPr lang="en-US" sz="2400" dirty="0" err="1" smtClean="0"/>
+              <a:t>has_function</a:t>
+            </a:r>
+            <a:r>
+              <a:rPr lang="en-US" sz="2400" dirty="0" smtClean="0"/>
+              <a:t> some @C*(</a:t>
+            </a:r>
+            <a:r>
+              <a:rPr lang="en-US" sz="2400" dirty="0" err="1" smtClean="0"/>
+              <a:t>rdfs:label</a:t>
+            </a:r>
+            <a:r>
+              <a:rPr lang="en-US" sz="2400" dirty="0" smtClean="0"/>
+              <a:t>),</a:t>
+            </a:r>
+          </a:p>
+          <a:p>
+            <a:r>
+              <a:rPr lang="en-US" sz="2400" dirty="0" err="1" smtClean="0"/>
+              <a:t>has_function</a:t>
+            </a:r>
+            <a:r>
+              <a:rPr lang="en-US" sz="2400" dirty="0" smtClean="0"/>
+              <a:t> some </a:t>
+            </a:r>
+            <a:r>
+              <a:rPr lang="en-US" sz="2400" dirty="0" smtClean="0"/>
+              <a:t>@D*</a:t>
+            </a:r>
+            <a:r>
+              <a:rPr lang="en-US" sz="2400" dirty="0" smtClean="0"/>
+              <a:t>(</a:t>
+            </a:r>
+            <a:r>
+              <a:rPr lang="en-US" sz="2400" dirty="0" err="1" smtClean="0"/>
+              <a:t>rdfs:label</a:t>
+            </a:r>
+            <a:r>
+              <a:rPr lang="en-US" sz="2400" dirty="0" smtClean="0"/>
+              <a:t>),</a:t>
+            </a:r>
+          </a:p>
+          <a:p>
+            <a:endParaRPr lang="en-US" sz="2400" dirty="0" smtClean="0"/>
+          </a:p>
+          <a:p>
+            <a:endParaRPr lang="en-US" sz="2400" dirty="0" smtClean="0"/>
+          </a:p>
+          <a:p>
+            <a:endParaRPr lang="en-GB" sz="2400" dirty="0" smtClean="0"/>
+          </a:p>
+          <a:p>
+            <a:endParaRPr lang="en-GB" sz="2400" dirty="0"/>
+          </a:p>
+        </p:txBody>
+      </p:sp>
+      <p:pic>
+        <p:nvPicPr>
+          <p:cNvPr id="7" name="Picture 6"/>
+          <p:cNvPicPr>
+            <a:picLocks noChangeAspect="1"/>
+          </p:cNvPicPr>
+          <p:nvPr/>
+        </p:nvPicPr>
+        <p:blipFill>
+          <a:blip r:embed="rId3"/>
+          <a:stretch>
+            <a:fillRect/>
+          </a:stretch>
+        </p:blipFill>
+        <p:spPr>
+          <a:xfrm>
+            <a:off x="80962" y="3393799"/>
+            <a:ext cx="9023350" cy="1680935"/>
+          </a:xfrm>
+          <a:prstGeom prst="rect">
+            <a:avLst/>
+          </a:prstGeom>
+        </p:spPr>
+      </p:pic>
+      <p:pic>
+        <p:nvPicPr>
+          <p:cNvPr id="8" name="Picture 7"/>
+          <p:cNvPicPr>
+            <a:picLocks noChangeAspect="1"/>
+          </p:cNvPicPr>
+          <p:nvPr/>
+        </p:nvPicPr>
+        <p:blipFill>
+          <a:blip r:embed="rId4"/>
+          <a:stretch>
+            <a:fillRect/>
+          </a:stretch>
+        </p:blipFill>
+        <p:spPr>
+          <a:xfrm>
+            <a:off x="80962" y="1417638"/>
+            <a:ext cx="4325720" cy="1280917"/>
+          </a:xfrm>
+          <a:prstGeom prst="rect">
+            <a:avLst/>
+          </a:prstGeom>
+        </p:spPr>
+      </p:pic>
+      <p:pic>
+        <p:nvPicPr>
+          <p:cNvPr id="9" name="Picture 8"/>
+          <p:cNvPicPr>
+            <a:picLocks noChangeAspect="1"/>
+          </p:cNvPicPr>
+          <p:nvPr/>
+        </p:nvPicPr>
+        <p:blipFill>
+          <a:blip r:embed="rId5"/>
+          <a:stretch>
+            <a:fillRect/>
+          </a:stretch>
+        </p:blipFill>
+        <p:spPr>
+          <a:xfrm>
+            <a:off x="4397511" y="1599368"/>
+            <a:ext cx="4746489" cy="1099187"/>
+          </a:xfrm>
+          <a:prstGeom prst="rect">
+            <a:avLst/>
+          </a:prstGeom>
+        </p:spPr>
+      </p:pic>
+    </p:spTree>
+    <p:extLst>
+      <p:ext uri="{BB962C8B-B14F-4D97-AF65-F5344CB8AC3E}">
+        <p14:creationId xmlns:p14="http://schemas.microsoft.com/office/powerpoint/2010/main" xmlns:p="http://schemas.openxmlformats.org/presentationml/2006/main" xmlns:r="http://schemas.openxmlformats.org/officeDocument/2006/relationships" xmlns:a="http://schemas.openxmlformats.org/drawingml/2006/main" xmlns="" val="3020082651"/>
+      </p:ext>
+    </p:extLst>
+  </p:cSld>
+  <p:clrMapOvr>
+    <a:masterClrMapping/>
+  </p:clrMapOvr>
+  <p:timing>
+    <p:tnLst>
+      <p:par>
+        <p:cTn id="1" dur="indefinite" restart="never" nodeType="tmRoot"/>
+      </p:par>
+    </p:tnLst>
+  </p:timing>
+</p:sld>
+</file>
+
+<file path=ppt/slides/slide11.xml><?xml version="1.0" encoding="utf-8"?>
+<p:sld xmlns:a="http://schemas.openxmlformats.org/drawingml/2006/main" xmlns:r="http://schemas.openxmlformats.org/officeDocument/2006/relationships" xmlns:mc="http://schemas.openxmlformats.org/markup-compatibility/2006" xmlns:mv="urn:schemas-microsoft-com:mac:vml" xmlns:p="http://schemas.openxmlformats.org/presentationml/2006/main" mc:Ignorable="mv" mc:PreserveAttributes="mv:*">
+  <p:cSld>
+    <p:spTree>
+      <p:nvGrpSpPr>
+        <p:cNvPr id="1" name=""/>
+        <p:cNvGrpSpPr/>
+        <p:nvPr/>
+      </p:nvGrpSpPr>
+      <p:grpSpPr>
+        <a:xfrm>
+          <a:off x="0" y="0"/>
+          <a:ext cx="0" cy="0"/>
+          <a:chOff x="0" y="0"/>
+          <a:chExt cx="0" cy="0"/>
+        </a:xfrm>
+      </p:grpSpPr>
+      <p:sp>
+        <p:nvSpPr>
+          <p:cNvPr id="2" name="Title 1"/>
+          <p:cNvSpPr>
+            <a:spLocks noGrp="1"/>
+          </p:cNvSpPr>
+          <p:nvPr>
+            <p:ph type="title"/>
+          </p:nvPr>
+        </p:nvSpPr>
+        <p:spPr/>
+        <p:txBody>
+          <a:bodyPr/>
+          <a:lstStyle/>
+          <a:p>
+            <a:r>
+              <a:rPr lang="en-GB" dirty="0" smtClean="0"/>
               <a:t>Future Work</a:t>
             </a:r>
             <a:endParaRPr lang="en-GB" dirty="0"/>
@@ -4146,7 +4400,7 @@
 </p:sld>
 </file>
 
-<file path=ppt/slides/slide11.xml><?xml version="1.0" encoding="utf-8"?>
+<file path=ppt/slides/slide12.xml><?xml version="1.0" encoding="utf-8"?>
 <p:sld xmlns:a="http://schemas.openxmlformats.org/drawingml/2006/main" xmlns:r="http://schemas.openxmlformats.org/officeDocument/2006/relationships" xmlns:mc="http://schemas.openxmlformats.org/markup-compatibility/2006" xmlns:mv="urn:schemas-microsoft-com:mac:vml" xmlns:p="http://schemas.openxmlformats.org/presentationml/2006/main" mc:Ignorable="mv" mc:PreserveAttributes="mv:*">
   <p:cSld>
     <p:spTree>
@@ -4840,6 +5094,55 @@
           </a:prstGeom>
         </p:spPr>
       </p:pic>
+      <p:sp>
+        <p:nvSpPr>
+          <p:cNvPr id="7" name="TextBox 6"/>
+          <p:cNvSpPr txBox="1"/>
+          <p:nvPr/>
+        </p:nvSpPr>
+        <p:spPr>
+          <a:xfrm>
+            <a:off x="2619304" y="6190802"/>
+            <a:ext cx="3720602" cy="646331"/>
+          </a:xfrm>
+          <a:prstGeom prst="rect">
+            <a:avLst/>
+          </a:prstGeom>
+          <a:solidFill>
+            <a:schemeClr val="tx1"/>
+          </a:solidFill>
+        </p:spPr>
+        <p:txBody>
+          <a:bodyPr wrap="square" rtlCol="0">
+            <a:spAutoFit/>
+          </a:bodyPr>
+          <a:lstStyle/>
+          <a:p>
+            <a:r>
+              <a:rPr lang="en-US" sz="1200" dirty="0" smtClean="0">
+                <a:solidFill>
+                  <a:srgbClr val="000000"/>
+                </a:solidFill>
+              </a:rPr>
+              <a:t>Processing the Spreadsheet with Mapping Master</a:t>
+            </a:r>
+          </a:p>
+          <a:p>
+            <a:endParaRPr lang="en-US" sz="1200" dirty="0" smtClean="0">
+              <a:solidFill>
+                <a:srgbClr val="000000"/>
+              </a:solidFill>
+            </a:endParaRPr>
+          </a:p>
+          <a:p>
+            <a:endParaRPr lang="en-US" sz="1200" dirty="0">
+              <a:solidFill>
+                <a:srgbClr val="000000"/>
+              </a:solidFill>
+            </a:endParaRPr>
+          </a:p>
+        </p:txBody>
+      </p:sp>
     </p:spTree>
     <p:extLst>
       <p:ext uri="{BB962C8B-B14F-4D97-AF65-F5344CB8AC3E}">
@@ -5318,6 +5621,181 @@
 </file>
 
 <file path=ppt/slides/slide7.xml><?xml version="1.0" encoding="utf-8"?>
+<p:sld xmlns:a="http://schemas.openxmlformats.org/drawingml/2006/main" xmlns:r="http://schemas.openxmlformats.org/officeDocument/2006/relationships" xmlns:mc="http://schemas.openxmlformats.org/markup-compatibility/2006" xmlns:mv="urn:schemas-microsoft-com:mac:vml" xmlns:p="http://schemas.openxmlformats.org/presentationml/2006/main" mc:Ignorable="mv" mc:PreserveAttributes="mv:*">
+  <p:cSld>
+    <p:spTree>
+      <p:nvGrpSpPr>
+        <p:cNvPr id="1" name=""/>
+        <p:cNvGrpSpPr/>
+        <p:nvPr/>
+      </p:nvGrpSpPr>
+      <p:grpSpPr>
+        <a:xfrm>
+          <a:off x="0" y="0"/>
+          <a:ext cx="0" cy="0"/>
+          <a:chOff x="0" y="0"/>
+          <a:chExt cx="0" cy="0"/>
+        </a:xfrm>
+      </p:grpSpPr>
+      <p:sp>
+        <p:nvSpPr>
+          <p:cNvPr id="2" name="Title 1"/>
+          <p:cNvSpPr>
+            <a:spLocks noGrp="1"/>
+          </p:cNvSpPr>
+          <p:nvPr>
+            <p:ph type="title"/>
+          </p:nvPr>
+        </p:nvSpPr>
+        <p:spPr/>
+        <p:txBody>
+          <a:bodyPr/>
+          <a:lstStyle/>
+          <a:p>
+            <a:r>
+              <a:rPr lang="en-GB" dirty="0" smtClean="0"/>
+              <a:t>QTT example</a:t>
+            </a:r>
+            <a:endParaRPr lang="en-GB" dirty="0"/>
+          </a:p>
+        </p:txBody>
+      </p:sp>
+      <p:pic>
+        <p:nvPicPr>
+          <p:cNvPr id="4" name="Picture 3" descr="Screen shot 2011-07-20 at 16.05.51.png"/>
+          <p:cNvPicPr>
+            <a:picLocks noChangeAspect="1"/>
+          </p:cNvPicPr>
+          <p:nvPr/>
+        </p:nvPicPr>
+        <p:blipFill rotWithShape="1">
+          <a:blip r:embed="rId2">
+            <a:extLst>
+              <a:ext uri="{28A0092B-C50C-407E-A947-70E740481C1C}">
+                <a14:useLocalDpi xmlns="" xmlns:a="http://schemas.openxmlformats.org/drawingml/2006/main" xmlns:r="http://schemas.openxmlformats.org/officeDocument/2006/relationships" xmlns:p="http://schemas.openxmlformats.org/presentationml/2006/main" xmlns:a14="http://schemas.microsoft.com/office/drawing/2010/main" xmlns:mv="urn:schemas-microsoft-com:mac:vml" xmlns:mc="http://schemas.openxmlformats.org/markup-compatibility/2006" val="0"/>
+              </a:ext>
+            </a:extLst>
+          </a:blip>
+          <a:srcRect t="2534" b="-2534"/>
+          <a:stretch/>
+        </p:blipFill>
+        <p:spPr>
+          <a:xfrm>
+            <a:off x="0" y="1715448"/>
+            <a:ext cx="9144000" cy="2861388"/>
+          </a:xfrm>
+          <a:prstGeom prst="rect">
+            <a:avLst/>
+          </a:prstGeom>
+        </p:spPr>
+      </p:pic>
+      <p:sp>
+        <p:nvSpPr>
+          <p:cNvPr id="3" name="TextBox 2"/>
+          <p:cNvSpPr txBox="1"/>
+          <p:nvPr/>
+        </p:nvSpPr>
+        <p:spPr>
+          <a:xfrm>
+            <a:off x="167090" y="4576836"/>
+            <a:ext cx="8822352" cy="2677656"/>
+          </a:xfrm>
+          <a:prstGeom prst="rect">
+            <a:avLst/>
+          </a:prstGeom>
+          <a:noFill/>
+        </p:spPr>
+        <p:txBody>
+          <a:bodyPr wrap="square" rtlCol="0">
+            <a:spAutoFit/>
+          </a:bodyPr>
+          <a:lstStyle/>
+          <a:p>
+            <a:r>
+              <a:rPr lang="en-GB" sz="2400" u="sng" dirty="0" smtClean="0"/>
+              <a:t>Target Ontology: </a:t>
+            </a:r>
+            <a:r>
+              <a:rPr lang="en-GB" sz="2400" dirty="0" err="1" smtClean="0"/>
+              <a:t>OBI.owl</a:t>
+            </a:r>
+            <a:endParaRPr lang="en-GB" sz="2400" dirty="0" smtClean="0"/>
+          </a:p>
+          <a:p>
+            <a:r>
+              <a:rPr lang="en-GB" sz="2400" u="sng" dirty="0" smtClean="0"/>
+              <a:t>Constraints</a:t>
+            </a:r>
+            <a:r>
+              <a:rPr lang="en-GB" sz="2400" dirty="0" smtClean="0"/>
+              <a:t>: </a:t>
+            </a:r>
+          </a:p>
+          <a:p>
+            <a:pPr marL="342900" indent="-342900">
+              <a:buFont typeface="Arial"/>
+              <a:buChar char="•"/>
+            </a:pPr>
+            <a:r>
+              <a:rPr lang="en-GB" sz="2400" dirty="0" smtClean="0"/>
+              <a:t>Map terms (or submit if not available) to compatible ontologies (i.e. sharing the same top level ontology, here BFO 1.1)</a:t>
+            </a:r>
+          </a:p>
+          <a:p>
+            <a:pPr marL="342900" indent="-342900">
+              <a:buFont typeface="Arial"/>
+              <a:buChar char="•"/>
+            </a:pPr>
+            <a:r>
+              <a:rPr lang="en-GB" sz="2400" dirty="0" smtClean="0"/>
+              <a:t>Import those terms </a:t>
+            </a:r>
+            <a:r>
+              <a:rPr lang="en-GB" sz="2400" dirty="0" err="1" smtClean="0"/>
+              <a:t>External.owl</a:t>
+            </a:r>
+            <a:r>
+              <a:rPr lang="en-GB" sz="2400" dirty="0" smtClean="0"/>
+              <a:t> + </a:t>
+            </a:r>
+            <a:r>
+              <a:rPr lang="en-GB" sz="2400" dirty="0" err="1" smtClean="0"/>
+              <a:t>ExternalDerived.owl</a:t>
+            </a:r>
+            <a:r>
+              <a:rPr lang="en-GB" sz="2400" dirty="0" smtClean="0"/>
+              <a:t> files</a:t>
+            </a:r>
+          </a:p>
+          <a:p>
+            <a:endParaRPr lang="en-GB" sz="2400" dirty="0" smtClean="0"/>
+          </a:p>
+          <a:p>
+            <a:endParaRPr lang="en-GB" sz="2400" dirty="0"/>
+          </a:p>
+        </p:txBody>
+      </p:sp>
+    </p:spTree>
+    <p:extLst>
+      <p:ext uri="{BB962C8B-B14F-4D97-AF65-F5344CB8AC3E}">
+        <p14:creationId xmlns="" xmlns:a="http://schemas.openxmlformats.org/drawingml/2006/main" xmlns:r="http://schemas.openxmlformats.org/officeDocument/2006/relationships" xmlns:p="http://schemas.openxmlformats.org/presentationml/2006/main" xmlns:p14="http://schemas.microsoft.com/office/powerpoint/2010/main" xmlns:mv="urn:schemas-microsoft-com:mac:vml" xmlns:mc="http://schemas.openxmlformats.org/markup-compatibility/2006" val="3020082651"/>
+      </p:ext>
+    </p:extLst>
+  </p:cSld>
+  <p:clrMapOvr>
+    <a:masterClrMapping/>
+  </p:clrMapOvr>
+  <p:timing>
+    <p:tnLst>
+      <p:par>
+        <p:cTn id="1" dur="indefinite" restart="never" nodeType="tmRoot"/>
+      </p:par>
+    </p:tnLst>
+  </p:timing>
+</p:sld>
+</file>
+
+<file path=ppt/slides/slide8.xml><?xml version="1.0" encoding="utf-8"?>
 <p:sld xmlns:a="http://schemas.openxmlformats.org/drawingml/2006/main" xmlns:r="http://schemas.openxmlformats.org/officeDocument/2006/relationships" xmlns:mc="http://schemas.openxmlformats.org/markup-compatibility/2006" xmlns:mv="urn:schemas-microsoft-com:mac:vml" xmlns:p="http://schemas.openxmlformats.org/presentationml/2006/main" mc:Ignorable="mv" mc:PreserveAttributes="mv:*">
   <p:cSld>
     <p:spTree>
@@ -5409,7 +5887,7 @@
 </p:sld>
 </file>
 
-<file path=ppt/slides/slide8.xml><?xml version="1.0" encoding="utf-8"?>
+<file path=ppt/slides/slide9.xml><?xml version="1.0" encoding="utf-8"?>
 <p:sld xmlns:a="http://schemas.openxmlformats.org/drawingml/2006/main" xmlns:r="http://schemas.openxmlformats.org/officeDocument/2006/relationships" xmlns:mc="http://schemas.openxmlformats.org/markup-compatibility/2006" xmlns:mv="urn:schemas-microsoft-com:mac:vml" xmlns:p="http://schemas.openxmlformats.org/presentationml/2006/main" mc:Ignorable="mv" mc:PreserveAttributes="mv:*">
   <p:cSld>
     <p:spTree>
@@ -5611,259 +6089,6 @@
             </p:seq>
           </p:childTnLst>
         </p:cTn>
-      </p:par>
-    </p:tnLst>
-  </p:timing>
-</p:sld>
-</file>
-
-<file path=ppt/slides/slide9.xml><?xml version="1.0" encoding="utf-8"?>
-<p:sld xmlns:a="http://schemas.openxmlformats.org/drawingml/2006/main" xmlns:r="http://schemas.openxmlformats.org/officeDocument/2006/relationships" xmlns:mc="http://schemas.openxmlformats.org/markup-compatibility/2006" xmlns:mv="urn:schemas-microsoft-com:mac:vml" xmlns:p="http://schemas.openxmlformats.org/presentationml/2006/main" mc:Ignorable="mv" mc:PreserveAttributes="mv:*">
-  <p:cSld>
-    <p:spTree>
-      <p:nvGrpSpPr>
-        <p:cNvPr id="1" name=""/>
-        <p:cNvGrpSpPr/>
-        <p:nvPr/>
-      </p:nvGrpSpPr>
-      <p:grpSpPr>
-        <a:xfrm>
-          <a:off x="0" y="0"/>
-          <a:ext cx="0" cy="0"/>
-          <a:chOff x="0" y="0"/>
-          <a:chExt cx="0" cy="0"/>
-        </a:xfrm>
-      </p:grpSpPr>
-      <p:sp>
-        <p:nvSpPr>
-          <p:cNvPr id="2" name="Title 1"/>
-          <p:cNvSpPr>
-            <a:spLocks noGrp="1"/>
-          </p:cNvSpPr>
-          <p:nvPr>
-            <p:ph type="title"/>
-          </p:nvPr>
-        </p:nvSpPr>
-        <p:spPr/>
-        <p:txBody>
-          <a:bodyPr/>
-          <a:lstStyle/>
-          <a:p>
-            <a:r>
-              <a:rPr lang="en-GB" dirty="0" smtClean="0"/>
-              <a:t>Device example</a:t>
-            </a:r>
-            <a:endParaRPr lang="en-GB" dirty="0"/>
-          </a:p>
-        </p:txBody>
-      </p:sp>
-      <p:sp>
-        <p:nvSpPr>
-          <p:cNvPr id="3" name="TextBox 2"/>
-          <p:cNvSpPr txBox="1"/>
-          <p:nvPr/>
-        </p:nvSpPr>
-        <p:spPr>
-          <a:xfrm>
-            <a:off x="167090" y="4576836"/>
-            <a:ext cx="8822352" cy="3785652"/>
-          </a:xfrm>
-          <a:prstGeom prst="rect">
-            <a:avLst/>
-          </a:prstGeom>
-          <a:noFill/>
-        </p:spPr>
-        <p:txBody>
-          <a:bodyPr wrap="square" rtlCol="0">
-            <a:spAutoFit/>
-          </a:bodyPr>
-          <a:lstStyle/>
-          <a:p>
-            <a:endParaRPr lang="en-US" sz="2400" dirty="0" smtClean="0"/>
-          </a:p>
-          <a:p>
-            <a:endParaRPr lang="en-US" sz="2400" dirty="0" smtClean="0"/>
-          </a:p>
-          <a:p>
-            <a:r>
-              <a:rPr lang="en-US" sz="2400" dirty="0" smtClean="0"/>
-              <a:t>Class</a:t>
-            </a:r>
-            <a:r>
-              <a:rPr lang="en-US" sz="2400" dirty="0" smtClean="0"/>
-              <a:t>: @A*(</a:t>
-            </a:r>
-            <a:r>
-              <a:rPr lang="en-US" sz="2400" dirty="0" err="1" smtClean="0"/>
-              <a:t>rdfs:label</a:t>
-            </a:r>
-            <a:r>
-              <a:rPr lang="en-US" sz="2400" dirty="0" smtClean="0"/>
-              <a:t>)</a:t>
-            </a:r>
-          </a:p>
-          <a:p>
-            <a:r>
-              <a:rPr lang="en-US" sz="2400" dirty="0" err="1" smtClean="0"/>
-              <a:t>SubClassOf</a:t>
-            </a:r>
-            <a:r>
-              <a:rPr lang="en-US" sz="2400" dirty="0" smtClean="0"/>
-              <a:t>: @B*(</a:t>
-            </a:r>
-            <a:r>
-              <a:rPr lang="en-US" sz="2400" dirty="0" err="1" smtClean="0"/>
-              <a:t>rdfs:label</a:t>
-            </a:r>
-            <a:r>
-              <a:rPr lang="en-US" sz="2400" dirty="0" smtClean="0"/>
-              <a:t>),</a:t>
-            </a:r>
-          </a:p>
-          <a:p>
-            <a:r>
-              <a:rPr lang="en-US" sz="2400" dirty="0" err="1" smtClean="0"/>
-              <a:t>has_function</a:t>
-            </a:r>
-            <a:r>
-              <a:rPr lang="en-US" sz="2400" dirty="0" smtClean="0"/>
-              <a:t> some @C*(</a:t>
-            </a:r>
-            <a:r>
-              <a:rPr lang="en-US" sz="2400" dirty="0" err="1" smtClean="0"/>
-              <a:t>rdfs:label</a:t>
-            </a:r>
-            <a:r>
-              <a:rPr lang="en-US" sz="2400" dirty="0" smtClean="0"/>
-              <a:t>),</a:t>
-            </a:r>
-          </a:p>
-          <a:p>
-            <a:r>
-              <a:rPr lang="en-US" sz="2400" dirty="0" err="1" smtClean="0"/>
-              <a:t>has_function</a:t>
-            </a:r>
-            <a:r>
-              <a:rPr lang="en-US" sz="2400" dirty="0" smtClean="0"/>
-              <a:t> some </a:t>
-            </a:r>
-            <a:r>
-              <a:rPr lang="en-US" sz="2400" dirty="0" smtClean="0"/>
-              <a:t>@D*</a:t>
-            </a:r>
-            <a:r>
-              <a:rPr lang="en-US" sz="2400" dirty="0" smtClean="0"/>
-              <a:t>(</a:t>
-            </a:r>
-            <a:r>
-              <a:rPr lang="en-US" sz="2400" dirty="0" err="1" smtClean="0"/>
-              <a:t>rdfs:label</a:t>
-            </a:r>
-            <a:r>
-              <a:rPr lang="en-US" sz="2400" dirty="0" smtClean="0"/>
-              <a:t>),</a:t>
-            </a:r>
-          </a:p>
-          <a:p>
-            <a:endParaRPr lang="en-US" sz="2400" dirty="0" smtClean="0"/>
-          </a:p>
-          <a:p>
-            <a:endParaRPr lang="en-US" sz="2400" dirty="0" smtClean="0"/>
-          </a:p>
-          <a:p>
-            <a:endParaRPr lang="en-GB" sz="2400" dirty="0" smtClean="0"/>
-          </a:p>
-          <a:p>
-            <a:endParaRPr lang="en-GB" sz="2400" dirty="0"/>
-          </a:p>
-        </p:txBody>
-      </p:sp>
-      <p:pic>
-        <p:nvPicPr>
-          <p:cNvPr id="7" name="Picture 6"/>
-          <p:cNvPicPr>
-            <a:picLocks noChangeAspect="1"/>
-          </p:cNvPicPr>
-          <p:nvPr/>
-        </p:nvPicPr>
-        <p:blipFill>
-          <a:blip r:embed="rId3"/>
-          <a:stretch>
-            <a:fillRect/>
-          </a:stretch>
-        </p:blipFill>
-        <p:spPr>
-          <a:xfrm>
-            <a:off x="80962" y="3393799"/>
-            <a:ext cx="9023350" cy="1680935"/>
-          </a:xfrm>
-          <a:prstGeom prst="rect">
-            <a:avLst/>
-          </a:prstGeom>
-        </p:spPr>
-      </p:pic>
-      <p:pic>
-        <p:nvPicPr>
-          <p:cNvPr id="8" name="Picture 7"/>
-          <p:cNvPicPr>
-            <a:picLocks noChangeAspect="1"/>
-          </p:cNvPicPr>
-          <p:nvPr/>
-        </p:nvPicPr>
-        <p:blipFill>
-          <a:blip r:embed="rId4"/>
-          <a:stretch>
-            <a:fillRect/>
-          </a:stretch>
-        </p:blipFill>
-        <p:spPr>
-          <a:xfrm>
-            <a:off x="80962" y="1417638"/>
-            <a:ext cx="4325720" cy="1280917"/>
-          </a:xfrm>
-          <a:prstGeom prst="rect">
-            <a:avLst/>
-          </a:prstGeom>
-        </p:spPr>
-      </p:pic>
-      <p:pic>
-        <p:nvPicPr>
-          <p:cNvPr id="9" name="Picture 8"/>
-          <p:cNvPicPr>
-            <a:picLocks noChangeAspect="1"/>
-          </p:cNvPicPr>
-          <p:nvPr/>
-        </p:nvPicPr>
-        <p:blipFill>
-          <a:blip r:embed="rId5"/>
-          <a:stretch>
-            <a:fillRect/>
-          </a:stretch>
-        </p:blipFill>
-        <p:spPr>
-          <a:xfrm>
-            <a:off x="4397511" y="1599368"/>
-            <a:ext cx="4746489" cy="1099187"/>
-          </a:xfrm>
-          <a:prstGeom prst="rect">
-            <a:avLst/>
-          </a:prstGeom>
-        </p:spPr>
-      </p:pic>
-    </p:spTree>
-    <p:extLst>
-      <p:ext uri="{BB962C8B-B14F-4D97-AF65-F5344CB8AC3E}">
-        <p14:creationId xmlns:p14="http://schemas.microsoft.com/office/powerpoint/2010/main" xmlns:p="http://schemas.openxmlformats.org/presentationml/2006/main" xmlns:r="http://schemas.openxmlformats.org/officeDocument/2006/relationships" xmlns:a="http://schemas.openxmlformats.org/drawingml/2006/main" xmlns="" val="3020082651"/>
-      </p:ext>
-    </p:extLst>
-  </p:cSld>
-  <p:clrMapOvr>
-    <a:masterClrMapping/>
-  </p:clrMapOvr>
-  <p:timing>
-    <p:tnLst>
-      <p:par>
-        <p:cTn id="1" dur="indefinite" restart="never" nodeType="tmRoot"/>
       </p:par>
     </p:tnLst>
   </p:timing>

</xml_diff>

<commit_message>
Updated eagle-i and QTT presentation
</commit_message>
<xml_diff>
--- a/docs/presentations/OBI tutorial July 2011 ICBO/OBI-QTT&designpatterns.pptx
+++ b/docs/presentations/OBI tutorial July 2011 ICBO/OBI-QTT&designpatterns.pptx
@@ -203,7 +203,8 @@
           <a:p>
             <a:fld id="{73EEEB17-80BA-6F46-B2E7-E6A22976B355}" type="datetimeFigureOut">
               <a:rPr lang="en-US" smtClean="0"/>
-              <a:t>7/25/11</a:t>
+              <a:pPr/>
+              <a:t>7/27/11</a:t>
             </a:fld>
             <a:endParaRPr lang="en-US"/>
           </a:p>
@@ -364,6 +365,7 @@
           <a:p>
             <a:fld id="{FDFB235A-217F-2747-A483-9C09F588E6D4}" type="slidenum">
               <a:rPr lang="en-US" smtClean="0"/>
+              <a:pPr/>
               <a:t>‹#›</a:t>
             </a:fld>
             <a:endParaRPr lang="en-US"/>
@@ -553,6 +555,7 @@
           <a:p>
             <a:fld id="{FDFB235A-217F-2747-A483-9C09F588E6D4}" type="slidenum">
               <a:rPr lang="en-US" smtClean="0"/>
+              <a:pPr/>
               <a:t>10</a:t>
             </a:fld>
             <a:endParaRPr lang="en-US"/>
@@ -749,7 +752,7 @@
             <a:fld id="{6BFECD78-3C8E-49F2-8FAB-59489D168ABB}" type="datetimeFigureOut">
               <a:rPr lang="en-US" smtClean="0"/>
               <a:pPr/>
-              <a:t>7/25/11</a:t>
+              <a:t>7/27/11</a:t>
             </a:fld>
             <a:endParaRPr lang="en-US"/>
           </a:p>
@@ -801,7 +804,7 @@
     </p:spTree>
     <p:extLst>
       <p:ext uri="{BB962C8B-B14F-4D97-AF65-F5344CB8AC3E}">
-        <p14:creationId xmlns:p14="http://schemas.microsoft.com/office/powerpoint/2010/main" xmlns:p="http://schemas.openxmlformats.org/presentationml/2006/main" xmlns:r="http://schemas.openxmlformats.org/officeDocument/2006/relationships" xmlns:a="http://schemas.openxmlformats.org/drawingml/2006/main" xmlns="" val="2702019936"/>
+        <p14:creationId xmlns="" xmlns:a="http://schemas.openxmlformats.org/drawingml/2006/main" xmlns:r="http://schemas.openxmlformats.org/officeDocument/2006/relationships" xmlns:p="http://schemas.openxmlformats.org/presentationml/2006/main" xmlns:p14="http://schemas.microsoft.com/office/powerpoint/2010/main" xmlns:mv="urn:schemas-microsoft-com:mac:vml" xmlns:mc="http://schemas.openxmlformats.org/markup-compatibility/2006" val="2702019936"/>
       </p:ext>
     </p:extLst>
   </p:cSld>
@@ -921,7 +924,7 @@
             <a:fld id="{6BFECD78-3C8E-49F2-8FAB-59489D168ABB}" type="datetimeFigureOut">
               <a:rPr lang="en-US" smtClean="0"/>
               <a:pPr/>
-              <a:t>7/25/11</a:t>
+              <a:t>7/27/11</a:t>
             </a:fld>
             <a:endParaRPr lang="en-US"/>
           </a:p>
@@ -973,7 +976,7 @@
     </p:spTree>
     <p:extLst>
       <p:ext uri="{BB962C8B-B14F-4D97-AF65-F5344CB8AC3E}">
-        <p14:creationId xmlns:p14="http://schemas.microsoft.com/office/powerpoint/2010/main" xmlns:p="http://schemas.openxmlformats.org/presentationml/2006/main" xmlns:r="http://schemas.openxmlformats.org/officeDocument/2006/relationships" xmlns:a="http://schemas.openxmlformats.org/drawingml/2006/main" xmlns="" val="2949498235"/>
+        <p14:creationId xmlns="" xmlns:a="http://schemas.openxmlformats.org/drawingml/2006/main" xmlns:r="http://schemas.openxmlformats.org/officeDocument/2006/relationships" xmlns:p="http://schemas.openxmlformats.org/presentationml/2006/main" xmlns:p14="http://schemas.microsoft.com/office/powerpoint/2010/main" xmlns:mv="urn:schemas-microsoft-com:mac:vml" xmlns:mc="http://schemas.openxmlformats.org/markup-compatibility/2006" val="2949498235"/>
       </p:ext>
     </p:extLst>
   </p:cSld>
@@ -1103,7 +1106,7 @@
             <a:fld id="{6BFECD78-3C8E-49F2-8FAB-59489D168ABB}" type="datetimeFigureOut">
               <a:rPr lang="en-US" smtClean="0"/>
               <a:pPr/>
-              <a:t>7/25/11</a:t>
+              <a:t>7/27/11</a:t>
             </a:fld>
             <a:endParaRPr lang="en-US"/>
           </a:p>
@@ -1155,7 +1158,7 @@
     </p:spTree>
     <p:extLst>
       <p:ext uri="{BB962C8B-B14F-4D97-AF65-F5344CB8AC3E}">
-        <p14:creationId xmlns:p14="http://schemas.microsoft.com/office/powerpoint/2010/main" xmlns:p="http://schemas.openxmlformats.org/presentationml/2006/main" xmlns:r="http://schemas.openxmlformats.org/officeDocument/2006/relationships" xmlns:a="http://schemas.openxmlformats.org/drawingml/2006/main" xmlns="" val="1427941222"/>
+        <p14:creationId xmlns="" xmlns:a="http://schemas.openxmlformats.org/drawingml/2006/main" xmlns:r="http://schemas.openxmlformats.org/officeDocument/2006/relationships" xmlns:p="http://schemas.openxmlformats.org/presentationml/2006/main" xmlns:p14="http://schemas.microsoft.com/office/powerpoint/2010/main" xmlns:mv="urn:schemas-microsoft-com:mac:vml" xmlns:mc="http://schemas.openxmlformats.org/markup-compatibility/2006" val="1427941222"/>
       </p:ext>
     </p:extLst>
   </p:cSld>
@@ -1275,7 +1278,7 @@
             <a:fld id="{6BFECD78-3C8E-49F2-8FAB-59489D168ABB}" type="datetimeFigureOut">
               <a:rPr lang="en-US" smtClean="0"/>
               <a:pPr/>
-              <a:t>7/25/11</a:t>
+              <a:t>7/27/11</a:t>
             </a:fld>
             <a:endParaRPr lang="en-US"/>
           </a:p>
@@ -1327,7 +1330,7 @@
     </p:spTree>
     <p:extLst>
       <p:ext uri="{BB962C8B-B14F-4D97-AF65-F5344CB8AC3E}">
-        <p14:creationId xmlns:p14="http://schemas.microsoft.com/office/powerpoint/2010/main" xmlns:p="http://schemas.openxmlformats.org/presentationml/2006/main" xmlns:r="http://schemas.openxmlformats.org/officeDocument/2006/relationships" xmlns:a="http://schemas.openxmlformats.org/drawingml/2006/main" xmlns="" val="2275933374"/>
+        <p14:creationId xmlns="" xmlns:a="http://schemas.openxmlformats.org/drawingml/2006/main" xmlns:r="http://schemas.openxmlformats.org/officeDocument/2006/relationships" xmlns:p="http://schemas.openxmlformats.org/presentationml/2006/main" xmlns:p14="http://schemas.microsoft.com/office/powerpoint/2010/main" xmlns:mv="urn:schemas-microsoft-com:mac:vml" xmlns:mc="http://schemas.openxmlformats.org/markup-compatibility/2006" val="2275933374"/>
       </p:ext>
     </p:extLst>
   </p:cSld>
@@ -1523,7 +1526,7 @@
             <a:fld id="{6BFECD78-3C8E-49F2-8FAB-59489D168ABB}" type="datetimeFigureOut">
               <a:rPr lang="en-US" smtClean="0"/>
               <a:pPr/>
-              <a:t>7/25/11</a:t>
+              <a:t>7/27/11</a:t>
             </a:fld>
             <a:endParaRPr lang="en-US"/>
           </a:p>
@@ -1575,7 +1578,7 @@
     </p:spTree>
     <p:extLst>
       <p:ext uri="{BB962C8B-B14F-4D97-AF65-F5344CB8AC3E}">
-        <p14:creationId xmlns:p14="http://schemas.microsoft.com/office/powerpoint/2010/main" xmlns:p="http://schemas.openxmlformats.org/presentationml/2006/main" xmlns:r="http://schemas.openxmlformats.org/officeDocument/2006/relationships" xmlns:a="http://schemas.openxmlformats.org/drawingml/2006/main" xmlns="" val="1798952600"/>
+        <p14:creationId xmlns="" xmlns:a="http://schemas.openxmlformats.org/drawingml/2006/main" xmlns:r="http://schemas.openxmlformats.org/officeDocument/2006/relationships" xmlns:p="http://schemas.openxmlformats.org/presentationml/2006/main" xmlns:p14="http://schemas.microsoft.com/office/powerpoint/2010/main" xmlns:mv="urn:schemas-microsoft-com:mac:vml" xmlns:mc="http://schemas.openxmlformats.org/markup-compatibility/2006" val="1798952600"/>
       </p:ext>
     </p:extLst>
   </p:cSld>
@@ -1813,7 +1816,7 @@
             <a:fld id="{6BFECD78-3C8E-49F2-8FAB-59489D168ABB}" type="datetimeFigureOut">
               <a:rPr lang="en-US" smtClean="0"/>
               <a:pPr/>
-              <a:t>7/25/11</a:t>
+              <a:t>7/27/11</a:t>
             </a:fld>
             <a:endParaRPr lang="en-US"/>
           </a:p>
@@ -1865,7 +1868,7 @@
     </p:spTree>
     <p:extLst>
       <p:ext uri="{BB962C8B-B14F-4D97-AF65-F5344CB8AC3E}">
-        <p14:creationId xmlns:p14="http://schemas.microsoft.com/office/powerpoint/2010/main" xmlns:p="http://schemas.openxmlformats.org/presentationml/2006/main" xmlns:r="http://schemas.openxmlformats.org/officeDocument/2006/relationships" xmlns:a="http://schemas.openxmlformats.org/drawingml/2006/main" xmlns="" val="1034301619"/>
+        <p14:creationId xmlns="" xmlns:a="http://schemas.openxmlformats.org/drawingml/2006/main" xmlns:r="http://schemas.openxmlformats.org/officeDocument/2006/relationships" xmlns:p="http://schemas.openxmlformats.org/presentationml/2006/main" xmlns:p14="http://schemas.microsoft.com/office/powerpoint/2010/main" xmlns:mv="urn:schemas-microsoft-com:mac:vml" xmlns:mc="http://schemas.openxmlformats.org/markup-compatibility/2006" val="1034301619"/>
       </p:ext>
     </p:extLst>
   </p:cSld>
@@ -2237,7 +2240,7 @@
             <a:fld id="{6BFECD78-3C8E-49F2-8FAB-59489D168ABB}" type="datetimeFigureOut">
               <a:rPr lang="en-US" smtClean="0"/>
               <a:pPr/>
-              <a:t>7/25/11</a:t>
+              <a:t>7/27/11</a:t>
             </a:fld>
             <a:endParaRPr lang="en-US"/>
           </a:p>
@@ -2289,7 +2292,7 @@
     </p:spTree>
     <p:extLst>
       <p:ext uri="{BB962C8B-B14F-4D97-AF65-F5344CB8AC3E}">
-        <p14:creationId xmlns:p14="http://schemas.microsoft.com/office/powerpoint/2010/main" xmlns:p="http://schemas.openxmlformats.org/presentationml/2006/main" xmlns:r="http://schemas.openxmlformats.org/officeDocument/2006/relationships" xmlns:a="http://schemas.openxmlformats.org/drawingml/2006/main" xmlns="" val="1417940929"/>
+        <p14:creationId xmlns="" xmlns:a="http://schemas.openxmlformats.org/drawingml/2006/main" xmlns:r="http://schemas.openxmlformats.org/officeDocument/2006/relationships" xmlns:p="http://schemas.openxmlformats.org/presentationml/2006/main" xmlns:p14="http://schemas.microsoft.com/office/powerpoint/2010/main" xmlns:mv="urn:schemas-microsoft-com:mac:vml" xmlns:mc="http://schemas.openxmlformats.org/markup-compatibility/2006" val="1417940929"/>
       </p:ext>
     </p:extLst>
   </p:cSld>
@@ -2357,7 +2360,7 @@
             <a:fld id="{6BFECD78-3C8E-49F2-8FAB-59489D168ABB}" type="datetimeFigureOut">
               <a:rPr lang="en-US" smtClean="0"/>
               <a:pPr/>
-              <a:t>7/25/11</a:t>
+              <a:t>7/27/11</a:t>
             </a:fld>
             <a:endParaRPr lang="en-US"/>
           </a:p>
@@ -2409,7 +2412,7 @@
     </p:spTree>
     <p:extLst>
       <p:ext uri="{BB962C8B-B14F-4D97-AF65-F5344CB8AC3E}">
-        <p14:creationId xmlns:p14="http://schemas.microsoft.com/office/powerpoint/2010/main" xmlns:p="http://schemas.openxmlformats.org/presentationml/2006/main" xmlns:r="http://schemas.openxmlformats.org/officeDocument/2006/relationships" xmlns:a="http://schemas.openxmlformats.org/drawingml/2006/main" xmlns="" val="656067729"/>
+        <p14:creationId xmlns="" xmlns:a="http://schemas.openxmlformats.org/drawingml/2006/main" xmlns:r="http://schemas.openxmlformats.org/officeDocument/2006/relationships" xmlns:p="http://schemas.openxmlformats.org/presentationml/2006/main" xmlns:p14="http://schemas.microsoft.com/office/powerpoint/2010/main" xmlns:mv="urn:schemas-microsoft-com:mac:vml" xmlns:mc="http://schemas.openxmlformats.org/markup-compatibility/2006" val="656067729"/>
       </p:ext>
     </p:extLst>
   </p:cSld>
@@ -2454,7 +2457,7 @@
             <a:fld id="{6BFECD78-3C8E-49F2-8FAB-59489D168ABB}" type="datetimeFigureOut">
               <a:rPr lang="en-US" smtClean="0"/>
               <a:pPr/>
-              <a:t>7/25/11</a:t>
+              <a:t>7/27/11</a:t>
             </a:fld>
             <a:endParaRPr lang="en-US"/>
           </a:p>
@@ -2506,7 +2509,7 @@
     </p:spTree>
     <p:extLst>
       <p:ext uri="{BB962C8B-B14F-4D97-AF65-F5344CB8AC3E}">
-        <p14:creationId xmlns:p14="http://schemas.microsoft.com/office/powerpoint/2010/main" xmlns:p="http://schemas.openxmlformats.org/presentationml/2006/main" xmlns:r="http://schemas.openxmlformats.org/officeDocument/2006/relationships" xmlns:a="http://schemas.openxmlformats.org/drawingml/2006/main" xmlns="" val="1249128790"/>
+        <p14:creationId xmlns="" xmlns:a="http://schemas.openxmlformats.org/drawingml/2006/main" xmlns:r="http://schemas.openxmlformats.org/officeDocument/2006/relationships" xmlns:p="http://schemas.openxmlformats.org/presentationml/2006/main" xmlns:p14="http://schemas.microsoft.com/office/powerpoint/2010/main" xmlns:mv="urn:schemas-microsoft-com:mac:vml" xmlns:mc="http://schemas.openxmlformats.org/markup-compatibility/2006" val="1249128790"/>
       </p:ext>
     </p:extLst>
   </p:cSld>
@@ -2733,7 +2736,7 @@
             <a:fld id="{6BFECD78-3C8E-49F2-8FAB-59489D168ABB}" type="datetimeFigureOut">
               <a:rPr lang="en-US" smtClean="0"/>
               <a:pPr/>
-              <a:t>7/25/11</a:t>
+              <a:t>7/27/11</a:t>
             </a:fld>
             <a:endParaRPr lang="en-US"/>
           </a:p>
@@ -2785,7 +2788,7 @@
     </p:spTree>
     <p:extLst>
       <p:ext uri="{BB962C8B-B14F-4D97-AF65-F5344CB8AC3E}">
-        <p14:creationId xmlns:p14="http://schemas.microsoft.com/office/powerpoint/2010/main" xmlns:p="http://schemas.openxmlformats.org/presentationml/2006/main" xmlns:r="http://schemas.openxmlformats.org/officeDocument/2006/relationships" xmlns:a="http://schemas.openxmlformats.org/drawingml/2006/main" xmlns="" val="2730116199"/>
+        <p14:creationId xmlns="" xmlns:a="http://schemas.openxmlformats.org/drawingml/2006/main" xmlns:r="http://schemas.openxmlformats.org/officeDocument/2006/relationships" xmlns:p="http://schemas.openxmlformats.org/presentationml/2006/main" xmlns:p14="http://schemas.microsoft.com/office/powerpoint/2010/main" xmlns:mv="urn:schemas-microsoft-com:mac:vml" xmlns:mc="http://schemas.openxmlformats.org/markup-compatibility/2006" val="2730116199"/>
       </p:ext>
     </p:extLst>
   </p:cSld>
@@ -2992,7 +2995,7 @@
             <a:fld id="{6BFECD78-3C8E-49F2-8FAB-59489D168ABB}" type="datetimeFigureOut">
               <a:rPr lang="en-US" smtClean="0"/>
               <a:pPr/>
-              <a:t>7/25/11</a:t>
+              <a:t>7/27/11</a:t>
             </a:fld>
             <a:endParaRPr lang="en-US"/>
           </a:p>
@@ -3044,7 +3047,7 @@
     </p:spTree>
     <p:extLst>
       <p:ext uri="{BB962C8B-B14F-4D97-AF65-F5344CB8AC3E}">
-        <p14:creationId xmlns:p14="http://schemas.microsoft.com/office/powerpoint/2010/main" xmlns:p="http://schemas.openxmlformats.org/presentationml/2006/main" xmlns:r="http://schemas.openxmlformats.org/officeDocument/2006/relationships" xmlns:a="http://schemas.openxmlformats.org/drawingml/2006/main" xmlns="" val="506574558"/>
+        <p14:creationId xmlns="" xmlns:a="http://schemas.openxmlformats.org/drawingml/2006/main" xmlns:r="http://schemas.openxmlformats.org/officeDocument/2006/relationships" xmlns:p="http://schemas.openxmlformats.org/presentationml/2006/main" xmlns:p14="http://schemas.microsoft.com/office/powerpoint/2010/main" xmlns:mv="urn:schemas-microsoft-com:mac:vml" xmlns:mc="http://schemas.openxmlformats.org/markup-compatibility/2006" val="506574558"/>
       </p:ext>
     </p:extLst>
   </p:cSld>
@@ -3207,7 +3210,7 @@
             <a:fld id="{6BFECD78-3C8E-49F2-8FAB-59489D168ABB}" type="datetimeFigureOut">
               <a:rPr lang="en-US" smtClean="0"/>
               <a:pPr/>
-              <a:t>7/25/11</a:t>
+              <a:t>7/27/11</a:t>
             </a:fld>
             <a:endParaRPr lang="en-US"/>
           </a:p>
@@ -3295,7 +3298,7 @@
     </p:spTree>
     <p:extLst>
       <p:ext uri="{BB962C8B-B14F-4D97-AF65-F5344CB8AC3E}">
-        <p14:creationId xmlns:p14="http://schemas.microsoft.com/office/powerpoint/2010/main" xmlns:p="http://schemas.openxmlformats.org/presentationml/2006/main" xmlns:r="http://schemas.openxmlformats.org/officeDocument/2006/relationships" xmlns:a="http://schemas.openxmlformats.org/drawingml/2006/main" xmlns="" val="2557711237"/>
+        <p14:creationId xmlns="" xmlns:a="http://schemas.openxmlformats.org/drawingml/2006/main" xmlns:r="http://schemas.openxmlformats.org/officeDocument/2006/relationships" xmlns:p="http://schemas.openxmlformats.org/presentationml/2006/main" xmlns:p14="http://schemas.microsoft.com/office/powerpoint/2010/main" xmlns:mv="urn:schemas-microsoft-com:mac:vml" xmlns:mc="http://schemas.openxmlformats.org/markup-compatibility/2006" val="2557711237"/>
       </p:ext>
     </p:extLst>
   </p:cSld>
@@ -3738,7 +3741,7 @@
           <a:blip r:embed="rId3">
             <a:extLst>
               <a:ext uri="{28A0092B-C50C-407E-A947-70E740481C1C}">
-                <a14:useLocalDpi xmlns:a14="http://schemas.microsoft.com/office/drawing/2010/main" xmlns:p="http://schemas.openxmlformats.org/presentationml/2006/main" xmlns:r="http://schemas.openxmlformats.org/officeDocument/2006/relationships" xmlns:a="http://schemas.openxmlformats.org/drawingml/2006/main" xmlns="" val="0"/>
+                <a14:useLocalDpi xmlns="" xmlns:a="http://schemas.openxmlformats.org/drawingml/2006/main" xmlns:r="http://schemas.openxmlformats.org/officeDocument/2006/relationships" xmlns:p="http://schemas.openxmlformats.org/presentationml/2006/main" xmlns:a14="http://schemas.microsoft.com/office/drawing/2010/main" xmlns:mv="urn:schemas-microsoft-com:mac:vml" xmlns:mc="http://schemas.openxmlformats.org/markup-compatibility/2006" val="0"/>
               </a:ext>
             </a:extLst>
           </a:blip>
@@ -3761,14 +3764,14 @@
           </a:ln>
           <a:extLst>
             <a:ext uri="{909E8E84-426E-40dd-AFC4-6F175D3DCCD1}">
-              <a14:hiddenFill xmlns:a14="http://schemas.microsoft.com/office/drawing/2010/main" xmlns:p="http://schemas.openxmlformats.org/presentationml/2006/main" xmlns:r="http://schemas.openxmlformats.org/officeDocument/2006/relationships" xmlns:a="http://schemas.openxmlformats.org/drawingml/2006/main" xmlns="">
+              <a14:hiddenFill xmlns="" xmlns:a="http://schemas.openxmlformats.org/drawingml/2006/main" xmlns:r="http://schemas.openxmlformats.org/officeDocument/2006/relationships" xmlns:p="http://schemas.openxmlformats.org/presentationml/2006/main" xmlns:a14="http://schemas.microsoft.com/office/drawing/2010/main" xmlns:mv="urn:schemas-microsoft-com:mac:vml" xmlns:mc="http://schemas.openxmlformats.org/markup-compatibility/2006">
                 <a:solidFill>
                   <a:srgbClr val="FFFFFF"/>
                 </a:solidFill>
               </a14:hiddenFill>
             </a:ext>
             <a:ext uri="{91240B29-F687-4f45-9708-019B960494DF}">
-              <a14:hiddenLine xmlns:a14="http://schemas.microsoft.com/office/drawing/2010/main" xmlns:p="http://schemas.openxmlformats.org/presentationml/2006/main" xmlns:r="http://schemas.openxmlformats.org/officeDocument/2006/relationships" xmlns:a="http://schemas.openxmlformats.org/drawingml/2006/main" xmlns="" w="9525">
+              <a14:hiddenLine xmlns="" xmlns:a="http://schemas.openxmlformats.org/drawingml/2006/main" xmlns:r="http://schemas.openxmlformats.org/officeDocument/2006/relationships" xmlns:p="http://schemas.openxmlformats.org/presentationml/2006/main" xmlns:a14="http://schemas.microsoft.com/office/drawing/2010/main" xmlns:mv="urn:schemas-microsoft-com:mac:vml" xmlns:mc="http://schemas.openxmlformats.org/markup-compatibility/2006" w="9525">
                 <a:solidFill>
                   <a:srgbClr val="000000"/>
                 </a:solidFill>
@@ -3802,14 +3805,14 @@
           </a:ln>
           <a:extLst>
             <a:ext uri="{909E8E84-426E-40dd-AFC4-6F175D3DCCD1}">
-              <a14:hiddenFill xmlns:a14="http://schemas.microsoft.com/office/drawing/2010/main" xmlns:p="http://schemas.openxmlformats.org/presentationml/2006/main" xmlns:r="http://schemas.openxmlformats.org/officeDocument/2006/relationships" xmlns:a="http://schemas.openxmlformats.org/drawingml/2006/main" xmlns="">
+              <a14:hiddenFill xmlns="" xmlns:a="http://schemas.openxmlformats.org/drawingml/2006/main" xmlns:r="http://schemas.openxmlformats.org/officeDocument/2006/relationships" xmlns:p="http://schemas.openxmlformats.org/presentationml/2006/main" xmlns:a14="http://schemas.microsoft.com/office/drawing/2010/main" xmlns:mv="urn:schemas-microsoft-com:mac:vml" xmlns:mc="http://schemas.openxmlformats.org/markup-compatibility/2006">
                 <a:solidFill>
                   <a:srgbClr val="FFFFFF"/>
                 </a:solidFill>
               </a14:hiddenFill>
             </a:ext>
             <a:ext uri="{91240B29-F687-4f45-9708-019B960494DF}">
-              <a14:hiddenLine xmlns:a14="http://schemas.microsoft.com/office/drawing/2010/main" xmlns:p="http://schemas.openxmlformats.org/presentationml/2006/main" xmlns:r="http://schemas.openxmlformats.org/officeDocument/2006/relationships" xmlns:a="http://schemas.openxmlformats.org/drawingml/2006/main" xmlns="" w="9525">
+              <a14:hiddenLine xmlns="" xmlns:a="http://schemas.openxmlformats.org/drawingml/2006/main" xmlns:r="http://schemas.openxmlformats.org/officeDocument/2006/relationships" xmlns:p="http://schemas.openxmlformats.org/presentationml/2006/main" xmlns:a14="http://schemas.microsoft.com/office/drawing/2010/main" xmlns:mv="urn:schemas-microsoft-com:mac:vml" xmlns:mc="http://schemas.openxmlformats.org/markup-compatibility/2006" w="9525">
                 <a:solidFill>
                   <a:srgbClr val="000000"/>
                 </a:solidFill>
@@ -3898,14 +3901,14 @@
           </a:ln>
           <a:extLst>
             <a:ext uri="{909E8E84-426E-40dd-AFC4-6F175D3DCCD1}">
-              <a14:hiddenFill xmlns:a14="http://schemas.microsoft.com/office/drawing/2010/main" xmlns:p="http://schemas.openxmlformats.org/presentationml/2006/main" xmlns:r="http://schemas.openxmlformats.org/officeDocument/2006/relationships" xmlns:a="http://schemas.openxmlformats.org/drawingml/2006/main" xmlns="">
+              <a14:hiddenFill xmlns="" xmlns:a="http://schemas.openxmlformats.org/drawingml/2006/main" xmlns:r="http://schemas.openxmlformats.org/officeDocument/2006/relationships" xmlns:p="http://schemas.openxmlformats.org/presentationml/2006/main" xmlns:a14="http://schemas.microsoft.com/office/drawing/2010/main" xmlns:mv="urn:schemas-microsoft-com:mac:vml" xmlns:mc="http://schemas.openxmlformats.org/markup-compatibility/2006">
                 <a:solidFill>
                   <a:srgbClr val="FFFFFF"/>
                 </a:solidFill>
               </a14:hiddenFill>
             </a:ext>
             <a:ext uri="{91240B29-F687-4f45-9708-019B960494DF}">
-              <a14:hiddenLine xmlns:a14="http://schemas.microsoft.com/office/drawing/2010/main" xmlns:p="http://schemas.openxmlformats.org/presentationml/2006/main" xmlns:r="http://schemas.openxmlformats.org/officeDocument/2006/relationships" xmlns:a="http://schemas.openxmlformats.org/drawingml/2006/main" xmlns="" w="9525">
+              <a14:hiddenLine xmlns="" xmlns:a="http://schemas.openxmlformats.org/drawingml/2006/main" xmlns:r="http://schemas.openxmlformats.org/officeDocument/2006/relationships" xmlns:p="http://schemas.openxmlformats.org/presentationml/2006/main" xmlns:a14="http://schemas.microsoft.com/office/drawing/2010/main" xmlns:mv="urn:schemas-microsoft-com:mac:vml" xmlns:mc="http://schemas.openxmlformats.org/markup-compatibility/2006" w="9525">
                 <a:solidFill>
                   <a:srgbClr val="000000"/>
                 </a:solidFill>
@@ -3982,7 +3985,7 @@
     </p:spTree>
     <p:extLst>
       <p:ext uri="{BB962C8B-B14F-4D97-AF65-F5344CB8AC3E}">
-        <p14:creationId xmlns:p14="http://schemas.microsoft.com/office/powerpoint/2010/main" xmlns:p="http://schemas.openxmlformats.org/presentationml/2006/main" xmlns:r="http://schemas.openxmlformats.org/officeDocument/2006/relationships" xmlns:a="http://schemas.openxmlformats.org/drawingml/2006/main" xmlns="" val="1786189684"/>
+        <p14:creationId xmlns="" xmlns:a="http://schemas.openxmlformats.org/drawingml/2006/main" xmlns:r="http://schemas.openxmlformats.org/officeDocument/2006/relationships" xmlns:p="http://schemas.openxmlformats.org/presentationml/2006/main" xmlns:p14="http://schemas.microsoft.com/office/powerpoint/2010/main" xmlns:mv="urn:schemas-microsoft-com:mac:vml" xmlns:mc="http://schemas.openxmlformats.org/markup-compatibility/2006" val="1786189684"/>
       </p:ext>
     </p:extLst>
   </p:cSld>
@@ -4069,11 +4072,7 @@
           <a:p>
             <a:r>
               <a:rPr lang="en-US" sz="2400" dirty="0" smtClean="0"/>
-              <a:t>Class</a:t>
-            </a:r>
-            <a:r>
-              <a:rPr lang="en-US" sz="2400" dirty="0" smtClean="0"/>
-              <a:t>: @A*(</a:t>
+              <a:t>Class: @A*(</a:t>
             </a:r>
             <a:r>
               <a:rPr lang="en-US" sz="2400" dirty="0" err="1" smtClean="0"/>
@@ -4127,15 +4126,7 @@
             </a:r>
             <a:r>
               <a:rPr lang="en-US" sz="2400" dirty="0" smtClean="0"/>
-              <a:t> some </a:t>
-            </a:r>
-            <a:r>
-              <a:rPr lang="en-US" sz="2400" dirty="0" smtClean="0"/>
-              <a:t>@D*</a:t>
-            </a:r>
-            <a:r>
-              <a:rPr lang="en-US" sz="2400" dirty="0" smtClean="0"/>
-              <a:t>(</a:t>
+              <a:t> some @D*(</a:t>
             </a:r>
             <a:r>
               <a:rPr lang="en-US" sz="2400" dirty="0" err="1" smtClean="0"/>
@@ -4235,7 +4226,7 @@
     </p:spTree>
     <p:extLst>
       <p:ext uri="{BB962C8B-B14F-4D97-AF65-F5344CB8AC3E}">
-        <p14:creationId xmlns:p14="http://schemas.microsoft.com/office/powerpoint/2010/main" xmlns:p="http://schemas.openxmlformats.org/presentationml/2006/main" xmlns:r="http://schemas.openxmlformats.org/officeDocument/2006/relationships" xmlns:a="http://schemas.openxmlformats.org/drawingml/2006/main" xmlns="" val="3020082651"/>
+        <p14:creationId xmlns="" xmlns:a="http://schemas.openxmlformats.org/drawingml/2006/main" xmlns:r="http://schemas.openxmlformats.org/officeDocument/2006/relationships" xmlns:p="http://schemas.openxmlformats.org/presentationml/2006/main" xmlns:p14="http://schemas.microsoft.com/office/powerpoint/2010/main" xmlns:mv="urn:schemas-microsoft-com:mac:vml" xmlns:mc="http://schemas.openxmlformats.org/markup-compatibility/2006" val="3020082651"/>
       </p:ext>
     </p:extLst>
   </p:cSld>
@@ -4311,15 +4302,7 @@
           <a:p>
             <a:r>
               <a:rPr lang="en-GB" dirty="0" smtClean="0"/>
-              <a:t>Automatic Import via</a:t>
-            </a:r>
-            <a:r>
-              <a:rPr lang="en-GB" dirty="0" smtClean="0"/>
-              <a:t> MIREOT mechanism </a:t>
-            </a:r>
-            <a:r>
-              <a:rPr lang="en-GB" dirty="0" smtClean="0"/>
-              <a:t>of external and </a:t>
+              <a:t>Automatic Import via MIREOT mechanism of external and </a:t>
             </a:r>
             <a:r>
               <a:rPr lang="en-GB" dirty="0" err="1" smtClean="0"/>
@@ -4383,7 +4366,7 @@
     </p:spTree>
     <p:extLst>
       <p:ext uri="{BB962C8B-B14F-4D97-AF65-F5344CB8AC3E}">
-        <p14:creationId xmlns:p14="http://schemas.microsoft.com/office/powerpoint/2010/main" xmlns:p="http://schemas.openxmlformats.org/presentationml/2006/main" xmlns:r="http://schemas.openxmlformats.org/officeDocument/2006/relationships" xmlns:a="http://schemas.openxmlformats.org/drawingml/2006/main" xmlns="" val="4235520220"/>
+        <p14:creationId xmlns="" xmlns:a="http://schemas.openxmlformats.org/drawingml/2006/main" xmlns:r="http://schemas.openxmlformats.org/officeDocument/2006/relationships" xmlns:p="http://schemas.openxmlformats.org/presentationml/2006/main" xmlns:p14="http://schemas.microsoft.com/office/powerpoint/2010/main" xmlns:mv="urn:schemas-microsoft-com:mac:vml" xmlns:mc="http://schemas.openxmlformats.org/markup-compatibility/2006" val="4235520220"/>
       </p:ext>
     </p:extLst>
   </p:cSld>
@@ -4457,12 +4440,26 @@
           </a:bodyPr>
           <a:lstStyle/>
           <a:p>
+            <a:pPr>
+              <a:buNone/>
+            </a:pPr>
             <a:r>
               <a:rPr lang="en-GB" dirty="0"/>
-              <a:t>Overcoming the Ontology Enrichment Bottleneck with Quick Term Templates</a:t>
-            </a:r>
-          </a:p>
-          <a:p>
+              <a:t>Overcoming the Ontology Enrichment </a:t>
+            </a:r>
+            <a:r>
+              <a:rPr lang="en-GB" dirty="0" smtClean="0"/>
+              <a:t>Bottleneck with </a:t>
+            </a:r>
+            <a:r>
+              <a:rPr lang="en-GB" dirty="0"/>
+              <a:t>Quick Term Templates</a:t>
+            </a:r>
+          </a:p>
+          <a:p>
+            <a:pPr>
+              <a:buNone/>
+            </a:pPr>
             <a:r>
               <a:rPr lang="en-GB" i="1" dirty="0" smtClean="0">
                 <a:solidFill>
@@ -4589,6 +4586,9 @@
             </a:r>
           </a:p>
           <a:p>
+            <a:pPr>
+              <a:buNone/>
+            </a:pPr>
             <a:r>
               <a:rPr lang="en-GB" dirty="0" smtClean="0"/>
               <a:t>Journal </a:t>
@@ -4603,6 +4603,9 @@
             </a:r>
           </a:p>
           <a:p>
+            <a:pPr>
+              <a:buNone/>
+            </a:pPr>
             <a:r>
               <a:rPr lang="en-GB" u="sng" dirty="0">
                 <a:solidFill>
@@ -4621,6 +4624,9 @@
             </a:r>
           </a:p>
           <a:p>
+            <a:pPr>
+              <a:buNone/>
+            </a:pPr>
             <a:r>
               <a:rPr lang="en-GB" dirty="0" smtClean="0">
                 <a:solidFill>
@@ -4704,7 +4710,7 @@
     </p:spTree>
     <p:extLst>
       <p:ext uri="{BB962C8B-B14F-4D97-AF65-F5344CB8AC3E}">
-        <p14:creationId xmlns:p14="http://schemas.microsoft.com/office/powerpoint/2010/main" xmlns:p="http://schemas.openxmlformats.org/presentationml/2006/main" xmlns:r="http://schemas.openxmlformats.org/officeDocument/2006/relationships" xmlns:a="http://schemas.openxmlformats.org/drawingml/2006/main" xmlns="" val="438439939"/>
+        <p14:creationId xmlns="" xmlns:a="http://schemas.openxmlformats.org/drawingml/2006/main" xmlns:r="http://schemas.openxmlformats.org/officeDocument/2006/relationships" xmlns:p="http://schemas.openxmlformats.org/presentationml/2006/main" xmlns:p14="http://schemas.microsoft.com/office/powerpoint/2010/main" xmlns:mv="urn:schemas-microsoft-com:mac:vml" xmlns:mc="http://schemas.openxmlformats.org/markup-compatibility/2006" val="438439939"/>
       </p:ext>
     </p:extLst>
   </p:cSld>
@@ -4822,7 +4828,7 @@
     </p:spTree>
     <p:extLst>
       <p:ext uri="{BB962C8B-B14F-4D97-AF65-F5344CB8AC3E}">
-        <p14:creationId xmlns:p14="http://schemas.microsoft.com/office/powerpoint/2010/main" xmlns:p="http://schemas.openxmlformats.org/presentationml/2006/main" xmlns:r="http://schemas.openxmlformats.org/officeDocument/2006/relationships" xmlns:a="http://schemas.openxmlformats.org/drawingml/2006/main" xmlns="" val="762393035"/>
+        <p14:creationId xmlns="" xmlns:a="http://schemas.openxmlformats.org/drawingml/2006/main" xmlns:r="http://schemas.openxmlformats.org/officeDocument/2006/relationships" xmlns:p="http://schemas.openxmlformats.org/presentationml/2006/main" xmlns:p14="http://schemas.microsoft.com/office/powerpoint/2010/main" xmlns:mv="urn:schemas-microsoft-com:mac:vml" xmlns:mc="http://schemas.openxmlformats.org/markup-compatibility/2006" val="762393035"/>
       </p:ext>
     </p:extLst>
   </p:cSld>
@@ -5001,7 +5007,7 @@
     </p:spTree>
     <p:extLst>
       <p:ext uri="{BB962C8B-B14F-4D97-AF65-F5344CB8AC3E}">
-        <p14:creationId xmlns:p14="http://schemas.microsoft.com/office/powerpoint/2010/main" xmlns:p="http://schemas.openxmlformats.org/presentationml/2006/main" xmlns:r="http://schemas.openxmlformats.org/officeDocument/2006/relationships" xmlns:a="http://schemas.openxmlformats.org/drawingml/2006/main" xmlns="" val="1823721742"/>
+        <p14:creationId xmlns="" xmlns:a="http://schemas.openxmlformats.org/drawingml/2006/main" xmlns:r="http://schemas.openxmlformats.org/officeDocument/2006/relationships" xmlns:p="http://schemas.openxmlformats.org/presentationml/2006/main" xmlns:p14="http://schemas.microsoft.com/office/powerpoint/2010/main" xmlns:mv="urn:schemas-microsoft-com:mac:vml" xmlns:mc="http://schemas.openxmlformats.org/markup-compatibility/2006" val="1823721742"/>
       </p:ext>
     </p:extLst>
   </p:cSld>
@@ -5077,7 +5083,7 @@
           <a:blip r:embed="rId2">
             <a:extLst>
               <a:ext uri="{28A0092B-C50C-407E-A947-70E740481C1C}">
-                <a14:useLocalDpi xmlns:a14="http://schemas.microsoft.com/office/drawing/2010/main" xmlns:p="http://schemas.openxmlformats.org/presentationml/2006/main" xmlns:r="http://schemas.openxmlformats.org/officeDocument/2006/relationships" xmlns:a="http://schemas.openxmlformats.org/drawingml/2006/main" xmlns="" val="0"/>
+                <a14:useLocalDpi xmlns="" xmlns:a="http://schemas.openxmlformats.org/drawingml/2006/main" xmlns:r="http://schemas.openxmlformats.org/officeDocument/2006/relationships" xmlns:p="http://schemas.openxmlformats.org/presentationml/2006/main" xmlns:a14="http://schemas.microsoft.com/office/drawing/2010/main" xmlns:mv="urn:schemas-microsoft-com:mac:vml" xmlns:mc="http://schemas.openxmlformats.org/markup-compatibility/2006" val="0"/>
               </a:ext>
             </a:extLst>
           </a:blip>
@@ -5146,7 +5152,7 @@
     </p:spTree>
     <p:extLst>
       <p:ext uri="{BB962C8B-B14F-4D97-AF65-F5344CB8AC3E}">
-        <p14:creationId xmlns:p14="http://schemas.microsoft.com/office/powerpoint/2010/main" xmlns:p="http://schemas.openxmlformats.org/presentationml/2006/main" xmlns:r="http://schemas.openxmlformats.org/officeDocument/2006/relationships" xmlns:a="http://schemas.openxmlformats.org/drawingml/2006/main" xmlns="" val="290209560"/>
+        <p14:creationId xmlns="" xmlns:a="http://schemas.openxmlformats.org/drawingml/2006/main" xmlns:r="http://schemas.openxmlformats.org/officeDocument/2006/relationships" xmlns:p="http://schemas.openxmlformats.org/presentationml/2006/main" xmlns:p14="http://schemas.microsoft.com/office/powerpoint/2010/main" xmlns:mv="urn:schemas-microsoft-com:mac:vml" xmlns:mc="http://schemas.openxmlformats.org/markup-compatibility/2006" val="290209560"/>
       </p:ext>
     </p:extLst>
   </p:cSld>
@@ -5282,7 +5288,7 @@
     </p:spTree>
     <p:extLst>
       <p:ext uri="{BB962C8B-B14F-4D97-AF65-F5344CB8AC3E}">
-        <p14:creationId xmlns:p14="http://schemas.microsoft.com/office/powerpoint/2010/main" xmlns:p="http://schemas.openxmlformats.org/presentationml/2006/main" xmlns:r="http://schemas.openxmlformats.org/officeDocument/2006/relationships" xmlns:a="http://schemas.openxmlformats.org/drawingml/2006/main" xmlns="" val="1164309193"/>
+        <p14:creationId xmlns="" xmlns:a="http://schemas.openxmlformats.org/drawingml/2006/main" xmlns:r="http://schemas.openxmlformats.org/officeDocument/2006/relationships" xmlns:p="http://schemas.openxmlformats.org/presentationml/2006/main" xmlns:p14="http://schemas.microsoft.com/office/powerpoint/2010/main" xmlns:mv="urn:schemas-microsoft-com:mac:vml" xmlns:mc="http://schemas.openxmlformats.org/markup-compatibility/2006" val="1164309193"/>
       </p:ext>
     </p:extLst>
   </p:cSld>
@@ -5538,15 +5544,7 @@
                   <a:srgbClr val="48FFFC"/>
                 </a:solidFill>
               </a:rPr>
-              <a:t>&lt;quality&gt;</a:t>
-            </a:r>
-            <a:r>
-              <a:rPr lang="en-GB" dirty="0" smtClean="0">
-                <a:solidFill>
-                  <a:srgbClr val="48FFFC"/>
-                </a:solidFill>
-              </a:rPr>
-              <a:t> </a:t>
+              <a:t>&lt;quality&gt; </a:t>
             </a:r>
             <a:r>
               <a:rPr lang="en-GB" dirty="0" smtClean="0">
@@ -5603,7 +5601,7 @@
     </p:spTree>
     <p:extLst>
       <p:ext uri="{BB962C8B-B14F-4D97-AF65-F5344CB8AC3E}">
-        <p14:creationId xmlns:p14="http://schemas.microsoft.com/office/powerpoint/2010/main" xmlns:p="http://schemas.openxmlformats.org/presentationml/2006/main" xmlns:r="http://schemas.openxmlformats.org/officeDocument/2006/relationships" xmlns:a="http://schemas.openxmlformats.org/drawingml/2006/main" xmlns="" val="3692877943"/>
+        <p14:creationId xmlns="" xmlns:a="http://schemas.openxmlformats.org/drawingml/2006/main" xmlns:r="http://schemas.openxmlformats.org/officeDocument/2006/relationships" xmlns:p="http://schemas.openxmlformats.org/presentationml/2006/main" xmlns:p14="http://schemas.microsoft.com/office/powerpoint/2010/main" xmlns:mv="urn:schemas-microsoft-com:mac:vml" xmlns:mc="http://schemas.openxmlformats.org/markup-compatibility/2006" val="3692877943"/>
       </p:ext>
     </p:extLst>
   </p:cSld>
@@ -5672,7 +5670,7 @@
           <a:blip r:embed="rId2">
             <a:extLst>
               <a:ext uri="{28A0092B-C50C-407E-A947-70E740481C1C}">
-                <a14:useLocalDpi xmlns="" xmlns:a="http://schemas.openxmlformats.org/drawingml/2006/main" xmlns:r="http://schemas.openxmlformats.org/officeDocument/2006/relationships" xmlns:p="http://schemas.openxmlformats.org/presentationml/2006/main" xmlns:a14="http://schemas.microsoft.com/office/drawing/2010/main" xmlns:mv="urn:schemas-microsoft-com:mac:vml" xmlns:mc="http://schemas.openxmlformats.org/markup-compatibility/2006" val="0"/>
+                <a14:useLocalDpi xmlns:mc="http://schemas.openxmlformats.org/markup-compatibility/2006" xmlns:mv="urn:schemas-microsoft-com:mac:vml" xmlns:a14="http://schemas.microsoft.com/office/drawing/2010/main" xmlns:p="http://schemas.openxmlformats.org/presentationml/2006/main" xmlns:r="http://schemas.openxmlformats.org/officeDocument/2006/relationships" xmlns:a="http://schemas.openxmlformats.org/drawingml/2006/main" xmlns="" val="0"/>
               </a:ext>
             </a:extLst>
           </a:blip>
@@ -5778,7 +5776,7 @@
     </p:spTree>
     <p:extLst>
       <p:ext uri="{BB962C8B-B14F-4D97-AF65-F5344CB8AC3E}">
-        <p14:creationId xmlns="" xmlns:a="http://schemas.openxmlformats.org/drawingml/2006/main" xmlns:r="http://schemas.openxmlformats.org/officeDocument/2006/relationships" xmlns:p="http://schemas.openxmlformats.org/presentationml/2006/main" xmlns:p14="http://schemas.microsoft.com/office/powerpoint/2010/main" xmlns:mv="urn:schemas-microsoft-com:mac:vml" xmlns:mc="http://schemas.openxmlformats.org/markup-compatibility/2006" val="3020082651"/>
+        <p14:creationId xmlns:mc="http://schemas.openxmlformats.org/markup-compatibility/2006" xmlns:mv="urn:schemas-microsoft-com:mac:vml" xmlns:p14="http://schemas.microsoft.com/office/powerpoint/2010/main" xmlns:p="http://schemas.openxmlformats.org/presentationml/2006/main" xmlns:r="http://schemas.openxmlformats.org/officeDocument/2006/relationships" xmlns:a="http://schemas.openxmlformats.org/drawingml/2006/main" xmlns="" val="3020082651"/>
       </p:ext>
     </p:extLst>
   </p:cSld>
@@ -5849,7 +5847,7 @@
           <a:blip r:embed="rId2">
             <a:extLst>
               <a:ext uri="{28A0092B-C50C-407E-A947-70E740481C1C}">
-                <a14:useLocalDpi xmlns:a14="http://schemas.microsoft.com/office/drawing/2010/main" xmlns:p="http://schemas.openxmlformats.org/presentationml/2006/main" xmlns:r="http://schemas.openxmlformats.org/officeDocument/2006/relationships" xmlns:a="http://schemas.openxmlformats.org/drawingml/2006/main" xmlns="" val="0"/>
+                <a14:useLocalDpi xmlns="" xmlns:a="http://schemas.openxmlformats.org/drawingml/2006/main" xmlns:r="http://schemas.openxmlformats.org/officeDocument/2006/relationships" xmlns:p="http://schemas.openxmlformats.org/presentationml/2006/main" xmlns:a14="http://schemas.microsoft.com/office/drawing/2010/main" xmlns:mv="urn:schemas-microsoft-com:mac:vml" xmlns:mc="http://schemas.openxmlformats.org/markup-compatibility/2006" val="0"/>
               </a:ext>
             </a:extLst>
           </a:blip>
@@ -5870,7 +5868,7 @@
     </p:spTree>
     <p:extLst>
       <p:ext uri="{BB962C8B-B14F-4D97-AF65-F5344CB8AC3E}">
-        <p14:creationId xmlns:p14="http://schemas.microsoft.com/office/powerpoint/2010/main" xmlns:p="http://schemas.openxmlformats.org/presentationml/2006/main" xmlns:r="http://schemas.openxmlformats.org/officeDocument/2006/relationships" xmlns:a="http://schemas.openxmlformats.org/drawingml/2006/main" xmlns="" val="3378772889"/>
+        <p14:creationId xmlns="" xmlns:a="http://schemas.openxmlformats.org/drawingml/2006/main" xmlns:r="http://schemas.openxmlformats.org/officeDocument/2006/relationships" xmlns:p="http://schemas.openxmlformats.org/presentationml/2006/main" xmlns:p14="http://schemas.microsoft.com/office/powerpoint/2010/main" xmlns:mv="urn:schemas-microsoft-com:mac:vml" xmlns:mc="http://schemas.openxmlformats.org/markup-compatibility/2006" val="3378772889"/>
       </p:ext>
     </p:extLst>
   </p:cSld>
@@ -5965,7 +5963,7 @@
           <a:blip r:embed="rId3">
             <a:extLst>
               <a:ext uri="{28A0092B-C50C-407E-A947-70E740481C1C}">
-                <a14:useLocalDpi xmlns:a14="http://schemas.microsoft.com/office/drawing/2010/main" xmlns:p="http://schemas.openxmlformats.org/presentationml/2006/main" xmlns:r="http://schemas.openxmlformats.org/officeDocument/2006/relationships" xmlns:a="http://schemas.openxmlformats.org/drawingml/2006/main" xmlns="" val="0"/>
+                <a14:useLocalDpi xmlns="" xmlns:a="http://schemas.openxmlformats.org/drawingml/2006/main" xmlns:r="http://schemas.openxmlformats.org/officeDocument/2006/relationships" xmlns:p="http://schemas.openxmlformats.org/presentationml/2006/main" xmlns:a14="http://schemas.microsoft.com/office/drawing/2010/main" xmlns:mv="urn:schemas-microsoft-com:mac:vml" xmlns:mc="http://schemas.openxmlformats.org/markup-compatibility/2006" val="0"/>
               </a:ext>
             </a:extLst>
           </a:blip>
@@ -5988,14 +5986,14 @@
           </a:ln>
           <a:extLst>
             <a:ext uri="{909E8E84-426E-40dd-AFC4-6F175D3DCCD1}">
-              <a14:hiddenFill xmlns:a14="http://schemas.microsoft.com/office/drawing/2010/main" xmlns:p="http://schemas.openxmlformats.org/presentationml/2006/main" xmlns:r="http://schemas.openxmlformats.org/officeDocument/2006/relationships" xmlns:a="http://schemas.openxmlformats.org/drawingml/2006/main" xmlns="">
+              <a14:hiddenFill xmlns="" xmlns:a="http://schemas.openxmlformats.org/drawingml/2006/main" xmlns:r="http://schemas.openxmlformats.org/officeDocument/2006/relationships" xmlns:p="http://schemas.openxmlformats.org/presentationml/2006/main" xmlns:a14="http://schemas.microsoft.com/office/drawing/2010/main" xmlns:mv="urn:schemas-microsoft-com:mac:vml" xmlns:mc="http://schemas.openxmlformats.org/markup-compatibility/2006">
                 <a:solidFill>
                   <a:srgbClr val="FFFFFF"/>
                 </a:solidFill>
               </a14:hiddenFill>
             </a:ext>
             <a:ext uri="{91240B29-F687-4f45-9708-019B960494DF}">
-              <a14:hiddenLine xmlns:a14="http://schemas.microsoft.com/office/drawing/2010/main" xmlns:p="http://schemas.openxmlformats.org/presentationml/2006/main" xmlns:r="http://schemas.openxmlformats.org/officeDocument/2006/relationships" xmlns:a="http://schemas.openxmlformats.org/drawingml/2006/main" xmlns="" w="9525">
+              <a14:hiddenLine xmlns="" xmlns:a="http://schemas.openxmlformats.org/drawingml/2006/main" xmlns:r="http://schemas.openxmlformats.org/officeDocument/2006/relationships" xmlns:p="http://schemas.openxmlformats.org/presentationml/2006/main" xmlns:a14="http://schemas.microsoft.com/office/drawing/2010/main" xmlns:mv="urn:schemas-microsoft-com:mac:vml" xmlns:mc="http://schemas.openxmlformats.org/markup-compatibility/2006" w="9525">
                 <a:solidFill>
                   <a:srgbClr val="000000"/>
                 </a:solidFill>
@@ -6010,7 +6008,7 @@
     </p:spTree>
     <p:extLst>
       <p:ext uri="{BB962C8B-B14F-4D97-AF65-F5344CB8AC3E}">
-        <p14:creationId xmlns:p14="http://schemas.microsoft.com/office/powerpoint/2010/main" xmlns:p="http://schemas.openxmlformats.org/presentationml/2006/main" xmlns:r="http://schemas.openxmlformats.org/officeDocument/2006/relationships" xmlns:a="http://schemas.openxmlformats.org/drawingml/2006/main" xmlns="" val="2126066395"/>
+        <p14:creationId xmlns="" xmlns:a="http://schemas.openxmlformats.org/drawingml/2006/main" xmlns:r="http://schemas.openxmlformats.org/officeDocument/2006/relationships" xmlns:p="http://schemas.openxmlformats.org/presentationml/2006/main" xmlns:p14="http://schemas.microsoft.com/office/powerpoint/2010/main" xmlns:mv="urn:schemas-microsoft-com:mac:vml" xmlns:mc="http://schemas.openxmlformats.org/markup-compatibility/2006" val="2126066395"/>
       </p:ext>
     </p:extLst>
   </p:cSld>

</xml_diff>